<commit_message>
slide deck for storage
</commit_message>
<xml_diff>
--- a/Presentation Materials/MVA-ApplicationsOnAzure-05.pptx
+++ b/Presentation Materials/MVA-ApplicationsOnAzure-05.pptx
@@ -5,15 +5,22 @@
     <p:sldMasterId id="2147483660" r:id="rId4"/>
   </p:sldMasterIdLst>
   <p:notesMasterIdLst>
-    <p:notesMasterId r:id="rId8"/>
+    <p:notesMasterId r:id="rId15"/>
   </p:notesMasterIdLst>
   <p:handoutMasterIdLst>
-    <p:handoutMasterId r:id="rId9"/>
+    <p:handoutMasterId r:id="rId16"/>
   </p:handoutMasterIdLst>
   <p:sldIdLst>
     <p:sldId id="277" r:id="rId5"/>
     <p:sldId id="278" r:id="rId6"/>
     <p:sldId id="282" r:id="rId7"/>
+    <p:sldId id="285" r:id="rId8"/>
+    <p:sldId id="286" r:id="rId9"/>
+    <p:sldId id="287" r:id="rId10"/>
+    <p:sldId id="288" r:id="rId11"/>
+    <p:sldId id="289" r:id="rId12"/>
+    <p:sldId id="283" r:id="rId13"/>
+    <p:sldId id="284" r:id="rId14"/>
   </p:sldIdLst>
   <p:sldSz cx="12192000" cy="6858000"/>
   <p:notesSz cx="6858000" cy="9144000"/>
@@ -205,7 +212,7 @@
           <a:p>
             <a:fld id="{312E7B4A-039C-48A2-9B2C-AF16AA3873D8}" type="datetimeFigureOut">
               <a:rPr lang="en-US" smtClean="0"/>
-              <a:t>10/14/2015</a:t>
+              <a:t>11/6/2015</a:t>
             </a:fld>
             <a:endParaRPr lang="en-US"/>
           </a:p>
@@ -370,7 +377,7 @@
           <a:p>
             <a:fld id="{DA005A0C-54D9-45AA-87D4-C551D08DFCE1}" type="datetimeFigureOut">
               <a:rPr lang="en-US" smtClean="0"/>
-              <a:t>10/14/2015</a:t>
+              <a:t>11/6/2015</a:t>
             </a:fld>
             <a:endParaRPr lang="en-US"/>
           </a:p>
@@ -728,6 +735,90 @@
 </p:notes>
 </file>
 
+<file path=ppt/notesSlides/notesSlide10.xml><?xml version="1.0" encoding="utf-8"?>
+<p:notes xmlns:a="http://schemas.openxmlformats.org/drawingml/2006/main" xmlns:r="http://schemas.openxmlformats.org/officeDocument/2006/relationships" xmlns:p="http://schemas.openxmlformats.org/presentationml/2006/main">
+  <p:cSld>
+    <p:spTree>
+      <p:nvGrpSpPr>
+        <p:cNvPr id="1" name=""/>
+        <p:cNvGrpSpPr/>
+        <p:nvPr/>
+      </p:nvGrpSpPr>
+      <p:grpSpPr>
+        <a:xfrm>
+          <a:off x="0" y="0"/>
+          <a:ext cx="0" cy="0"/>
+          <a:chOff x="0" y="0"/>
+          <a:chExt cx="0" cy="0"/>
+        </a:xfrm>
+      </p:grpSpPr>
+      <p:sp>
+        <p:nvSpPr>
+          <p:cNvPr id="2" name="Slide Image Placeholder 1"/>
+          <p:cNvSpPr>
+            <a:spLocks noGrp="1" noRot="1" noChangeAspect="1"/>
+          </p:cNvSpPr>
+          <p:nvPr>
+            <p:ph type="sldImg"/>
+          </p:nvPr>
+        </p:nvSpPr>
+        <p:spPr/>
+      </p:sp>
+      <p:sp>
+        <p:nvSpPr>
+          <p:cNvPr id="3" name="Notes Placeholder 2"/>
+          <p:cNvSpPr>
+            <a:spLocks noGrp="1"/>
+          </p:cNvSpPr>
+          <p:nvPr>
+            <p:ph type="body" idx="1"/>
+          </p:nvPr>
+        </p:nvSpPr>
+        <p:spPr/>
+        <p:txBody>
+          <a:bodyPr/>
+          <a:lstStyle/>
+          <a:p>
+            <a:endParaRPr lang="en-US"/>
+          </a:p>
+        </p:txBody>
+      </p:sp>
+      <p:sp>
+        <p:nvSpPr>
+          <p:cNvPr id="4" name="Slide Number Placeholder 3"/>
+          <p:cNvSpPr>
+            <a:spLocks noGrp="1"/>
+          </p:cNvSpPr>
+          <p:nvPr>
+            <p:ph type="sldNum" sz="quarter" idx="10"/>
+          </p:nvPr>
+        </p:nvSpPr>
+        <p:spPr/>
+        <p:txBody>
+          <a:bodyPr/>
+          <a:lstStyle/>
+          <a:p>
+            <a:fld id="{4CFD207A-07DF-40AD-A916-9872E089CE7A}" type="slidenum">
+              <a:rPr lang="en-US" smtClean="0"/>
+              <a:t>10</a:t>
+            </a:fld>
+            <a:endParaRPr lang="en-US"/>
+          </a:p>
+        </p:txBody>
+      </p:sp>
+    </p:spTree>
+    <p:extLst>
+      <p:ext uri="{BB962C8B-B14F-4D97-AF65-F5344CB8AC3E}">
+        <p14:creationId xmlns:p14="http://schemas.microsoft.com/office/powerpoint/2010/main" val="2535830585"/>
+      </p:ext>
+    </p:extLst>
+  </p:cSld>
+  <p:clrMapOvr>
+    <a:masterClrMapping/>
+  </p:clrMapOvr>
+</p:notes>
+</file>
+
 <file path=ppt/notesSlides/notesSlide2.xml><?xml version="1.0" encoding="utf-8"?>
 <p:notes xmlns:a="http://schemas.openxmlformats.org/drawingml/2006/main" xmlns:r="http://schemas.openxmlformats.org/officeDocument/2006/relationships" xmlns:p="http://schemas.openxmlformats.org/presentationml/2006/main">
   <p:cSld>
@@ -864,7 +955,7 @@
           <a:bodyPr/>
           <a:lstStyle/>
           <a:p>
-            <a:endParaRPr lang="en-US"/>
+            <a:endParaRPr lang="en-US" dirty="0"/>
           </a:p>
         </p:txBody>
       </p:sp>
@@ -895,6 +986,578 @@
     <p:extLst>
       <p:ext uri="{BB962C8B-B14F-4D97-AF65-F5344CB8AC3E}">
         <p14:creationId xmlns:p14="http://schemas.microsoft.com/office/powerpoint/2010/main" val="1692121609"/>
+      </p:ext>
+    </p:extLst>
+  </p:cSld>
+  <p:clrMapOvr>
+    <a:masterClrMapping/>
+  </p:clrMapOvr>
+</p:notes>
+</file>
+
+<file path=ppt/notesSlides/notesSlide4.xml><?xml version="1.0" encoding="utf-8"?>
+<p:notes xmlns:a="http://schemas.openxmlformats.org/drawingml/2006/main" xmlns:r="http://schemas.openxmlformats.org/officeDocument/2006/relationships" xmlns:p="http://schemas.openxmlformats.org/presentationml/2006/main">
+  <p:cSld>
+    <p:spTree>
+      <p:nvGrpSpPr>
+        <p:cNvPr id="1" name=""/>
+        <p:cNvGrpSpPr/>
+        <p:nvPr/>
+      </p:nvGrpSpPr>
+      <p:grpSpPr>
+        <a:xfrm>
+          <a:off x="0" y="0"/>
+          <a:ext cx="0" cy="0"/>
+          <a:chOff x="0" y="0"/>
+          <a:chExt cx="0" cy="0"/>
+        </a:xfrm>
+      </p:grpSpPr>
+      <p:sp>
+        <p:nvSpPr>
+          <p:cNvPr id="2" name="Slide Image Placeholder 1"/>
+          <p:cNvSpPr>
+            <a:spLocks noGrp="1" noRot="1" noChangeAspect="1"/>
+          </p:cNvSpPr>
+          <p:nvPr>
+            <p:ph type="sldImg"/>
+          </p:nvPr>
+        </p:nvSpPr>
+        <p:spPr/>
+      </p:sp>
+      <p:sp>
+        <p:nvSpPr>
+          <p:cNvPr id="3" name="Notes Placeholder 2"/>
+          <p:cNvSpPr>
+            <a:spLocks noGrp="1"/>
+          </p:cNvSpPr>
+          <p:nvPr>
+            <p:ph type="body" idx="1"/>
+          </p:nvPr>
+        </p:nvSpPr>
+        <p:spPr/>
+        <p:txBody>
+          <a:bodyPr/>
+          <a:lstStyle/>
+          <a:p>
+            <a:endParaRPr lang="en-US" dirty="0"/>
+          </a:p>
+        </p:txBody>
+      </p:sp>
+      <p:sp>
+        <p:nvSpPr>
+          <p:cNvPr id="4" name="Slide Number Placeholder 3"/>
+          <p:cNvSpPr>
+            <a:spLocks noGrp="1"/>
+          </p:cNvSpPr>
+          <p:nvPr>
+            <p:ph type="sldNum" sz="quarter" idx="10"/>
+          </p:nvPr>
+        </p:nvSpPr>
+        <p:spPr/>
+        <p:txBody>
+          <a:bodyPr/>
+          <a:lstStyle/>
+          <a:p>
+            <a:fld id="{4CFD207A-07DF-40AD-A916-9872E089CE7A}" type="slidenum">
+              <a:rPr lang="en-US" smtClean="0"/>
+              <a:t>4</a:t>
+            </a:fld>
+            <a:endParaRPr lang="en-US"/>
+          </a:p>
+        </p:txBody>
+      </p:sp>
+    </p:spTree>
+    <p:extLst>
+      <p:ext uri="{BB962C8B-B14F-4D97-AF65-F5344CB8AC3E}">
+        <p14:creationId xmlns:p14="http://schemas.microsoft.com/office/powerpoint/2010/main" val="3676754883"/>
+      </p:ext>
+    </p:extLst>
+  </p:cSld>
+  <p:clrMapOvr>
+    <a:masterClrMapping/>
+  </p:clrMapOvr>
+</p:notes>
+</file>
+
+<file path=ppt/notesSlides/notesSlide5.xml><?xml version="1.0" encoding="utf-8"?>
+<p:notes xmlns:a="http://schemas.openxmlformats.org/drawingml/2006/main" xmlns:r="http://schemas.openxmlformats.org/officeDocument/2006/relationships" xmlns:p="http://schemas.openxmlformats.org/presentationml/2006/main">
+  <p:cSld>
+    <p:spTree>
+      <p:nvGrpSpPr>
+        <p:cNvPr id="1" name=""/>
+        <p:cNvGrpSpPr/>
+        <p:nvPr/>
+      </p:nvGrpSpPr>
+      <p:grpSpPr>
+        <a:xfrm>
+          <a:off x="0" y="0"/>
+          <a:ext cx="0" cy="0"/>
+          <a:chOff x="0" y="0"/>
+          <a:chExt cx="0" cy="0"/>
+        </a:xfrm>
+      </p:grpSpPr>
+      <p:sp>
+        <p:nvSpPr>
+          <p:cNvPr id="2" name="Slide Image Placeholder 1"/>
+          <p:cNvSpPr>
+            <a:spLocks noGrp="1" noRot="1" noChangeAspect="1"/>
+          </p:cNvSpPr>
+          <p:nvPr>
+            <p:ph type="sldImg"/>
+          </p:nvPr>
+        </p:nvSpPr>
+        <p:spPr/>
+      </p:sp>
+      <p:sp>
+        <p:nvSpPr>
+          <p:cNvPr id="3" name="Notes Placeholder 2"/>
+          <p:cNvSpPr>
+            <a:spLocks noGrp="1"/>
+          </p:cNvSpPr>
+          <p:nvPr>
+            <p:ph type="body" idx="1"/>
+          </p:nvPr>
+        </p:nvSpPr>
+        <p:spPr/>
+        <p:txBody>
+          <a:bodyPr/>
+          <a:lstStyle/>
+          <a:p>
+            <a:endParaRPr lang="en-US" dirty="0"/>
+          </a:p>
+        </p:txBody>
+      </p:sp>
+      <p:sp>
+        <p:nvSpPr>
+          <p:cNvPr id="4" name="Slide Number Placeholder 3"/>
+          <p:cNvSpPr>
+            <a:spLocks noGrp="1"/>
+          </p:cNvSpPr>
+          <p:nvPr>
+            <p:ph type="sldNum" sz="quarter" idx="10"/>
+          </p:nvPr>
+        </p:nvSpPr>
+        <p:spPr/>
+        <p:txBody>
+          <a:bodyPr/>
+          <a:lstStyle/>
+          <a:p>
+            <a:fld id="{4CFD207A-07DF-40AD-A916-9872E089CE7A}" type="slidenum">
+              <a:rPr lang="en-US" smtClean="0"/>
+              <a:t>5</a:t>
+            </a:fld>
+            <a:endParaRPr lang="en-US"/>
+          </a:p>
+        </p:txBody>
+      </p:sp>
+    </p:spTree>
+    <p:extLst>
+      <p:ext uri="{BB962C8B-B14F-4D97-AF65-F5344CB8AC3E}">
+        <p14:creationId xmlns:p14="http://schemas.microsoft.com/office/powerpoint/2010/main" val="2352229153"/>
+      </p:ext>
+    </p:extLst>
+  </p:cSld>
+  <p:clrMapOvr>
+    <a:masterClrMapping/>
+  </p:clrMapOvr>
+</p:notes>
+</file>
+
+<file path=ppt/notesSlides/notesSlide6.xml><?xml version="1.0" encoding="utf-8"?>
+<p:notes xmlns:a="http://schemas.openxmlformats.org/drawingml/2006/main" xmlns:r="http://schemas.openxmlformats.org/officeDocument/2006/relationships" xmlns:p="http://schemas.openxmlformats.org/presentationml/2006/main">
+  <p:cSld>
+    <p:spTree>
+      <p:nvGrpSpPr>
+        <p:cNvPr id="1" name=""/>
+        <p:cNvGrpSpPr/>
+        <p:nvPr/>
+      </p:nvGrpSpPr>
+      <p:grpSpPr>
+        <a:xfrm>
+          <a:off x="0" y="0"/>
+          <a:ext cx="0" cy="0"/>
+          <a:chOff x="0" y="0"/>
+          <a:chExt cx="0" cy="0"/>
+        </a:xfrm>
+      </p:grpSpPr>
+      <p:sp>
+        <p:nvSpPr>
+          <p:cNvPr id="2" name="Slide Image Placeholder 1"/>
+          <p:cNvSpPr>
+            <a:spLocks noGrp="1" noRot="1" noChangeAspect="1"/>
+          </p:cNvSpPr>
+          <p:nvPr>
+            <p:ph type="sldImg"/>
+          </p:nvPr>
+        </p:nvSpPr>
+        <p:spPr/>
+      </p:sp>
+      <p:sp>
+        <p:nvSpPr>
+          <p:cNvPr id="3" name="Notes Placeholder 2"/>
+          <p:cNvSpPr>
+            <a:spLocks noGrp="1"/>
+          </p:cNvSpPr>
+          <p:nvPr>
+            <p:ph type="body" idx="1"/>
+          </p:nvPr>
+        </p:nvSpPr>
+        <p:spPr/>
+        <p:txBody>
+          <a:bodyPr/>
+          <a:lstStyle/>
+          <a:p>
+            <a:endParaRPr lang="en-US" dirty="0"/>
+          </a:p>
+        </p:txBody>
+      </p:sp>
+      <p:sp>
+        <p:nvSpPr>
+          <p:cNvPr id="4" name="Slide Number Placeholder 3"/>
+          <p:cNvSpPr>
+            <a:spLocks noGrp="1"/>
+          </p:cNvSpPr>
+          <p:nvPr>
+            <p:ph type="sldNum" sz="quarter" idx="10"/>
+          </p:nvPr>
+        </p:nvSpPr>
+        <p:spPr/>
+        <p:txBody>
+          <a:bodyPr/>
+          <a:lstStyle/>
+          <a:p>
+            <a:fld id="{4CFD207A-07DF-40AD-A916-9872E089CE7A}" type="slidenum">
+              <a:rPr lang="en-US" smtClean="0"/>
+              <a:t>6</a:t>
+            </a:fld>
+            <a:endParaRPr lang="en-US"/>
+          </a:p>
+        </p:txBody>
+      </p:sp>
+    </p:spTree>
+    <p:extLst>
+      <p:ext uri="{BB962C8B-B14F-4D97-AF65-F5344CB8AC3E}">
+        <p14:creationId xmlns:p14="http://schemas.microsoft.com/office/powerpoint/2010/main" val="1821843673"/>
+      </p:ext>
+    </p:extLst>
+  </p:cSld>
+  <p:clrMapOvr>
+    <a:masterClrMapping/>
+  </p:clrMapOvr>
+</p:notes>
+</file>
+
+<file path=ppt/notesSlides/notesSlide7.xml><?xml version="1.0" encoding="utf-8"?>
+<p:notes xmlns:a="http://schemas.openxmlformats.org/drawingml/2006/main" xmlns:r="http://schemas.openxmlformats.org/officeDocument/2006/relationships" xmlns:p="http://schemas.openxmlformats.org/presentationml/2006/main">
+  <p:cSld>
+    <p:spTree>
+      <p:nvGrpSpPr>
+        <p:cNvPr id="1" name=""/>
+        <p:cNvGrpSpPr/>
+        <p:nvPr/>
+      </p:nvGrpSpPr>
+      <p:grpSpPr>
+        <a:xfrm>
+          <a:off x="0" y="0"/>
+          <a:ext cx="0" cy="0"/>
+          <a:chOff x="0" y="0"/>
+          <a:chExt cx="0" cy="0"/>
+        </a:xfrm>
+      </p:grpSpPr>
+      <p:sp>
+        <p:nvSpPr>
+          <p:cNvPr id="2" name="Slide Image Placeholder 1"/>
+          <p:cNvSpPr>
+            <a:spLocks noGrp="1" noRot="1" noChangeAspect="1"/>
+          </p:cNvSpPr>
+          <p:nvPr>
+            <p:ph type="sldImg"/>
+          </p:nvPr>
+        </p:nvSpPr>
+        <p:spPr/>
+      </p:sp>
+      <p:sp>
+        <p:nvSpPr>
+          <p:cNvPr id="3" name="Notes Placeholder 2"/>
+          <p:cNvSpPr>
+            <a:spLocks noGrp="1"/>
+          </p:cNvSpPr>
+          <p:nvPr>
+            <p:ph type="body" idx="1"/>
+          </p:nvPr>
+        </p:nvSpPr>
+        <p:spPr/>
+        <p:txBody>
+          <a:bodyPr/>
+          <a:lstStyle/>
+          <a:p>
+            <a:endParaRPr lang="en-US" dirty="0"/>
+          </a:p>
+        </p:txBody>
+      </p:sp>
+      <p:sp>
+        <p:nvSpPr>
+          <p:cNvPr id="4" name="Slide Number Placeholder 3"/>
+          <p:cNvSpPr>
+            <a:spLocks noGrp="1"/>
+          </p:cNvSpPr>
+          <p:nvPr>
+            <p:ph type="sldNum" sz="quarter" idx="10"/>
+          </p:nvPr>
+        </p:nvSpPr>
+        <p:spPr/>
+        <p:txBody>
+          <a:bodyPr/>
+          <a:lstStyle/>
+          <a:p>
+            <a:fld id="{4CFD207A-07DF-40AD-A916-9872E089CE7A}" type="slidenum">
+              <a:rPr lang="en-US" smtClean="0"/>
+              <a:t>7</a:t>
+            </a:fld>
+            <a:endParaRPr lang="en-US"/>
+          </a:p>
+        </p:txBody>
+      </p:sp>
+    </p:spTree>
+    <p:extLst>
+      <p:ext uri="{BB962C8B-B14F-4D97-AF65-F5344CB8AC3E}">
+        <p14:creationId xmlns:p14="http://schemas.microsoft.com/office/powerpoint/2010/main" val="1153985469"/>
+      </p:ext>
+    </p:extLst>
+  </p:cSld>
+  <p:clrMapOvr>
+    <a:masterClrMapping/>
+  </p:clrMapOvr>
+</p:notes>
+</file>
+
+<file path=ppt/notesSlides/notesSlide8.xml><?xml version="1.0" encoding="utf-8"?>
+<p:notes xmlns:a="http://schemas.openxmlformats.org/drawingml/2006/main" xmlns:r="http://schemas.openxmlformats.org/officeDocument/2006/relationships" xmlns:p="http://schemas.openxmlformats.org/presentationml/2006/main">
+  <p:cSld>
+    <p:spTree>
+      <p:nvGrpSpPr>
+        <p:cNvPr id="1" name=""/>
+        <p:cNvGrpSpPr/>
+        <p:nvPr/>
+      </p:nvGrpSpPr>
+      <p:grpSpPr>
+        <a:xfrm>
+          <a:off x="0" y="0"/>
+          <a:ext cx="0" cy="0"/>
+          <a:chOff x="0" y="0"/>
+          <a:chExt cx="0" cy="0"/>
+        </a:xfrm>
+      </p:grpSpPr>
+      <p:sp>
+        <p:nvSpPr>
+          <p:cNvPr id="2" name="Slide Image Placeholder 1"/>
+          <p:cNvSpPr>
+            <a:spLocks noGrp="1" noRot="1" noChangeAspect="1"/>
+          </p:cNvSpPr>
+          <p:nvPr>
+            <p:ph type="sldImg"/>
+          </p:nvPr>
+        </p:nvSpPr>
+        <p:spPr/>
+      </p:sp>
+      <p:sp>
+        <p:nvSpPr>
+          <p:cNvPr id="3" name="Notes Placeholder 2"/>
+          <p:cNvSpPr>
+            <a:spLocks noGrp="1"/>
+          </p:cNvSpPr>
+          <p:nvPr>
+            <p:ph type="body" idx="1"/>
+          </p:nvPr>
+        </p:nvSpPr>
+        <p:spPr/>
+        <p:txBody>
+          <a:bodyPr/>
+          <a:lstStyle/>
+          <a:p>
+            <a:pPr marL="0" indent="0">
+              <a:buFontTx/>
+              <a:buNone/>
+            </a:pPr>
+            <a:r>
+              <a:rPr lang="en-US" dirty="0" smtClean="0"/>
+              <a:t>Peripheral Concerns</a:t>
+            </a:r>
+          </a:p>
+          <a:p>
+            <a:pPr marL="171450" indent="-171450">
+              <a:buFontTx/>
+              <a:buChar char="-"/>
+            </a:pPr>
+            <a:r>
+              <a:rPr lang="en-US" dirty="0" smtClean="0"/>
+              <a:t>Media services</a:t>
+            </a:r>
+          </a:p>
+          <a:p>
+            <a:pPr marL="171450" indent="-171450">
+              <a:buFontTx/>
+              <a:buChar char="-"/>
+            </a:pPr>
+            <a:r>
+              <a:rPr lang="en-US" dirty="0" smtClean="0"/>
+              <a:t>Network information</a:t>
+            </a:r>
+          </a:p>
+          <a:p>
+            <a:pPr marL="171450" indent="-171450">
+              <a:buFontTx/>
+              <a:buChar char="-"/>
+            </a:pPr>
+            <a:r>
+              <a:rPr lang="en-US" dirty="0" smtClean="0"/>
+              <a:t>Source</a:t>
+            </a:r>
+            <a:r>
+              <a:rPr lang="en-US" baseline="0" dirty="0" smtClean="0"/>
+              <a:t> code</a:t>
+            </a:r>
+            <a:endParaRPr lang="en-US" dirty="0"/>
+          </a:p>
+        </p:txBody>
+      </p:sp>
+      <p:sp>
+        <p:nvSpPr>
+          <p:cNvPr id="4" name="Slide Number Placeholder 3"/>
+          <p:cNvSpPr>
+            <a:spLocks noGrp="1"/>
+          </p:cNvSpPr>
+          <p:nvPr>
+            <p:ph type="sldNum" sz="quarter" idx="10"/>
+          </p:nvPr>
+        </p:nvSpPr>
+        <p:spPr/>
+        <p:txBody>
+          <a:bodyPr/>
+          <a:lstStyle/>
+          <a:p>
+            <a:fld id="{4CFD207A-07DF-40AD-A916-9872E089CE7A}" type="slidenum">
+              <a:rPr lang="en-US" smtClean="0"/>
+              <a:t>8</a:t>
+            </a:fld>
+            <a:endParaRPr lang="en-US"/>
+          </a:p>
+        </p:txBody>
+      </p:sp>
+    </p:spTree>
+    <p:extLst>
+      <p:ext uri="{BB962C8B-B14F-4D97-AF65-F5344CB8AC3E}">
+        <p14:creationId xmlns:p14="http://schemas.microsoft.com/office/powerpoint/2010/main" val="1893233003"/>
+      </p:ext>
+    </p:extLst>
+  </p:cSld>
+  <p:clrMapOvr>
+    <a:masterClrMapping/>
+  </p:clrMapOvr>
+</p:notes>
+</file>
+
+<file path=ppt/notesSlides/notesSlide9.xml><?xml version="1.0" encoding="utf-8"?>
+<p:notes xmlns:a="http://schemas.openxmlformats.org/drawingml/2006/main" xmlns:r="http://schemas.openxmlformats.org/officeDocument/2006/relationships" xmlns:p="http://schemas.openxmlformats.org/presentationml/2006/main">
+  <p:cSld>
+    <p:spTree>
+      <p:nvGrpSpPr>
+        <p:cNvPr id="1" name=""/>
+        <p:cNvGrpSpPr/>
+        <p:nvPr/>
+      </p:nvGrpSpPr>
+      <p:grpSpPr>
+        <a:xfrm>
+          <a:off x="0" y="0"/>
+          <a:ext cx="0" cy="0"/>
+          <a:chOff x="0" y="0"/>
+          <a:chExt cx="0" cy="0"/>
+        </a:xfrm>
+      </p:grpSpPr>
+      <p:sp>
+        <p:nvSpPr>
+          <p:cNvPr id="2" name="Slide Image Placeholder 1"/>
+          <p:cNvSpPr>
+            <a:spLocks noGrp="1" noRot="1" noChangeAspect="1"/>
+          </p:cNvSpPr>
+          <p:nvPr>
+            <p:ph type="sldImg"/>
+          </p:nvPr>
+        </p:nvSpPr>
+        <p:spPr/>
+      </p:sp>
+      <p:sp>
+        <p:nvSpPr>
+          <p:cNvPr id="3" name="Notes Placeholder 2"/>
+          <p:cNvSpPr>
+            <a:spLocks noGrp="1"/>
+          </p:cNvSpPr>
+          <p:nvPr>
+            <p:ph type="body" idx="1"/>
+          </p:nvPr>
+        </p:nvSpPr>
+        <p:spPr/>
+        <p:txBody>
+          <a:bodyPr/>
+          <a:lstStyle/>
+          <a:p>
+            <a:r>
+              <a:rPr lang="en-US" dirty="0" smtClean="0"/>
+              <a:t>What are you trying to store?</a:t>
+            </a:r>
+          </a:p>
+          <a:p>
+            <a:r>
+              <a:rPr lang="en-US" dirty="0" smtClean="0"/>
+              <a:t>Don’t reinvent the wheel</a:t>
+            </a:r>
+          </a:p>
+          <a:p>
+            <a:r>
+              <a:rPr lang="en-US" dirty="0" smtClean="0"/>
+              <a:t>Find</a:t>
+            </a:r>
+            <a:r>
+              <a:rPr lang="en-US" baseline="0" dirty="0" smtClean="0"/>
+              <a:t> the right container</a:t>
+            </a:r>
+          </a:p>
+          <a:p>
+            <a:r>
+              <a:rPr lang="en-US" baseline="0" dirty="0" smtClean="0"/>
+              <a:t>Plan out your path, choose the affordable but most pragmatic approach</a:t>
+            </a:r>
+            <a:endParaRPr lang="en-US" dirty="0"/>
+          </a:p>
+        </p:txBody>
+      </p:sp>
+      <p:sp>
+        <p:nvSpPr>
+          <p:cNvPr id="4" name="Slide Number Placeholder 3"/>
+          <p:cNvSpPr>
+            <a:spLocks noGrp="1"/>
+          </p:cNvSpPr>
+          <p:nvPr>
+            <p:ph type="sldNum" sz="quarter" idx="10"/>
+          </p:nvPr>
+        </p:nvSpPr>
+        <p:spPr/>
+        <p:txBody>
+          <a:bodyPr/>
+          <a:lstStyle/>
+          <a:p>
+            <a:fld id="{4CFD207A-07DF-40AD-A916-9872E089CE7A}" type="slidenum">
+              <a:rPr lang="en-US" smtClean="0"/>
+              <a:t>9</a:t>
+            </a:fld>
+            <a:endParaRPr lang="en-US"/>
+          </a:p>
+        </p:txBody>
+      </p:sp>
+    </p:spTree>
+    <p:extLst>
+      <p:ext uri="{BB962C8B-B14F-4D97-AF65-F5344CB8AC3E}">
+        <p14:creationId xmlns:p14="http://schemas.microsoft.com/office/powerpoint/2010/main" val="3357417595"/>
       </p:ext>
     </p:extLst>
   </p:cSld>
@@ -3748,6 +4411,721 @@
 </p:sld>
 </file>
 
+<file path=ppt/slides/slide10.xml><?xml version="1.0" encoding="utf-8"?>
+<p:sld xmlns:a="http://schemas.openxmlformats.org/drawingml/2006/main" xmlns:r="http://schemas.openxmlformats.org/officeDocument/2006/relationships" xmlns:p="http://schemas.openxmlformats.org/presentationml/2006/main">
+  <p:cSld>
+    <p:spTree>
+      <p:nvGrpSpPr>
+        <p:cNvPr id="1" name=""/>
+        <p:cNvGrpSpPr/>
+        <p:nvPr/>
+      </p:nvGrpSpPr>
+      <p:grpSpPr>
+        <a:xfrm>
+          <a:off x="0" y="0"/>
+          <a:ext cx="0" cy="0"/>
+          <a:chOff x="0" y="0"/>
+          <a:chExt cx="0" cy="0"/>
+        </a:xfrm>
+      </p:grpSpPr>
+      <p:sp>
+        <p:nvSpPr>
+          <p:cNvPr id="2" name="Title 1"/>
+          <p:cNvSpPr>
+            <a:spLocks noGrp="1"/>
+          </p:cNvSpPr>
+          <p:nvPr>
+            <p:ph type="title"/>
+          </p:nvPr>
+        </p:nvSpPr>
+        <p:spPr/>
+        <p:txBody>
+          <a:bodyPr/>
+          <a:lstStyle/>
+          <a:p>
+            <a:r>
+              <a:rPr lang="en-US" dirty="0" err="1"/>
+              <a:t>i</a:t>
+            </a:r>
+            <a:r>
+              <a:rPr lang="en-US" dirty="0" err="1" smtClean="0"/>
+              <a:t>magenomnom</a:t>
+            </a:r>
+            <a:r>
+              <a:rPr lang="en-US" dirty="0" smtClean="0"/>
+              <a:t> Storage Concerns</a:t>
+            </a:r>
+            <a:endParaRPr lang="en-US" dirty="0"/>
+          </a:p>
+        </p:txBody>
+      </p:sp>
+      <p:sp>
+        <p:nvSpPr>
+          <p:cNvPr id="3" name="Content Placeholder 2"/>
+          <p:cNvSpPr>
+            <a:spLocks noGrp="1"/>
+          </p:cNvSpPr>
+          <p:nvPr>
+            <p:ph sz="quarter" idx="10"/>
+          </p:nvPr>
+        </p:nvSpPr>
+        <p:spPr>
+          <a:xfrm>
+            <a:off x="379514" y="1099971"/>
+            <a:ext cx="11525250" cy="4825962"/>
+          </a:xfrm>
+        </p:spPr>
+        <p:txBody>
+          <a:bodyPr/>
+          <a:lstStyle/>
+          <a:p>
+            <a:r>
+              <a:rPr lang="en-US" sz="2800" dirty="0" smtClean="0"/>
+              <a:t>User credentials</a:t>
+            </a:r>
+          </a:p>
+          <a:p>
+            <a:pPr lvl="1"/>
+            <a:r>
+              <a:rPr lang="en-US" sz="2400" dirty="0" smtClean="0"/>
+              <a:t>SQL Database</a:t>
+            </a:r>
+          </a:p>
+          <a:p>
+            <a:r>
+              <a:rPr lang="en-US" sz="2800" dirty="0" smtClean="0"/>
+              <a:t>Images</a:t>
+            </a:r>
+          </a:p>
+          <a:p>
+            <a:pPr lvl="1"/>
+            <a:r>
+              <a:rPr lang="en-US" sz="2400" dirty="0" smtClean="0"/>
+              <a:t>Blob Storage</a:t>
+            </a:r>
+          </a:p>
+          <a:p>
+            <a:r>
+              <a:rPr lang="en-US" sz="2800" dirty="0" smtClean="0"/>
+              <a:t>Image Metadata</a:t>
+            </a:r>
+          </a:p>
+          <a:p>
+            <a:pPr lvl="1"/>
+            <a:r>
+              <a:rPr lang="en-US" sz="2400" dirty="0" smtClean="0"/>
+              <a:t>Table Storage</a:t>
+            </a:r>
+          </a:p>
+          <a:p>
+            <a:r>
+              <a:rPr lang="en-US" sz="2800" dirty="0" smtClean="0"/>
+              <a:t>Logging information</a:t>
+            </a:r>
+          </a:p>
+          <a:p>
+            <a:pPr lvl="1"/>
+            <a:r>
+              <a:rPr lang="en-US" sz="2400" dirty="0" smtClean="0"/>
+              <a:t>Elastic Search</a:t>
+            </a:r>
+          </a:p>
+          <a:p>
+            <a:r>
+              <a:rPr lang="en-US" sz="2800" dirty="0" smtClean="0"/>
+              <a:t>Sign-up processing</a:t>
+            </a:r>
+          </a:p>
+          <a:p>
+            <a:pPr lvl="1"/>
+            <a:r>
+              <a:rPr lang="en-US" sz="2400" dirty="0" smtClean="0"/>
+              <a:t>Storage Queue</a:t>
+            </a:r>
+            <a:endParaRPr lang="en-US" sz="2400" dirty="0"/>
+          </a:p>
+        </p:txBody>
+      </p:sp>
+      <p:sp>
+        <p:nvSpPr>
+          <p:cNvPr id="4" name="TextBox 3"/>
+          <p:cNvSpPr txBox="1"/>
+          <p:nvPr/>
+        </p:nvSpPr>
+        <p:spPr>
+          <a:xfrm>
+            <a:off x="9906000" y="-1"/>
+            <a:ext cx="2286000" cy="2031325"/>
+          </a:xfrm>
+          <a:prstGeom prst="rect">
+            <a:avLst/>
+          </a:prstGeom>
+          <a:solidFill>
+            <a:srgbClr val="FFFF00"/>
+          </a:solidFill>
+          <a:ln>
+            <a:noFill/>
+          </a:ln>
+        </p:spPr>
+        <p:txBody>
+          <a:bodyPr wrap="square" rtlCol="0">
+            <a:spAutoFit/>
+          </a:bodyPr>
+          <a:lstStyle/>
+          <a:p>
+            <a:pPr algn="ctr"/>
+            <a:endParaRPr lang="en-US" dirty="0" smtClean="0"/>
+          </a:p>
+          <a:p>
+            <a:pPr algn="ctr"/>
+            <a:endParaRPr lang="en-US" dirty="0"/>
+          </a:p>
+          <a:p>
+            <a:pPr algn="ctr"/>
+            <a:r>
+              <a:rPr lang="en-US" dirty="0" smtClean="0"/>
+              <a:t>Please leave this area blank to allow for picture in picture recording</a:t>
+            </a:r>
+          </a:p>
+          <a:p>
+            <a:pPr algn="ctr"/>
+            <a:endParaRPr lang="en-US" dirty="0"/>
+          </a:p>
+        </p:txBody>
+      </p:sp>
+    </p:spTree>
+    <p:extLst>
+      <p:ext uri="{BB962C8B-B14F-4D97-AF65-F5344CB8AC3E}">
+        <p14:creationId xmlns:p14="http://schemas.microsoft.com/office/powerpoint/2010/main" val="2059098654"/>
+      </p:ext>
+    </p:extLst>
+  </p:cSld>
+  <p:clrMapOvr>
+    <a:masterClrMapping/>
+  </p:clrMapOvr>
+  <p:timing>
+    <p:tnLst>
+      <p:par>
+        <p:cTn id="1" dur="indefinite" restart="never" nodeType="tmRoot">
+          <p:childTnLst>
+            <p:seq concurrent="1" nextAc="seek">
+              <p:cTn id="2" dur="indefinite" nodeType="mainSeq">
+                <p:childTnLst>
+                  <p:par>
+                    <p:cTn id="3" fill="hold">
+                      <p:stCondLst>
+                        <p:cond delay="indefinite"/>
+                      </p:stCondLst>
+                      <p:childTnLst>
+                        <p:par>
+                          <p:cTn id="4" fill="hold">
+                            <p:stCondLst>
+                              <p:cond delay="0"/>
+                            </p:stCondLst>
+                            <p:childTnLst>
+                              <p:par>
+                                <p:cTn id="5" presetID="1" presetClass="entr" presetSubtype="0" fill="hold" nodeType="clickEffect">
+                                  <p:stCondLst>
+                                    <p:cond delay="0"/>
+                                  </p:stCondLst>
+                                  <p:childTnLst>
+                                    <p:set>
+                                      <p:cBhvr>
+                                        <p:cTn id="6" dur="1" fill="hold">
+                                          <p:stCondLst>
+                                            <p:cond delay="0"/>
+                                          </p:stCondLst>
+                                        </p:cTn>
+                                        <p:tgtEl>
+                                          <p:spTgt spid="3">
+                                            <p:txEl>
+                                              <p:pRg st="0" end="0"/>
+                                            </p:txEl>
+                                          </p:spTgt>
+                                        </p:tgtEl>
+                                        <p:attrNameLst>
+                                          <p:attrName>style.visibility</p:attrName>
+                                        </p:attrNameLst>
+                                      </p:cBhvr>
+                                      <p:to>
+                                        <p:strVal val="visible"/>
+                                      </p:to>
+                                    </p:set>
+                                  </p:childTnLst>
+                                </p:cTn>
+                              </p:par>
+                            </p:childTnLst>
+                          </p:cTn>
+                        </p:par>
+                      </p:childTnLst>
+                    </p:cTn>
+                  </p:par>
+                  <p:par>
+                    <p:cTn id="7" fill="hold">
+                      <p:stCondLst>
+                        <p:cond delay="indefinite"/>
+                      </p:stCondLst>
+                      <p:childTnLst>
+                        <p:par>
+                          <p:cTn id="8" fill="hold">
+                            <p:stCondLst>
+                              <p:cond delay="0"/>
+                            </p:stCondLst>
+                            <p:childTnLst>
+                              <p:par>
+                                <p:cTn id="9" presetID="1" presetClass="entr" presetSubtype="0" fill="hold" nodeType="clickEffect">
+                                  <p:stCondLst>
+                                    <p:cond delay="0"/>
+                                  </p:stCondLst>
+                                  <p:childTnLst>
+                                    <p:set>
+                                      <p:cBhvr>
+                                        <p:cTn id="10" dur="1" fill="hold">
+                                          <p:stCondLst>
+                                            <p:cond delay="0"/>
+                                          </p:stCondLst>
+                                        </p:cTn>
+                                        <p:tgtEl>
+                                          <p:spTgt spid="3">
+                                            <p:txEl>
+                                              <p:pRg st="1" end="1"/>
+                                            </p:txEl>
+                                          </p:spTgt>
+                                        </p:tgtEl>
+                                        <p:attrNameLst>
+                                          <p:attrName>style.visibility</p:attrName>
+                                        </p:attrNameLst>
+                                      </p:cBhvr>
+                                      <p:to>
+                                        <p:strVal val="visible"/>
+                                      </p:to>
+                                    </p:set>
+                                  </p:childTnLst>
+                                </p:cTn>
+                              </p:par>
+                            </p:childTnLst>
+                          </p:cTn>
+                        </p:par>
+                      </p:childTnLst>
+                    </p:cTn>
+                  </p:par>
+                  <p:par>
+                    <p:cTn id="11" fill="hold">
+                      <p:stCondLst>
+                        <p:cond delay="indefinite"/>
+                      </p:stCondLst>
+                      <p:childTnLst>
+                        <p:par>
+                          <p:cTn id="12" fill="hold">
+                            <p:stCondLst>
+                              <p:cond delay="0"/>
+                            </p:stCondLst>
+                            <p:childTnLst>
+                              <p:par>
+                                <p:cTn id="13" presetID="1" presetClass="entr" presetSubtype="0" fill="hold" nodeType="clickEffect">
+                                  <p:stCondLst>
+                                    <p:cond delay="0"/>
+                                  </p:stCondLst>
+                                  <p:childTnLst>
+                                    <p:set>
+                                      <p:cBhvr>
+                                        <p:cTn id="14" dur="1" fill="hold">
+                                          <p:stCondLst>
+                                            <p:cond delay="0"/>
+                                          </p:stCondLst>
+                                        </p:cTn>
+                                        <p:tgtEl>
+                                          <p:spTgt spid="3">
+                                            <p:txEl>
+                                              <p:pRg st="2" end="2"/>
+                                            </p:txEl>
+                                          </p:spTgt>
+                                        </p:tgtEl>
+                                        <p:attrNameLst>
+                                          <p:attrName>style.visibility</p:attrName>
+                                        </p:attrNameLst>
+                                      </p:cBhvr>
+                                      <p:to>
+                                        <p:strVal val="visible"/>
+                                      </p:to>
+                                    </p:set>
+                                  </p:childTnLst>
+                                </p:cTn>
+                              </p:par>
+                            </p:childTnLst>
+                          </p:cTn>
+                        </p:par>
+                      </p:childTnLst>
+                    </p:cTn>
+                  </p:par>
+                  <p:par>
+                    <p:cTn id="15" fill="hold">
+                      <p:stCondLst>
+                        <p:cond delay="indefinite"/>
+                      </p:stCondLst>
+                      <p:childTnLst>
+                        <p:par>
+                          <p:cTn id="16" fill="hold">
+                            <p:stCondLst>
+                              <p:cond delay="0"/>
+                            </p:stCondLst>
+                            <p:childTnLst>
+                              <p:par>
+                                <p:cTn id="17" presetID="1" presetClass="entr" presetSubtype="0" fill="hold" nodeType="clickEffect">
+                                  <p:stCondLst>
+                                    <p:cond delay="0"/>
+                                  </p:stCondLst>
+                                  <p:childTnLst>
+                                    <p:set>
+                                      <p:cBhvr>
+                                        <p:cTn id="18" dur="1" fill="hold">
+                                          <p:stCondLst>
+                                            <p:cond delay="0"/>
+                                          </p:stCondLst>
+                                        </p:cTn>
+                                        <p:tgtEl>
+                                          <p:spTgt spid="3">
+                                            <p:txEl>
+                                              <p:pRg st="3" end="3"/>
+                                            </p:txEl>
+                                          </p:spTgt>
+                                        </p:tgtEl>
+                                        <p:attrNameLst>
+                                          <p:attrName>style.visibility</p:attrName>
+                                        </p:attrNameLst>
+                                      </p:cBhvr>
+                                      <p:to>
+                                        <p:strVal val="visible"/>
+                                      </p:to>
+                                    </p:set>
+                                  </p:childTnLst>
+                                </p:cTn>
+                              </p:par>
+                            </p:childTnLst>
+                          </p:cTn>
+                        </p:par>
+                      </p:childTnLst>
+                    </p:cTn>
+                  </p:par>
+                  <p:par>
+                    <p:cTn id="19" fill="hold">
+                      <p:stCondLst>
+                        <p:cond delay="indefinite"/>
+                      </p:stCondLst>
+                      <p:childTnLst>
+                        <p:par>
+                          <p:cTn id="20" fill="hold">
+                            <p:stCondLst>
+                              <p:cond delay="0"/>
+                            </p:stCondLst>
+                            <p:childTnLst>
+                              <p:par>
+                                <p:cTn id="21" presetID="1" presetClass="entr" presetSubtype="0" fill="hold" nodeType="clickEffect">
+                                  <p:stCondLst>
+                                    <p:cond delay="0"/>
+                                  </p:stCondLst>
+                                  <p:childTnLst>
+                                    <p:set>
+                                      <p:cBhvr>
+                                        <p:cTn id="22" dur="1" fill="hold">
+                                          <p:stCondLst>
+                                            <p:cond delay="0"/>
+                                          </p:stCondLst>
+                                        </p:cTn>
+                                        <p:tgtEl>
+                                          <p:spTgt spid="3">
+                                            <p:txEl>
+                                              <p:pRg st="4" end="4"/>
+                                            </p:txEl>
+                                          </p:spTgt>
+                                        </p:tgtEl>
+                                        <p:attrNameLst>
+                                          <p:attrName>style.visibility</p:attrName>
+                                        </p:attrNameLst>
+                                      </p:cBhvr>
+                                      <p:to>
+                                        <p:strVal val="visible"/>
+                                      </p:to>
+                                    </p:set>
+                                  </p:childTnLst>
+                                </p:cTn>
+                              </p:par>
+                            </p:childTnLst>
+                          </p:cTn>
+                        </p:par>
+                      </p:childTnLst>
+                    </p:cTn>
+                  </p:par>
+                  <p:par>
+                    <p:cTn id="23" fill="hold">
+                      <p:stCondLst>
+                        <p:cond delay="indefinite"/>
+                      </p:stCondLst>
+                      <p:childTnLst>
+                        <p:par>
+                          <p:cTn id="24" fill="hold">
+                            <p:stCondLst>
+                              <p:cond delay="0"/>
+                            </p:stCondLst>
+                            <p:childTnLst>
+                              <p:par>
+                                <p:cTn id="25" presetID="1" presetClass="entr" presetSubtype="0" fill="hold" nodeType="clickEffect">
+                                  <p:stCondLst>
+                                    <p:cond delay="0"/>
+                                  </p:stCondLst>
+                                  <p:childTnLst>
+                                    <p:set>
+                                      <p:cBhvr>
+                                        <p:cTn id="26" dur="1" fill="hold">
+                                          <p:stCondLst>
+                                            <p:cond delay="0"/>
+                                          </p:stCondLst>
+                                        </p:cTn>
+                                        <p:tgtEl>
+                                          <p:spTgt spid="3">
+                                            <p:txEl>
+                                              <p:pRg st="5" end="5"/>
+                                            </p:txEl>
+                                          </p:spTgt>
+                                        </p:tgtEl>
+                                        <p:attrNameLst>
+                                          <p:attrName>style.visibility</p:attrName>
+                                        </p:attrNameLst>
+                                      </p:cBhvr>
+                                      <p:to>
+                                        <p:strVal val="visible"/>
+                                      </p:to>
+                                    </p:set>
+                                  </p:childTnLst>
+                                </p:cTn>
+                              </p:par>
+                            </p:childTnLst>
+                          </p:cTn>
+                        </p:par>
+                      </p:childTnLst>
+                    </p:cTn>
+                  </p:par>
+                  <p:par>
+                    <p:cTn id="27" fill="hold">
+                      <p:stCondLst>
+                        <p:cond delay="indefinite"/>
+                      </p:stCondLst>
+                      <p:childTnLst>
+                        <p:par>
+                          <p:cTn id="28" fill="hold">
+                            <p:stCondLst>
+                              <p:cond delay="0"/>
+                            </p:stCondLst>
+                            <p:childTnLst>
+                              <p:par>
+                                <p:cTn id="29" presetID="1" presetClass="entr" presetSubtype="0" fill="hold" nodeType="clickEffect">
+                                  <p:stCondLst>
+                                    <p:cond delay="0"/>
+                                  </p:stCondLst>
+                                  <p:childTnLst>
+                                    <p:set>
+                                      <p:cBhvr>
+                                        <p:cTn id="30" dur="1" fill="hold">
+                                          <p:stCondLst>
+                                            <p:cond delay="0"/>
+                                          </p:stCondLst>
+                                        </p:cTn>
+                                        <p:tgtEl>
+                                          <p:spTgt spid="3">
+                                            <p:txEl>
+                                              <p:pRg st="6" end="6"/>
+                                            </p:txEl>
+                                          </p:spTgt>
+                                        </p:tgtEl>
+                                        <p:attrNameLst>
+                                          <p:attrName>style.visibility</p:attrName>
+                                        </p:attrNameLst>
+                                      </p:cBhvr>
+                                      <p:to>
+                                        <p:strVal val="visible"/>
+                                      </p:to>
+                                    </p:set>
+                                  </p:childTnLst>
+                                </p:cTn>
+                              </p:par>
+                            </p:childTnLst>
+                          </p:cTn>
+                        </p:par>
+                      </p:childTnLst>
+                    </p:cTn>
+                  </p:par>
+                  <p:par>
+                    <p:cTn id="31" fill="hold">
+                      <p:stCondLst>
+                        <p:cond delay="indefinite"/>
+                      </p:stCondLst>
+                      <p:childTnLst>
+                        <p:par>
+                          <p:cTn id="32" fill="hold">
+                            <p:stCondLst>
+                              <p:cond delay="0"/>
+                            </p:stCondLst>
+                            <p:childTnLst>
+                              <p:par>
+                                <p:cTn id="33" presetID="1" presetClass="entr" presetSubtype="0" fill="hold" nodeType="clickEffect">
+                                  <p:stCondLst>
+                                    <p:cond delay="0"/>
+                                  </p:stCondLst>
+                                  <p:childTnLst>
+                                    <p:set>
+                                      <p:cBhvr>
+                                        <p:cTn id="34" dur="1" fill="hold">
+                                          <p:stCondLst>
+                                            <p:cond delay="0"/>
+                                          </p:stCondLst>
+                                        </p:cTn>
+                                        <p:tgtEl>
+                                          <p:spTgt spid="3">
+                                            <p:txEl>
+                                              <p:pRg st="7" end="7"/>
+                                            </p:txEl>
+                                          </p:spTgt>
+                                        </p:tgtEl>
+                                        <p:attrNameLst>
+                                          <p:attrName>style.visibility</p:attrName>
+                                        </p:attrNameLst>
+                                      </p:cBhvr>
+                                      <p:to>
+                                        <p:strVal val="visible"/>
+                                      </p:to>
+                                    </p:set>
+                                  </p:childTnLst>
+                                </p:cTn>
+                              </p:par>
+                            </p:childTnLst>
+                          </p:cTn>
+                        </p:par>
+                      </p:childTnLst>
+                    </p:cTn>
+                  </p:par>
+                  <p:par>
+                    <p:cTn id="35" fill="hold">
+                      <p:stCondLst>
+                        <p:cond delay="indefinite"/>
+                      </p:stCondLst>
+                      <p:childTnLst>
+                        <p:par>
+                          <p:cTn id="36" fill="hold">
+                            <p:stCondLst>
+                              <p:cond delay="0"/>
+                            </p:stCondLst>
+                            <p:childTnLst>
+                              <p:par>
+                                <p:cTn id="37" presetID="1" presetClass="entr" presetSubtype="0" fill="hold" nodeType="clickEffect">
+                                  <p:stCondLst>
+                                    <p:cond delay="0"/>
+                                  </p:stCondLst>
+                                  <p:childTnLst>
+                                    <p:set>
+                                      <p:cBhvr>
+                                        <p:cTn id="38" dur="1" fill="hold">
+                                          <p:stCondLst>
+                                            <p:cond delay="0"/>
+                                          </p:stCondLst>
+                                        </p:cTn>
+                                        <p:tgtEl>
+                                          <p:spTgt spid="3">
+                                            <p:txEl>
+                                              <p:pRg st="8" end="8"/>
+                                            </p:txEl>
+                                          </p:spTgt>
+                                        </p:tgtEl>
+                                        <p:attrNameLst>
+                                          <p:attrName>style.visibility</p:attrName>
+                                        </p:attrNameLst>
+                                      </p:cBhvr>
+                                      <p:to>
+                                        <p:strVal val="visible"/>
+                                      </p:to>
+                                    </p:set>
+                                  </p:childTnLst>
+                                </p:cTn>
+                              </p:par>
+                            </p:childTnLst>
+                          </p:cTn>
+                        </p:par>
+                      </p:childTnLst>
+                    </p:cTn>
+                  </p:par>
+                  <p:par>
+                    <p:cTn id="39" fill="hold">
+                      <p:stCondLst>
+                        <p:cond delay="indefinite"/>
+                      </p:stCondLst>
+                      <p:childTnLst>
+                        <p:par>
+                          <p:cTn id="40" fill="hold">
+                            <p:stCondLst>
+                              <p:cond delay="0"/>
+                            </p:stCondLst>
+                            <p:childTnLst>
+                              <p:par>
+                                <p:cTn id="41" presetID="1" presetClass="entr" presetSubtype="0" fill="hold" nodeType="clickEffect">
+                                  <p:stCondLst>
+                                    <p:cond delay="0"/>
+                                  </p:stCondLst>
+                                  <p:childTnLst>
+                                    <p:set>
+                                      <p:cBhvr>
+                                        <p:cTn id="42" dur="1" fill="hold">
+                                          <p:stCondLst>
+                                            <p:cond delay="0"/>
+                                          </p:stCondLst>
+                                        </p:cTn>
+                                        <p:tgtEl>
+                                          <p:spTgt spid="3">
+                                            <p:txEl>
+                                              <p:pRg st="9" end="9"/>
+                                            </p:txEl>
+                                          </p:spTgt>
+                                        </p:tgtEl>
+                                        <p:attrNameLst>
+                                          <p:attrName>style.visibility</p:attrName>
+                                        </p:attrNameLst>
+                                      </p:cBhvr>
+                                      <p:to>
+                                        <p:strVal val="visible"/>
+                                      </p:to>
+                                    </p:set>
+                                  </p:childTnLst>
+                                </p:cTn>
+                              </p:par>
+                            </p:childTnLst>
+                          </p:cTn>
+                        </p:par>
+                      </p:childTnLst>
+                    </p:cTn>
+                  </p:par>
+                </p:childTnLst>
+              </p:cTn>
+              <p:prevCondLst>
+                <p:cond evt="onPrev" delay="0">
+                  <p:tgtEl>
+                    <p:sldTgt/>
+                  </p:tgtEl>
+                </p:cond>
+              </p:prevCondLst>
+              <p:nextCondLst>
+                <p:cond evt="onNext" delay="0">
+                  <p:tgtEl>
+                    <p:sldTgt/>
+                  </p:tgtEl>
+                </p:cond>
+              </p:nextCondLst>
+            </p:seq>
+          </p:childTnLst>
+        </p:cTn>
+      </p:par>
+    </p:tnLst>
+  </p:timing>
+</p:sld>
+</file>
+
 <file path=ppt/slides/slide2.xml><?xml version="1.0" encoding="utf-8"?>
 <p:sld xmlns:a="http://schemas.openxmlformats.org/drawingml/2006/main" xmlns:r="http://schemas.openxmlformats.org/officeDocument/2006/relationships" xmlns:p="http://schemas.openxmlformats.org/presentationml/2006/main">
   <p:cSld>
@@ -3784,19 +5162,25 @@
           <a:p>
             <a:r>
               <a:rPr lang="en-GB" dirty="0" smtClean="0"/>
-              <a:t>Topic One</a:t>
-            </a:r>
+              <a:t>Examine the different types of storage</a:t>
+            </a:r>
+            <a:endParaRPr lang="en-GB" dirty="0" smtClean="0"/>
           </a:p>
           <a:p>
             <a:r>
               <a:rPr lang="en-GB" dirty="0" smtClean="0"/>
-              <a:t>Topic Two</a:t>
-            </a:r>
+              <a:t>Brief discussion on usage scenarios</a:t>
+            </a:r>
+            <a:endParaRPr lang="en-GB" dirty="0" smtClean="0"/>
           </a:p>
           <a:p>
             <a:r>
               <a:rPr lang="en-GB" dirty="0" smtClean="0"/>
-              <a:t>Topic Three</a:t>
+              <a:t>Walkthrough of storage usage in </a:t>
+            </a:r>
+            <a:r>
+              <a:rPr lang="en-GB" dirty="0" err="1" smtClean="0"/>
+              <a:t>imagenomnom</a:t>
             </a:r>
             <a:endParaRPr lang="en-GB" dirty="0"/>
           </a:p>
@@ -3820,38 +5204,6 @@
             <a:r>
               <a:rPr lang="en-US" smtClean="0"/>
               <a:t>Module Overview</a:t>
-            </a:r>
-            <a:endParaRPr lang="en-US" dirty="0"/>
-          </a:p>
-        </p:txBody>
-      </p:sp>
-      <p:sp>
-        <p:nvSpPr>
-          <p:cNvPr id="4" name="TextBox 3"/>
-          <p:cNvSpPr txBox="1"/>
-          <p:nvPr/>
-        </p:nvSpPr>
-        <p:spPr>
-          <a:xfrm>
-            <a:off x="4432363" y="1155171"/>
-            <a:ext cx="3671248" cy="646331"/>
-          </a:xfrm>
-          <a:prstGeom prst="rect">
-            <a:avLst/>
-          </a:prstGeom>
-          <a:solidFill>
-            <a:srgbClr val="FFFF00"/>
-          </a:solidFill>
-        </p:spPr>
-        <p:txBody>
-          <a:bodyPr wrap="square" rtlCol="0">
-            <a:spAutoFit/>
-          </a:bodyPr>
-          <a:lstStyle/>
-          <a:p>
-            <a:r>
-              <a:rPr lang="en-US" dirty="0" smtClean="0"/>
-              <a:t>Please make sure there’s a “Module Overview” slide for every module</a:t>
             </a:r>
             <a:endParaRPr lang="en-US" dirty="0"/>
           </a:p>
@@ -3958,7 +5310,7 @@
           <a:p>
             <a:r>
               <a:rPr lang="en-US" dirty="0" smtClean="0"/>
-              <a:t>Lesson slide</a:t>
+              <a:t>Storage Types</a:t>
             </a:r>
             <a:endParaRPr lang="en-US" dirty="0"/>
           </a:p>
@@ -3974,11 +5326,50 @@
             <p:ph sz="quarter" idx="10"/>
           </p:nvPr>
         </p:nvSpPr>
-        <p:spPr/>
+        <p:spPr>
+          <a:xfrm>
+            <a:off x="379414" y="1388226"/>
+            <a:ext cx="4179140" cy="5290388"/>
+          </a:xfrm>
+        </p:spPr>
         <p:txBody>
           <a:bodyPr/>
           <a:lstStyle/>
           <a:p>
+            <a:r>
+              <a:rPr lang="en-US" b="1" dirty="0" smtClean="0"/>
+              <a:t>Security</a:t>
+            </a:r>
+          </a:p>
+          <a:p>
+            <a:r>
+              <a:rPr lang="en-US" dirty="0" smtClean="0"/>
+              <a:t>Integration</a:t>
+            </a:r>
+          </a:p>
+          <a:p>
+            <a:r>
+              <a:rPr lang="en-US" dirty="0" smtClean="0"/>
+              <a:t>Analytics</a:t>
+            </a:r>
+          </a:p>
+          <a:p>
+            <a:r>
+              <a:rPr lang="en-US" dirty="0" smtClean="0"/>
+              <a:t>Data</a:t>
+            </a:r>
+          </a:p>
+          <a:p>
+            <a:r>
+              <a:rPr lang="en-US" dirty="0" smtClean="0"/>
+              <a:t>Plain Old Storage</a:t>
+            </a:r>
+          </a:p>
+          <a:p>
+            <a:r>
+              <a:rPr lang="en-US" dirty="0" smtClean="0"/>
+              <a:t>Peripheral Concerns</a:t>
+            </a:r>
             <a:endParaRPr lang="en-US" dirty="0"/>
           </a:p>
         </p:txBody>
@@ -4030,6 +5421,195 @@
           </a:p>
         </p:txBody>
       </p:sp>
+      <p:sp>
+        <p:nvSpPr>
+          <p:cNvPr id="5" name="Content Placeholder 2"/>
+          <p:cNvSpPr txBox="1">
+            <a:spLocks/>
+          </p:cNvSpPr>
+          <p:nvPr/>
+        </p:nvSpPr>
+        <p:spPr>
+          <a:xfrm>
+            <a:off x="5486400" y="1388226"/>
+            <a:ext cx="3862605" cy="1462550"/>
+          </a:xfrm>
+          <a:prstGeom prst="rect">
+            <a:avLst/>
+          </a:prstGeom>
+          <a:solidFill>
+            <a:schemeClr val="accent3">
+              <a:lumMod val="20000"/>
+              <a:lumOff val="80000"/>
+            </a:schemeClr>
+          </a:solidFill>
+        </p:spPr>
+        <p:txBody>
+          <a:bodyPr/>
+          <a:lstStyle>
+            <a:lvl1pPr marL="342783" indent="-342783" algn="l" defTabSz="914088" rtl="0" eaLnBrk="1" latinLnBrk="0" hangingPunct="1">
+              <a:spcBef>
+                <a:spcPts val="1400"/>
+              </a:spcBef>
+              <a:buFont typeface="Arial" pitchFamily="34" charset="0"/>
+              <a:buChar char="•"/>
+              <a:defRPr sz="3200" b="0" kern="0" baseline="0">
+                <a:solidFill>
+                  <a:schemeClr val="tx1"/>
+                </a:solidFill>
+                <a:latin typeface="Segoe UI Light" panose="020B0502040204020203" pitchFamily="34" charset="0"/>
+                <a:ea typeface="Segoe UI Light" panose="020B0502040204020203" pitchFamily="34" charset="0"/>
+                <a:cs typeface="Segoe UI Light" panose="020B0502040204020203" pitchFamily="34" charset="0"/>
+              </a:defRPr>
+            </a:lvl1pPr>
+            <a:lvl2pPr marL="742698" indent="-285652" algn="l" defTabSz="914088" rtl="0" eaLnBrk="1" latinLnBrk="0" hangingPunct="1">
+              <a:spcBef>
+                <a:spcPts val="300"/>
+              </a:spcBef>
+              <a:spcAft>
+                <a:spcPts val="300"/>
+              </a:spcAft>
+              <a:buFont typeface="Arial" pitchFamily="34" charset="0"/>
+              <a:buChar char="–"/>
+              <a:defRPr sz="2800" kern="0" baseline="0">
+                <a:solidFill>
+                  <a:schemeClr val="tx1"/>
+                </a:solidFill>
+                <a:latin typeface="Segoe UI Light" panose="020B0502040204020203" pitchFamily="34" charset="0"/>
+                <a:ea typeface="Segoe UI Light" panose="020B0502040204020203" pitchFamily="34" charset="0"/>
+                <a:cs typeface="Segoe UI Light" panose="020B0502040204020203" pitchFamily="34" charset="0"/>
+              </a:defRPr>
+            </a:lvl2pPr>
+            <a:lvl3pPr marL="1142612" indent="-228522" algn="l" defTabSz="914088" rtl="0" eaLnBrk="1" latinLnBrk="0" hangingPunct="1">
+              <a:spcBef>
+                <a:spcPts val="200"/>
+              </a:spcBef>
+              <a:spcAft>
+                <a:spcPts val="200"/>
+              </a:spcAft>
+              <a:buFont typeface="Arial" pitchFamily="34" charset="0"/>
+              <a:buChar char="•"/>
+              <a:defRPr sz="2400" kern="0" baseline="0">
+                <a:solidFill>
+                  <a:schemeClr val="tx1"/>
+                </a:solidFill>
+                <a:latin typeface="Segoe UI Light" panose="020B0502040204020203" pitchFamily="34" charset="0"/>
+                <a:ea typeface="Segoe UI Light" panose="020B0502040204020203" pitchFamily="34" charset="0"/>
+                <a:cs typeface="Segoe UI Light" panose="020B0502040204020203" pitchFamily="34" charset="0"/>
+              </a:defRPr>
+            </a:lvl3pPr>
+            <a:lvl4pPr marL="1599657" indent="-228522" algn="l" defTabSz="914088" rtl="0" eaLnBrk="1" latinLnBrk="0" hangingPunct="1">
+              <a:spcBef>
+                <a:spcPct val="20000"/>
+              </a:spcBef>
+              <a:buFont typeface="Arial" pitchFamily="34" charset="0"/>
+              <a:buChar char="–"/>
+              <a:defRPr sz="2000" kern="0" baseline="0">
+                <a:solidFill>
+                  <a:schemeClr val="tx1"/>
+                </a:solidFill>
+                <a:latin typeface="Segoe UI Light" panose="020B0502040204020203" pitchFamily="34" charset="0"/>
+                <a:ea typeface="Segoe UI Light" panose="020B0502040204020203" pitchFamily="34" charset="0"/>
+                <a:cs typeface="Segoe UI Light" panose="020B0502040204020203" pitchFamily="34" charset="0"/>
+              </a:defRPr>
+            </a:lvl4pPr>
+            <a:lvl5pPr marL="2056700" indent="-228522" algn="l" defTabSz="914088" rtl="0" eaLnBrk="1" latinLnBrk="0" hangingPunct="1">
+              <a:spcBef>
+                <a:spcPct val="20000"/>
+              </a:spcBef>
+              <a:buFont typeface="Arial" pitchFamily="34" charset="0"/>
+              <a:buChar char="»"/>
+              <a:defRPr sz="2000" kern="0" baseline="0">
+                <a:solidFill>
+                  <a:schemeClr val="tx1"/>
+                </a:solidFill>
+                <a:latin typeface="Segoe UI Light" panose="020B0502040204020203" pitchFamily="34" charset="0"/>
+                <a:ea typeface="Segoe UI Light" panose="020B0502040204020203" pitchFamily="34" charset="0"/>
+                <a:cs typeface="Segoe UI Light" panose="020B0502040204020203" pitchFamily="34" charset="0"/>
+              </a:defRPr>
+            </a:lvl5pPr>
+            <a:lvl6pPr marL="2513745" indent="-228522" algn="l" defTabSz="914088" rtl="0" eaLnBrk="1" latinLnBrk="0" hangingPunct="1">
+              <a:spcBef>
+                <a:spcPct val="20000"/>
+              </a:spcBef>
+              <a:buFont typeface="Arial" pitchFamily="34" charset="0"/>
+              <a:buChar char="•"/>
+              <a:defRPr sz="2000" kern="1200">
+                <a:solidFill>
+                  <a:schemeClr val="tx1"/>
+                </a:solidFill>
+                <a:latin typeface="+mn-lt"/>
+                <a:ea typeface="+mn-ea"/>
+                <a:cs typeface="+mn-cs"/>
+              </a:defRPr>
+            </a:lvl6pPr>
+            <a:lvl7pPr marL="2970789" indent="-228522" algn="l" defTabSz="914088" rtl="0" eaLnBrk="1" latinLnBrk="0" hangingPunct="1">
+              <a:spcBef>
+                <a:spcPct val="20000"/>
+              </a:spcBef>
+              <a:buFont typeface="Arial" pitchFamily="34" charset="0"/>
+              <a:buChar char="•"/>
+              <a:defRPr sz="2000" kern="1200">
+                <a:solidFill>
+                  <a:schemeClr val="tx1"/>
+                </a:solidFill>
+                <a:latin typeface="+mn-lt"/>
+                <a:ea typeface="+mn-ea"/>
+                <a:cs typeface="+mn-cs"/>
+              </a:defRPr>
+            </a:lvl7pPr>
+            <a:lvl8pPr marL="3427833" indent="-228522" algn="l" defTabSz="914088" rtl="0" eaLnBrk="1" latinLnBrk="0" hangingPunct="1">
+              <a:spcBef>
+                <a:spcPct val="20000"/>
+              </a:spcBef>
+              <a:buFont typeface="Arial" pitchFamily="34" charset="0"/>
+              <a:buChar char="•"/>
+              <a:defRPr sz="2000" kern="1200">
+                <a:solidFill>
+                  <a:schemeClr val="tx1"/>
+                </a:solidFill>
+                <a:latin typeface="+mn-lt"/>
+                <a:ea typeface="+mn-ea"/>
+                <a:cs typeface="+mn-cs"/>
+              </a:defRPr>
+            </a:lvl8pPr>
+            <a:lvl9pPr marL="3884878" indent="-228522" algn="l" defTabSz="914088" rtl="0" eaLnBrk="1" latinLnBrk="0" hangingPunct="1">
+              <a:spcBef>
+                <a:spcPct val="20000"/>
+              </a:spcBef>
+              <a:buFont typeface="Arial" pitchFamily="34" charset="0"/>
+              <a:buChar char="•"/>
+              <a:defRPr sz="2000" kern="1200">
+                <a:solidFill>
+                  <a:schemeClr val="tx1"/>
+                </a:solidFill>
+                <a:latin typeface="+mn-lt"/>
+                <a:ea typeface="+mn-ea"/>
+                <a:cs typeface="+mn-cs"/>
+              </a:defRPr>
+            </a:lvl9pPr>
+          </a:lstStyle>
+          <a:p>
+            <a:pPr marL="0" indent="0" algn="r">
+              <a:buNone/>
+            </a:pPr>
+            <a:r>
+              <a:rPr lang="en-US" sz="2800" dirty="0" smtClean="0"/>
+              <a:t>Active Directory Users</a:t>
+            </a:r>
+          </a:p>
+          <a:p>
+            <a:pPr marL="0" indent="0" algn="r">
+              <a:buNone/>
+            </a:pPr>
+            <a:r>
+              <a:rPr lang="en-US" sz="2800" dirty="0" smtClean="0"/>
+              <a:t>Key Vault</a:t>
+            </a:r>
+            <a:endParaRPr lang="en-US" sz="2800" dirty="0"/>
+          </a:p>
+        </p:txBody>
+      </p:sp>
     </p:spTree>
     <p:extLst>
       <p:ext uri="{BB962C8B-B14F-4D97-AF65-F5344CB8AC3E}">
@@ -4043,7 +5623,2581 @@
   <p:timing>
     <p:tnLst>
       <p:par>
+        <p:cTn id="1" dur="indefinite" restart="never" nodeType="tmRoot">
+          <p:childTnLst>
+            <p:seq concurrent="1" nextAc="seek">
+              <p:cTn id="2" dur="indefinite" nodeType="mainSeq">
+                <p:childTnLst>
+                  <p:par>
+                    <p:cTn id="3" fill="hold">
+                      <p:stCondLst>
+                        <p:cond delay="indefinite"/>
+                      </p:stCondLst>
+                      <p:childTnLst>
+                        <p:par>
+                          <p:cTn id="4" fill="hold">
+                            <p:stCondLst>
+                              <p:cond delay="0"/>
+                            </p:stCondLst>
+                            <p:childTnLst>
+                              <p:par>
+                                <p:cTn id="5" presetID="1" presetClass="entr" presetSubtype="0" fill="hold" grpId="0" nodeType="clickEffect">
+                                  <p:stCondLst>
+                                    <p:cond delay="0"/>
+                                  </p:stCondLst>
+                                  <p:childTnLst>
+                                    <p:set>
+                                      <p:cBhvr>
+                                        <p:cTn id="6" dur="1" fill="hold">
+                                          <p:stCondLst>
+                                            <p:cond delay="0"/>
+                                          </p:stCondLst>
+                                        </p:cTn>
+                                        <p:tgtEl>
+                                          <p:spTgt spid="5"/>
+                                        </p:tgtEl>
+                                        <p:attrNameLst>
+                                          <p:attrName>style.visibility</p:attrName>
+                                        </p:attrNameLst>
+                                      </p:cBhvr>
+                                      <p:to>
+                                        <p:strVal val="visible"/>
+                                      </p:to>
+                                    </p:set>
+                                  </p:childTnLst>
+                                </p:cTn>
+                              </p:par>
+                            </p:childTnLst>
+                          </p:cTn>
+                        </p:par>
+                      </p:childTnLst>
+                    </p:cTn>
+                  </p:par>
+                  <p:par>
+                    <p:cTn id="7" fill="hold">
+                      <p:stCondLst>
+                        <p:cond delay="indefinite"/>
+                      </p:stCondLst>
+                      <p:childTnLst>
+                        <p:par>
+                          <p:cTn id="8" fill="hold">
+                            <p:stCondLst>
+                              <p:cond delay="0"/>
+                            </p:stCondLst>
+                            <p:childTnLst>
+                              <p:par>
+                                <p:cTn id="9" presetID="1" presetClass="exit" presetSubtype="0" fill="hold" grpId="1" nodeType="clickEffect">
+                                  <p:stCondLst>
+                                    <p:cond delay="0"/>
+                                  </p:stCondLst>
+                                  <p:childTnLst>
+                                    <p:set>
+                                      <p:cBhvr>
+                                        <p:cTn id="10" dur="1" fill="hold">
+                                          <p:stCondLst>
+                                            <p:cond delay="0"/>
+                                          </p:stCondLst>
+                                        </p:cTn>
+                                        <p:tgtEl>
+                                          <p:spTgt spid="5"/>
+                                        </p:tgtEl>
+                                        <p:attrNameLst>
+                                          <p:attrName>style.visibility</p:attrName>
+                                        </p:attrNameLst>
+                                      </p:cBhvr>
+                                      <p:to>
+                                        <p:strVal val="hidden"/>
+                                      </p:to>
+                                    </p:set>
+                                  </p:childTnLst>
+                                </p:cTn>
+                              </p:par>
+                            </p:childTnLst>
+                          </p:cTn>
+                        </p:par>
+                      </p:childTnLst>
+                    </p:cTn>
+                  </p:par>
+                </p:childTnLst>
+              </p:cTn>
+              <p:prevCondLst>
+                <p:cond evt="onPrev" delay="0">
+                  <p:tgtEl>
+                    <p:sldTgt/>
+                  </p:tgtEl>
+                </p:cond>
+              </p:prevCondLst>
+              <p:nextCondLst>
+                <p:cond evt="onNext" delay="0">
+                  <p:tgtEl>
+                    <p:sldTgt/>
+                  </p:tgtEl>
+                </p:cond>
+              </p:nextCondLst>
+            </p:seq>
+          </p:childTnLst>
+        </p:cTn>
+      </p:par>
+    </p:tnLst>
+    <p:bldLst>
+      <p:bldP spid="5" grpId="0" animBg="1"/>
+      <p:bldP spid="5" grpId="1" animBg="1"/>
+    </p:bldLst>
+  </p:timing>
+</p:sld>
+</file>
+
+<file path=ppt/slides/slide4.xml><?xml version="1.0" encoding="utf-8"?>
+<p:sld xmlns:a="http://schemas.openxmlformats.org/drawingml/2006/main" xmlns:r="http://schemas.openxmlformats.org/officeDocument/2006/relationships" xmlns:p="http://schemas.openxmlformats.org/presentationml/2006/main">
+  <p:cSld>
+    <p:spTree>
+      <p:nvGrpSpPr>
+        <p:cNvPr id="1" name=""/>
+        <p:cNvGrpSpPr/>
+        <p:nvPr/>
+      </p:nvGrpSpPr>
+      <p:grpSpPr>
+        <a:xfrm>
+          <a:off x="0" y="0"/>
+          <a:ext cx="0" cy="0"/>
+          <a:chOff x="0" y="0"/>
+          <a:chExt cx="0" cy="0"/>
+        </a:xfrm>
+      </p:grpSpPr>
+      <p:sp>
+        <p:nvSpPr>
+          <p:cNvPr id="2" name="Title 1"/>
+          <p:cNvSpPr>
+            <a:spLocks noGrp="1"/>
+          </p:cNvSpPr>
+          <p:nvPr>
+            <p:ph type="title"/>
+          </p:nvPr>
+        </p:nvSpPr>
+        <p:spPr/>
+        <p:txBody>
+          <a:bodyPr/>
+          <a:lstStyle/>
+          <a:p>
+            <a:r>
+              <a:rPr lang="en-US" dirty="0" smtClean="0"/>
+              <a:t>Storage Types</a:t>
+            </a:r>
+            <a:endParaRPr lang="en-US" dirty="0"/>
+          </a:p>
+        </p:txBody>
+      </p:sp>
+      <p:sp>
+        <p:nvSpPr>
+          <p:cNvPr id="3" name="Content Placeholder 2"/>
+          <p:cNvSpPr>
+            <a:spLocks noGrp="1"/>
+          </p:cNvSpPr>
+          <p:nvPr>
+            <p:ph sz="quarter" idx="10"/>
+          </p:nvPr>
+        </p:nvSpPr>
+        <p:spPr>
+          <a:xfrm>
+            <a:off x="379414" y="1388226"/>
+            <a:ext cx="4179140" cy="5290388"/>
+          </a:xfrm>
+        </p:spPr>
+        <p:txBody>
+          <a:bodyPr/>
+          <a:lstStyle/>
+          <a:p>
+            <a:r>
+              <a:rPr lang="en-US" dirty="0" smtClean="0"/>
+              <a:t>Security</a:t>
+            </a:r>
+          </a:p>
+          <a:p>
+            <a:r>
+              <a:rPr lang="en-US" b="1" dirty="0" smtClean="0"/>
+              <a:t>Integration</a:t>
+            </a:r>
+          </a:p>
+          <a:p>
+            <a:r>
+              <a:rPr lang="en-US" dirty="0" smtClean="0"/>
+              <a:t>Analytics</a:t>
+            </a:r>
+          </a:p>
+          <a:p>
+            <a:r>
+              <a:rPr lang="en-US" dirty="0" smtClean="0"/>
+              <a:t>Data</a:t>
+            </a:r>
+          </a:p>
+          <a:p>
+            <a:r>
+              <a:rPr lang="en-US" dirty="0" smtClean="0"/>
+              <a:t>Plain Old Storage</a:t>
+            </a:r>
+          </a:p>
+          <a:p>
+            <a:r>
+              <a:rPr lang="en-US" dirty="0" smtClean="0"/>
+              <a:t>Peripheral Concerns</a:t>
+            </a:r>
+            <a:endParaRPr lang="en-US" dirty="0"/>
+          </a:p>
+        </p:txBody>
+      </p:sp>
+      <p:sp>
+        <p:nvSpPr>
+          <p:cNvPr id="4" name="TextBox 3"/>
+          <p:cNvSpPr txBox="1"/>
+          <p:nvPr/>
+        </p:nvSpPr>
+        <p:spPr>
+          <a:xfrm>
+            <a:off x="9906000" y="-1"/>
+            <a:ext cx="2286000" cy="2031325"/>
+          </a:xfrm>
+          <a:prstGeom prst="rect">
+            <a:avLst/>
+          </a:prstGeom>
+          <a:solidFill>
+            <a:srgbClr val="FFFF00"/>
+          </a:solidFill>
+          <a:ln>
+            <a:noFill/>
+          </a:ln>
+        </p:spPr>
+        <p:txBody>
+          <a:bodyPr wrap="square" rtlCol="0">
+            <a:spAutoFit/>
+          </a:bodyPr>
+          <a:lstStyle/>
+          <a:p>
+            <a:pPr algn="ctr"/>
+            <a:endParaRPr lang="en-US" dirty="0" smtClean="0"/>
+          </a:p>
+          <a:p>
+            <a:pPr algn="ctr"/>
+            <a:endParaRPr lang="en-US" dirty="0"/>
+          </a:p>
+          <a:p>
+            <a:pPr algn="ctr"/>
+            <a:r>
+              <a:rPr lang="en-US" dirty="0" smtClean="0"/>
+              <a:t>Please leave this area blank to allow for picture in picture recording</a:t>
+            </a:r>
+          </a:p>
+          <a:p>
+            <a:pPr algn="ctr"/>
+            <a:endParaRPr lang="en-US" dirty="0"/>
+          </a:p>
+        </p:txBody>
+      </p:sp>
+      <p:sp>
+        <p:nvSpPr>
+          <p:cNvPr id="6" name="Content Placeholder 2"/>
+          <p:cNvSpPr txBox="1">
+            <a:spLocks/>
+          </p:cNvSpPr>
+          <p:nvPr/>
+        </p:nvSpPr>
+        <p:spPr>
+          <a:xfrm>
+            <a:off x="5486400" y="2061318"/>
+            <a:ext cx="3862605" cy="1462550"/>
+          </a:xfrm>
+          <a:prstGeom prst="rect">
+            <a:avLst/>
+          </a:prstGeom>
+          <a:solidFill>
+            <a:schemeClr val="accent3">
+              <a:lumMod val="20000"/>
+              <a:lumOff val="80000"/>
+            </a:schemeClr>
+          </a:solidFill>
+        </p:spPr>
+        <p:txBody>
+          <a:bodyPr/>
+          <a:lstStyle>
+            <a:lvl1pPr marL="342783" indent="-342783" algn="l" defTabSz="914088" rtl="0" eaLnBrk="1" latinLnBrk="0" hangingPunct="1">
+              <a:spcBef>
+                <a:spcPts val="1400"/>
+              </a:spcBef>
+              <a:buFont typeface="Arial" pitchFamily="34" charset="0"/>
+              <a:buChar char="•"/>
+              <a:defRPr sz="3200" b="0" kern="0" baseline="0">
+                <a:solidFill>
+                  <a:schemeClr val="tx1"/>
+                </a:solidFill>
+                <a:latin typeface="Segoe UI Light" panose="020B0502040204020203" pitchFamily="34" charset="0"/>
+                <a:ea typeface="Segoe UI Light" panose="020B0502040204020203" pitchFamily="34" charset="0"/>
+                <a:cs typeface="Segoe UI Light" panose="020B0502040204020203" pitchFamily="34" charset="0"/>
+              </a:defRPr>
+            </a:lvl1pPr>
+            <a:lvl2pPr marL="742698" indent="-285652" algn="l" defTabSz="914088" rtl="0" eaLnBrk="1" latinLnBrk="0" hangingPunct="1">
+              <a:spcBef>
+                <a:spcPts val="300"/>
+              </a:spcBef>
+              <a:spcAft>
+                <a:spcPts val="300"/>
+              </a:spcAft>
+              <a:buFont typeface="Arial" pitchFamily="34" charset="0"/>
+              <a:buChar char="–"/>
+              <a:defRPr sz="2800" kern="0" baseline="0">
+                <a:solidFill>
+                  <a:schemeClr val="tx1"/>
+                </a:solidFill>
+                <a:latin typeface="Segoe UI Light" panose="020B0502040204020203" pitchFamily="34" charset="0"/>
+                <a:ea typeface="Segoe UI Light" panose="020B0502040204020203" pitchFamily="34" charset="0"/>
+                <a:cs typeface="Segoe UI Light" panose="020B0502040204020203" pitchFamily="34" charset="0"/>
+              </a:defRPr>
+            </a:lvl2pPr>
+            <a:lvl3pPr marL="1142612" indent="-228522" algn="l" defTabSz="914088" rtl="0" eaLnBrk="1" latinLnBrk="0" hangingPunct="1">
+              <a:spcBef>
+                <a:spcPts val="200"/>
+              </a:spcBef>
+              <a:spcAft>
+                <a:spcPts val="200"/>
+              </a:spcAft>
+              <a:buFont typeface="Arial" pitchFamily="34" charset="0"/>
+              <a:buChar char="•"/>
+              <a:defRPr sz="2400" kern="0" baseline="0">
+                <a:solidFill>
+                  <a:schemeClr val="tx1"/>
+                </a:solidFill>
+                <a:latin typeface="Segoe UI Light" panose="020B0502040204020203" pitchFamily="34" charset="0"/>
+                <a:ea typeface="Segoe UI Light" panose="020B0502040204020203" pitchFamily="34" charset="0"/>
+                <a:cs typeface="Segoe UI Light" panose="020B0502040204020203" pitchFamily="34" charset="0"/>
+              </a:defRPr>
+            </a:lvl3pPr>
+            <a:lvl4pPr marL="1599657" indent="-228522" algn="l" defTabSz="914088" rtl="0" eaLnBrk="1" latinLnBrk="0" hangingPunct="1">
+              <a:spcBef>
+                <a:spcPct val="20000"/>
+              </a:spcBef>
+              <a:buFont typeface="Arial" pitchFamily="34" charset="0"/>
+              <a:buChar char="–"/>
+              <a:defRPr sz="2000" kern="0" baseline="0">
+                <a:solidFill>
+                  <a:schemeClr val="tx1"/>
+                </a:solidFill>
+                <a:latin typeface="Segoe UI Light" panose="020B0502040204020203" pitchFamily="34" charset="0"/>
+                <a:ea typeface="Segoe UI Light" panose="020B0502040204020203" pitchFamily="34" charset="0"/>
+                <a:cs typeface="Segoe UI Light" panose="020B0502040204020203" pitchFamily="34" charset="0"/>
+              </a:defRPr>
+            </a:lvl4pPr>
+            <a:lvl5pPr marL="2056700" indent="-228522" algn="l" defTabSz="914088" rtl="0" eaLnBrk="1" latinLnBrk="0" hangingPunct="1">
+              <a:spcBef>
+                <a:spcPct val="20000"/>
+              </a:spcBef>
+              <a:buFont typeface="Arial" pitchFamily="34" charset="0"/>
+              <a:buChar char="»"/>
+              <a:defRPr sz="2000" kern="0" baseline="0">
+                <a:solidFill>
+                  <a:schemeClr val="tx1"/>
+                </a:solidFill>
+                <a:latin typeface="Segoe UI Light" panose="020B0502040204020203" pitchFamily="34" charset="0"/>
+                <a:ea typeface="Segoe UI Light" panose="020B0502040204020203" pitchFamily="34" charset="0"/>
+                <a:cs typeface="Segoe UI Light" panose="020B0502040204020203" pitchFamily="34" charset="0"/>
+              </a:defRPr>
+            </a:lvl5pPr>
+            <a:lvl6pPr marL="2513745" indent="-228522" algn="l" defTabSz="914088" rtl="0" eaLnBrk="1" latinLnBrk="0" hangingPunct="1">
+              <a:spcBef>
+                <a:spcPct val="20000"/>
+              </a:spcBef>
+              <a:buFont typeface="Arial" pitchFamily="34" charset="0"/>
+              <a:buChar char="•"/>
+              <a:defRPr sz="2000" kern="1200">
+                <a:solidFill>
+                  <a:schemeClr val="tx1"/>
+                </a:solidFill>
+                <a:latin typeface="+mn-lt"/>
+                <a:ea typeface="+mn-ea"/>
+                <a:cs typeface="+mn-cs"/>
+              </a:defRPr>
+            </a:lvl6pPr>
+            <a:lvl7pPr marL="2970789" indent="-228522" algn="l" defTabSz="914088" rtl="0" eaLnBrk="1" latinLnBrk="0" hangingPunct="1">
+              <a:spcBef>
+                <a:spcPct val="20000"/>
+              </a:spcBef>
+              <a:buFont typeface="Arial" pitchFamily="34" charset="0"/>
+              <a:buChar char="•"/>
+              <a:defRPr sz="2000" kern="1200">
+                <a:solidFill>
+                  <a:schemeClr val="tx1"/>
+                </a:solidFill>
+                <a:latin typeface="+mn-lt"/>
+                <a:ea typeface="+mn-ea"/>
+                <a:cs typeface="+mn-cs"/>
+              </a:defRPr>
+            </a:lvl7pPr>
+            <a:lvl8pPr marL="3427833" indent="-228522" algn="l" defTabSz="914088" rtl="0" eaLnBrk="1" latinLnBrk="0" hangingPunct="1">
+              <a:spcBef>
+                <a:spcPct val="20000"/>
+              </a:spcBef>
+              <a:buFont typeface="Arial" pitchFamily="34" charset="0"/>
+              <a:buChar char="•"/>
+              <a:defRPr sz="2000" kern="1200">
+                <a:solidFill>
+                  <a:schemeClr val="tx1"/>
+                </a:solidFill>
+                <a:latin typeface="+mn-lt"/>
+                <a:ea typeface="+mn-ea"/>
+                <a:cs typeface="+mn-cs"/>
+              </a:defRPr>
+            </a:lvl8pPr>
+            <a:lvl9pPr marL="3884878" indent="-228522" algn="l" defTabSz="914088" rtl="0" eaLnBrk="1" latinLnBrk="0" hangingPunct="1">
+              <a:spcBef>
+                <a:spcPct val="20000"/>
+              </a:spcBef>
+              <a:buFont typeface="Arial" pitchFamily="34" charset="0"/>
+              <a:buChar char="•"/>
+              <a:defRPr sz="2000" kern="1200">
+                <a:solidFill>
+                  <a:schemeClr val="tx1"/>
+                </a:solidFill>
+                <a:latin typeface="+mn-lt"/>
+                <a:ea typeface="+mn-ea"/>
+                <a:cs typeface="+mn-cs"/>
+              </a:defRPr>
+            </a:lvl9pPr>
+          </a:lstStyle>
+          <a:p>
+            <a:pPr marL="0" indent="0" algn="r">
+              <a:buNone/>
+            </a:pPr>
+            <a:r>
+              <a:rPr lang="en-US" sz="2800" dirty="0" smtClean="0"/>
+              <a:t>Queues</a:t>
+            </a:r>
+          </a:p>
+          <a:p>
+            <a:pPr marL="0" indent="0" algn="r">
+              <a:buNone/>
+            </a:pPr>
+            <a:r>
+              <a:rPr lang="en-US" sz="2800" dirty="0" smtClean="0"/>
+              <a:t>Service Bus</a:t>
+            </a:r>
+            <a:endParaRPr lang="en-US" sz="2800" dirty="0"/>
+          </a:p>
+        </p:txBody>
+      </p:sp>
+    </p:spTree>
+    <p:extLst>
+      <p:ext uri="{BB962C8B-B14F-4D97-AF65-F5344CB8AC3E}">
+        <p14:creationId xmlns:p14="http://schemas.microsoft.com/office/powerpoint/2010/main" val="1240436347"/>
+      </p:ext>
+    </p:extLst>
+  </p:cSld>
+  <p:clrMapOvr>
+    <a:masterClrMapping/>
+  </p:clrMapOvr>
+  <p:timing>
+    <p:tnLst>
+      <p:par>
+        <p:cTn id="1" dur="indefinite" restart="never" nodeType="tmRoot">
+          <p:childTnLst>
+            <p:seq concurrent="1" nextAc="seek">
+              <p:cTn id="2" dur="indefinite" nodeType="mainSeq">
+                <p:childTnLst>
+                  <p:par>
+                    <p:cTn id="3" fill="hold">
+                      <p:stCondLst>
+                        <p:cond delay="indefinite"/>
+                      </p:stCondLst>
+                      <p:childTnLst>
+                        <p:par>
+                          <p:cTn id="4" fill="hold">
+                            <p:stCondLst>
+                              <p:cond delay="0"/>
+                            </p:stCondLst>
+                            <p:childTnLst>
+                              <p:par>
+                                <p:cTn id="5" presetID="1" presetClass="entr" presetSubtype="0" fill="hold" grpId="0" nodeType="clickEffect">
+                                  <p:stCondLst>
+                                    <p:cond delay="0"/>
+                                  </p:stCondLst>
+                                  <p:childTnLst>
+                                    <p:set>
+                                      <p:cBhvr>
+                                        <p:cTn id="6" dur="1" fill="hold">
+                                          <p:stCondLst>
+                                            <p:cond delay="0"/>
+                                          </p:stCondLst>
+                                        </p:cTn>
+                                        <p:tgtEl>
+                                          <p:spTgt spid="6"/>
+                                        </p:tgtEl>
+                                        <p:attrNameLst>
+                                          <p:attrName>style.visibility</p:attrName>
+                                        </p:attrNameLst>
+                                      </p:cBhvr>
+                                      <p:to>
+                                        <p:strVal val="visible"/>
+                                      </p:to>
+                                    </p:set>
+                                  </p:childTnLst>
+                                </p:cTn>
+                              </p:par>
+                            </p:childTnLst>
+                          </p:cTn>
+                        </p:par>
+                      </p:childTnLst>
+                    </p:cTn>
+                  </p:par>
+                  <p:par>
+                    <p:cTn id="7" fill="hold">
+                      <p:stCondLst>
+                        <p:cond delay="indefinite"/>
+                      </p:stCondLst>
+                      <p:childTnLst>
+                        <p:par>
+                          <p:cTn id="8" fill="hold">
+                            <p:stCondLst>
+                              <p:cond delay="0"/>
+                            </p:stCondLst>
+                            <p:childTnLst>
+                              <p:par>
+                                <p:cTn id="9" presetID="1" presetClass="exit" presetSubtype="0" fill="hold" grpId="1" nodeType="clickEffect">
+                                  <p:stCondLst>
+                                    <p:cond delay="0"/>
+                                  </p:stCondLst>
+                                  <p:childTnLst>
+                                    <p:set>
+                                      <p:cBhvr>
+                                        <p:cTn id="10" dur="1" fill="hold">
+                                          <p:stCondLst>
+                                            <p:cond delay="0"/>
+                                          </p:stCondLst>
+                                        </p:cTn>
+                                        <p:tgtEl>
+                                          <p:spTgt spid="6"/>
+                                        </p:tgtEl>
+                                        <p:attrNameLst>
+                                          <p:attrName>style.visibility</p:attrName>
+                                        </p:attrNameLst>
+                                      </p:cBhvr>
+                                      <p:to>
+                                        <p:strVal val="hidden"/>
+                                      </p:to>
+                                    </p:set>
+                                  </p:childTnLst>
+                                </p:cTn>
+                              </p:par>
+                            </p:childTnLst>
+                          </p:cTn>
+                        </p:par>
+                      </p:childTnLst>
+                    </p:cTn>
+                  </p:par>
+                </p:childTnLst>
+              </p:cTn>
+              <p:prevCondLst>
+                <p:cond evt="onPrev" delay="0">
+                  <p:tgtEl>
+                    <p:sldTgt/>
+                  </p:tgtEl>
+                </p:cond>
+              </p:prevCondLst>
+              <p:nextCondLst>
+                <p:cond evt="onNext" delay="0">
+                  <p:tgtEl>
+                    <p:sldTgt/>
+                  </p:tgtEl>
+                </p:cond>
+              </p:nextCondLst>
+            </p:seq>
+          </p:childTnLst>
+        </p:cTn>
+      </p:par>
+    </p:tnLst>
+    <p:bldLst>
+      <p:bldP spid="6" grpId="0" animBg="1"/>
+      <p:bldP spid="6" grpId="1" animBg="1"/>
+    </p:bldLst>
+  </p:timing>
+</p:sld>
+</file>
+
+<file path=ppt/slides/slide5.xml><?xml version="1.0" encoding="utf-8"?>
+<p:sld xmlns:a="http://schemas.openxmlformats.org/drawingml/2006/main" xmlns:r="http://schemas.openxmlformats.org/officeDocument/2006/relationships" xmlns:p="http://schemas.openxmlformats.org/presentationml/2006/main">
+  <p:cSld>
+    <p:spTree>
+      <p:nvGrpSpPr>
+        <p:cNvPr id="1" name=""/>
+        <p:cNvGrpSpPr/>
+        <p:nvPr/>
+      </p:nvGrpSpPr>
+      <p:grpSpPr>
+        <a:xfrm>
+          <a:off x="0" y="0"/>
+          <a:ext cx="0" cy="0"/>
+          <a:chOff x="0" y="0"/>
+          <a:chExt cx="0" cy="0"/>
+        </a:xfrm>
+      </p:grpSpPr>
+      <p:sp>
+        <p:nvSpPr>
+          <p:cNvPr id="2" name="Title 1"/>
+          <p:cNvSpPr>
+            <a:spLocks noGrp="1"/>
+          </p:cNvSpPr>
+          <p:nvPr>
+            <p:ph type="title"/>
+          </p:nvPr>
+        </p:nvSpPr>
+        <p:spPr/>
+        <p:txBody>
+          <a:bodyPr/>
+          <a:lstStyle/>
+          <a:p>
+            <a:r>
+              <a:rPr lang="en-US" dirty="0" smtClean="0"/>
+              <a:t>Storage Types</a:t>
+            </a:r>
+            <a:endParaRPr lang="en-US" dirty="0"/>
+          </a:p>
+        </p:txBody>
+      </p:sp>
+      <p:sp>
+        <p:nvSpPr>
+          <p:cNvPr id="3" name="Content Placeholder 2"/>
+          <p:cNvSpPr>
+            <a:spLocks noGrp="1"/>
+          </p:cNvSpPr>
+          <p:nvPr>
+            <p:ph sz="quarter" idx="10"/>
+          </p:nvPr>
+        </p:nvSpPr>
+        <p:spPr>
+          <a:xfrm>
+            <a:off x="379414" y="1388226"/>
+            <a:ext cx="4179140" cy="5290388"/>
+          </a:xfrm>
+        </p:spPr>
+        <p:txBody>
+          <a:bodyPr/>
+          <a:lstStyle/>
+          <a:p>
+            <a:r>
+              <a:rPr lang="en-US" dirty="0" smtClean="0"/>
+              <a:t>Security</a:t>
+            </a:r>
+          </a:p>
+          <a:p>
+            <a:r>
+              <a:rPr lang="en-US" dirty="0" smtClean="0"/>
+              <a:t>Integration</a:t>
+            </a:r>
+          </a:p>
+          <a:p>
+            <a:r>
+              <a:rPr lang="en-US" b="1" dirty="0" smtClean="0"/>
+              <a:t>Analytics</a:t>
+            </a:r>
+          </a:p>
+          <a:p>
+            <a:r>
+              <a:rPr lang="en-US" dirty="0" smtClean="0"/>
+              <a:t>Data</a:t>
+            </a:r>
+          </a:p>
+          <a:p>
+            <a:r>
+              <a:rPr lang="en-US" dirty="0" smtClean="0"/>
+              <a:t>Plain Old Storage</a:t>
+            </a:r>
+          </a:p>
+          <a:p>
+            <a:r>
+              <a:rPr lang="en-US" dirty="0" smtClean="0"/>
+              <a:t>Peripheral Concerns</a:t>
+            </a:r>
+            <a:endParaRPr lang="en-US" dirty="0"/>
+          </a:p>
+        </p:txBody>
+      </p:sp>
+      <p:sp>
+        <p:nvSpPr>
+          <p:cNvPr id="4" name="TextBox 3"/>
+          <p:cNvSpPr txBox="1"/>
+          <p:nvPr/>
+        </p:nvSpPr>
+        <p:spPr>
+          <a:xfrm>
+            <a:off x="9906000" y="-1"/>
+            <a:ext cx="2286000" cy="2031325"/>
+          </a:xfrm>
+          <a:prstGeom prst="rect">
+            <a:avLst/>
+          </a:prstGeom>
+          <a:solidFill>
+            <a:srgbClr val="FFFF00"/>
+          </a:solidFill>
+          <a:ln>
+            <a:noFill/>
+          </a:ln>
+        </p:spPr>
+        <p:txBody>
+          <a:bodyPr wrap="square" rtlCol="0">
+            <a:spAutoFit/>
+          </a:bodyPr>
+          <a:lstStyle/>
+          <a:p>
+            <a:pPr algn="ctr"/>
+            <a:endParaRPr lang="en-US" dirty="0" smtClean="0"/>
+          </a:p>
+          <a:p>
+            <a:pPr algn="ctr"/>
+            <a:endParaRPr lang="en-US" dirty="0"/>
+          </a:p>
+          <a:p>
+            <a:pPr algn="ctr"/>
+            <a:r>
+              <a:rPr lang="en-US" dirty="0" smtClean="0"/>
+              <a:t>Please leave this area blank to allow for picture in picture recording</a:t>
+            </a:r>
+          </a:p>
+          <a:p>
+            <a:pPr algn="ctr"/>
+            <a:endParaRPr lang="en-US" dirty="0"/>
+          </a:p>
+        </p:txBody>
+      </p:sp>
+      <p:sp>
+        <p:nvSpPr>
+          <p:cNvPr id="7" name="Content Placeholder 2"/>
+          <p:cNvSpPr txBox="1">
+            <a:spLocks/>
+          </p:cNvSpPr>
+          <p:nvPr/>
+        </p:nvSpPr>
+        <p:spPr>
+          <a:xfrm>
+            <a:off x="5486400" y="2734076"/>
+            <a:ext cx="3862605" cy="1462550"/>
+          </a:xfrm>
+          <a:prstGeom prst="rect">
+            <a:avLst/>
+          </a:prstGeom>
+          <a:solidFill>
+            <a:schemeClr val="accent3">
+              <a:lumMod val="20000"/>
+              <a:lumOff val="80000"/>
+            </a:schemeClr>
+          </a:solidFill>
+        </p:spPr>
+        <p:txBody>
+          <a:bodyPr/>
+          <a:lstStyle>
+            <a:lvl1pPr marL="342783" indent="-342783" algn="l" defTabSz="914088" rtl="0" eaLnBrk="1" latinLnBrk="0" hangingPunct="1">
+              <a:spcBef>
+                <a:spcPts val="1400"/>
+              </a:spcBef>
+              <a:buFont typeface="Arial" pitchFamily="34" charset="0"/>
+              <a:buChar char="•"/>
+              <a:defRPr sz="3200" b="0" kern="0" baseline="0">
+                <a:solidFill>
+                  <a:schemeClr val="tx1"/>
+                </a:solidFill>
+                <a:latin typeface="Segoe UI Light" panose="020B0502040204020203" pitchFamily="34" charset="0"/>
+                <a:ea typeface="Segoe UI Light" panose="020B0502040204020203" pitchFamily="34" charset="0"/>
+                <a:cs typeface="Segoe UI Light" panose="020B0502040204020203" pitchFamily="34" charset="0"/>
+              </a:defRPr>
+            </a:lvl1pPr>
+            <a:lvl2pPr marL="742698" indent="-285652" algn="l" defTabSz="914088" rtl="0" eaLnBrk="1" latinLnBrk="0" hangingPunct="1">
+              <a:spcBef>
+                <a:spcPts val="300"/>
+              </a:spcBef>
+              <a:spcAft>
+                <a:spcPts val="300"/>
+              </a:spcAft>
+              <a:buFont typeface="Arial" pitchFamily="34" charset="0"/>
+              <a:buChar char="–"/>
+              <a:defRPr sz="2800" kern="0" baseline="0">
+                <a:solidFill>
+                  <a:schemeClr val="tx1"/>
+                </a:solidFill>
+                <a:latin typeface="Segoe UI Light" panose="020B0502040204020203" pitchFamily="34" charset="0"/>
+                <a:ea typeface="Segoe UI Light" panose="020B0502040204020203" pitchFamily="34" charset="0"/>
+                <a:cs typeface="Segoe UI Light" panose="020B0502040204020203" pitchFamily="34" charset="0"/>
+              </a:defRPr>
+            </a:lvl2pPr>
+            <a:lvl3pPr marL="1142612" indent="-228522" algn="l" defTabSz="914088" rtl="0" eaLnBrk="1" latinLnBrk="0" hangingPunct="1">
+              <a:spcBef>
+                <a:spcPts val="200"/>
+              </a:spcBef>
+              <a:spcAft>
+                <a:spcPts val="200"/>
+              </a:spcAft>
+              <a:buFont typeface="Arial" pitchFamily="34" charset="0"/>
+              <a:buChar char="•"/>
+              <a:defRPr sz="2400" kern="0" baseline="0">
+                <a:solidFill>
+                  <a:schemeClr val="tx1"/>
+                </a:solidFill>
+                <a:latin typeface="Segoe UI Light" panose="020B0502040204020203" pitchFamily="34" charset="0"/>
+                <a:ea typeface="Segoe UI Light" panose="020B0502040204020203" pitchFamily="34" charset="0"/>
+                <a:cs typeface="Segoe UI Light" panose="020B0502040204020203" pitchFamily="34" charset="0"/>
+              </a:defRPr>
+            </a:lvl3pPr>
+            <a:lvl4pPr marL="1599657" indent="-228522" algn="l" defTabSz="914088" rtl="0" eaLnBrk="1" latinLnBrk="0" hangingPunct="1">
+              <a:spcBef>
+                <a:spcPct val="20000"/>
+              </a:spcBef>
+              <a:buFont typeface="Arial" pitchFamily="34" charset="0"/>
+              <a:buChar char="–"/>
+              <a:defRPr sz="2000" kern="0" baseline="0">
+                <a:solidFill>
+                  <a:schemeClr val="tx1"/>
+                </a:solidFill>
+                <a:latin typeface="Segoe UI Light" panose="020B0502040204020203" pitchFamily="34" charset="0"/>
+                <a:ea typeface="Segoe UI Light" panose="020B0502040204020203" pitchFamily="34" charset="0"/>
+                <a:cs typeface="Segoe UI Light" panose="020B0502040204020203" pitchFamily="34" charset="0"/>
+              </a:defRPr>
+            </a:lvl4pPr>
+            <a:lvl5pPr marL="2056700" indent="-228522" algn="l" defTabSz="914088" rtl="0" eaLnBrk="1" latinLnBrk="0" hangingPunct="1">
+              <a:spcBef>
+                <a:spcPct val="20000"/>
+              </a:spcBef>
+              <a:buFont typeface="Arial" pitchFamily="34" charset="0"/>
+              <a:buChar char="»"/>
+              <a:defRPr sz="2000" kern="0" baseline="0">
+                <a:solidFill>
+                  <a:schemeClr val="tx1"/>
+                </a:solidFill>
+                <a:latin typeface="Segoe UI Light" panose="020B0502040204020203" pitchFamily="34" charset="0"/>
+                <a:ea typeface="Segoe UI Light" panose="020B0502040204020203" pitchFamily="34" charset="0"/>
+                <a:cs typeface="Segoe UI Light" panose="020B0502040204020203" pitchFamily="34" charset="0"/>
+              </a:defRPr>
+            </a:lvl5pPr>
+            <a:lvl6pPr marL="2513745" indent="-228522" algn="l" defTabSz="914088" rtl="0" eaLnBrk="1" latinLnBrk="0" hangingPunct="1">
+              <a:spcBef>
+                <a:spcPct val="20000"/>
+              </a:spcBef>
+              <a:buFont typeface="Arial" pitchFamily="34" charset="0"/>
+              <a:buChar char="•"/>
+              <a:defRPr sz="2000" kern="1200">
+                <a:solidFill>
+                  <a:schemeClr val="tx1"/>
+                </a:solidFill>
+                <a:latin typeface="+mn-lt"/>
+                <a:ea typeface="+mn-ea"/>
+                <a:cs typeface="+mn-cs"/>
+              </a:defRPr>
+            </a:lvl6pPr>
+            <a:lvl7pPr marL="2970789" indent="-228522" algn="l" defTabSz="914088" rtl="0" eaLnBrk="1" latinLnBrk="0" hangingPunct="1">
+              <a:spcBef>
+                <a:spcPct val="20000"/>
+              </a:spcBef>
+              <a:buFont typeface="Arial" pitchFamily="34" charset="0"/>
+              <a:buChar char="•"/>
+              <a:defRPr sz="2000" kern="1200">
+                <a:solidFill>
+                  <a:schemeClr val="tx1"/>
+                </a:solidFill>
+                <a:latin typeface="+mn-lt"/>
+                <a:ea typeface="+mn-ea"/>
+                <a:cs typeface="+mn-cs"/>
+              </a:defRPr>
+            </a:lvl7pPr>
+            <a:lvl8pPr marL="3427833" indent="-228522" algn="l" defTabSz="914088" rtl="0" eaLnBrk="1" latinLnBrk="0" hangingPunct="1">
+              <a:spcBef>
+                <a:spcPct val="20000"/>
+              </a:spcBef>
+              <a:buFont typeface="Arial" pitchFamily="34" charset="0"/>
+              <a:buChar char="•"/>
+              <a:defRPr sz="2000" kern="1200">
+                <a:solidFill>
+                  <a:schemeClr val="tx1"/>
+                </a:solidFill>
+                <a:latin typeface="+mn-lt"/>
+                <a:ea typeface="+mn-ea"/>
+                <a:cs typeface="+mn-cs"/>
+              </a:defRPr>
+            </a:lvl8pPr>
+            <a:lvl9pPr marL="3884878" indent="-228522" algn="l" defTabSz="914088" rtl="0" eaLnBrk="1" latinLnBrk="0" hangingPunct="1">
+              <a:spcBef>
+                <a:spcPct val="20000"/>
+              </a:spcBef>
+              <a:buFont typeface="Arial" pitchFamily="34" charset="0"/>
+              <a:buChar char="•"/>
+              <a:defRPr sz="2000" kern="1200">
+                <a:solidFill>
+                  <a:schemeClr val="tx1"/>
+                </a:solidFill>
+                <a:latin typeface="+mn-lt"/>
+                <a:ea typeface="+mn-ea"/>
+                <a:cs typeface="+mn-cs"/>
+              </a:defRPr>
+            </a:lvl9pPr>
+          </a:lstStyle>
+          <a:p>
+            <a:pPr marL="0" indent="0" algn="r">
+              <a:buNone/>
+            </a:pPr>
+            <a:r>
+              <a:rPr lang="en-US" sz="2800" dirty="0" smtClean="0"/>
+              <a:t>Event Hubs</a:t>
+            </a:r>
+          </a:p>
+          <a:p>
+            <a:pPr marL="0" indent="0" algn="r">
+              <a:buNone/>
+            </a:pPr>
+            <a:r>
+              <a:rPr lang="en-US" sz="2800" dirty="0" smtClean="0"/>
+              <a:t>Logging</a:t>
+            </a:r>
+          </a:p>
+          <a:p>
+            <a:pPr marL="0" indent="0" algn="r">
+              <a:buNone/>
+            </a:pPr>
+            <a:endParaRPr lang="en-US" sz="2800" dirty="0"/>
+          </a:p>
+        </p:txBody>
+      </p:sp>
+    </p:spTree>
+    <p:extLst>
+      <p:ext uri="{BB962C8B-B14F-4D97-AF65-F5344CB8AC3E}">
+        <p14:creationId xmlns:p14="http://schemas.microsoft.com/office/powerpoint/2010/main" val="560814117"/>
+      </p:ext>
+    </p:extLst>
+  </p:cSld>
+  <p:clrMapOvr>
+    <a:masterClrMapping/>
+  </p:clrMapOvr>
+  <p:timing>
+    <p:tnLst>
+      <p:par>
+        <p:cTn id="1" dur="indefinite" restart="never" nodeType="tmRoot">
+          <p:childTnLst>
+            <p:seq concurrent="1" nextAc="seek">
+              <p:cTn id="2" dur="indefinite" nodeType="mainSeq">
+                <p:childTnLst>
+                  <p:par>
+                    <p:cTn id="3" fill="hold">
+                      <p:stCondLst>
+                        <p:cond delay="indefinite"/>
+                      </p:stCondLst>
+                      <p:childTnLst>
+                        <p:par>
+                          <p:cTn id="4" fill="hold">
+                            <p:stCondLst>
+                              <p:cond delay="0"/>
+                            </p:stCondLst>
+                            <p:childTnLst>
+                              <p:par>
+                                <p:cTn id="5" presetID="1" presetClass="entr" presetSubtype="0" fill="hold" grpId="0" nodeType="clickEffect">
+                                  <p:stCondLst>
+                                    <p:cond delay="0"/>
+                                  </p:stCondLst>
+                                  <p:childTnLst>
+                                    <p:set>
+                                      <p:cBhvr>
+                                        <p:cTn id="6" dur="1" fill="hold">
+                                          <p:stCondLst>
+                                            <p:cond delay="0"/>
+                                          </p:stCondLst>
+                                        </p:cTn>
+                                        <p:tgtEl>
+                                          <p:spTgt spid="7"/>
+                                        </p:tgtEl>
+                                        <p:attrNameLst>
+                                          <p:attrName>style.visibility</p:attrName>
+                                        </p:attrNameLst>
+                                      </p:cBhvr>
+                                      <p:to>
+                                        <p:strVal val="visible"/>
+                                      </p:to>
+                                    </p:set>
+                                  </p:childTnLst>
+                                </p:cTn>
+                              </p:par>
+                            </p:childTnLst>
+                          </p:cTn>
+                        </p:par>
+                      </p:childTnLst>
+                    </p:cTn>
+                  </p:par>
+                  <p:par>
+                    <p:cTn id="7" fill="hold">
+                      <p:stCondLst>
+                        <p:cond delay="indefinite"/>
+                      </p:stCondLst>
+                      <p:childTnLst>
+                        <p:par>
+                          <p:cTn id="8" fill="hold">
+                            <p:stCondLst>
+                              <p:cond delay="0"/>
+                            </p:stCondLst>
+                            <p:childTnLst>
+                              <p:par>
+                                <p:cTn id="9" presetID="1" presetClass="exit" presetSubtype="0" fill="hold" grpId="1" nodeType="clickEffect">
+                                  <p:stCondLst>
+                                    <p:cond delay="0"/>
+                                  </p:stCondLst>
+                                  <p:childTnLst>
+                                    <p:set>
+                                      <p:cBhvr>
+                                        <p:cTn id="10" dur="1" fill="hold">
+                                          <p:stCondLst>
+                                            <p:cond delay="0"/>
+                                          </p:stCondLst>
+                                        </p:cTn>
+                                        <p:tgtEl>
+                                          <p:spTgt spid="7"/>
+                                        </p:tgtEl>
+                                        <p:attrNameLst>
+                                          <p:attrName>style.visibility</p:attrName>
+                                        </p:attrNameLst>
+                                      </p:cBhvr>
+                                      <p:to>
+                                        <p:strVal val="hidden"/>
+                                      </p:to>
+                                    </p:set>
+                                  </p:childTnLst>
+                                </p:cTn>
+                              </p:par>
+                            </p:childTnLst>
+                          </p:cTn>
+                        </p:par>
+                      </p:childTnLst>
+                    </p:cTn>
+                  </p:par>
+                </p:childTnLst>
+              </p:cTn>
+              <p:prevCondLst>
+                <p:cond evt="onPrev" delay="0">
+                  <p:tgtEl>
+                    <p:sldTgt/>
+                  </p:tgtEl>
+                </p:cond>
+              </p:prevCondLst>
+              <p:nextCondLst>
+                <p:cond evt="onNext" delay="0">
+                  <p:tgtEl>
+                    <p:sldTgt/>
+                  </p:tgtEl>
+                </p:cond>
+              </p:nextCondLst>
+            </p:seq>
+          </p:childTnLst>
+        </p:cTn>
+      </p:par>
+    </p:tnLst>
+    <p:bldLst>
+      <p:bldP spid="7" grpId="0" animBg="1"/>
+      <p:bldP spid="7" grpId="1" animBg="1"/>
+    </p:bldLst>
+  </p:timing>
+</p:sld>
+</file>
+
+<file path=ppt/slides/slide6.xml><?xml version="1.0" encoding="utf-8"?>
+<p:sld xmlns:a="http://schemas.openxmlformats.org/drawingml/2006/main" xmlns:r="http://schemas.openxmlformats.org/officeDocument/2006/relationships" xmlns:p="http://schemas.openxmlformats.org/presentationml/2006/main">
+  <p:cSld>
+    <p:spTree>
+      <p:nvGrpSpPr>
+        <p:cNvPr id="1" name=""/>
+        <p:cNvGrpSpPr/>
+        <p:nvPr/>
+      </p:nvGrpSpPr>
+      <p:grpSpPr>
+        <a:xfrm>
+          <a:off x="0" y="0"/>
+          <a:ext cx="0" cy="0"/>
+          <a:chOff x="0" y="0"/>
+          <a:chExt cx="0" cy="0"/>
+        </a:xfrm>
+      </p:grpSpPr>
+      <p:sp>
+        <p:nvSpPr>
+          <p:cNvPr id="2" name="Title 1"/>
+          <p:cNvSpPr>
+            <a:spLocks noGrp="1"/>
+          </p:cNvSpPr>
+          <p:nvPr>
+            <p:ph type="title"/>
+          </p:nvPr>
+        </p:nvSpPr>
+        <p:spPr/>
+        <p:txBody>
+          <a:bodyPr/>
+          <a:lstStyle/>
+          <a:p>
+            <a:r>
+              <a:rPr lang="en-US" dirty="0" smtClean="0"/>
+              <a:t>Storage Types</a:t>
+            </a:r>
+            <a:endParaRPr lang="en-US" dirty="0"/>
+          </a:p>
+        </p:txBody>
+      </p:sp>
+      <p:sp>
+        <p:nvSpPr>
+          <p:cNvPr id="3" name="Content Placeholder 2"/>
+          <p:cNvSpPr>
+            <a:spLocks noGrp="1"/>
+          </p:cNvSpPr>
+          <p:nvPr>
+            <p:ph sz="quarter" idx="10"/>
+          </p:nvPr>
+        </p:nvSpPr>
+        <p:spPr>
+          <a:xfrm>
+            <a:off x="379414" y="1388226"/>
+            <a:ext cx="4179140" cy="5290388"/>
+          </a:xfrm>
+        </p:spPr>
+        <p:txBody>
+          <a:bodyPr/>
+          <a:lstStyle/>
+          <a:p>
+            <a:r>
+              <a:rPr lang="en-US" dirty="0" smtClean="0"/>
+              <a:t>Security</a:t>
+            </a:r>
+          </a:p>
+          <a:p>
+            <a:r>
+              <a:rPr lang="en-US" dirty="0" smtClean="0"/>
+              <a:t>Integration</a:t>
+            </a:r>
+          </a:p>
+          <a:p>
+            <a:r>
+              <a:rPr lang="en-US" dirty="0" smtClean="0"/>
+              <a:t>Analytics</a:t>
+            </a:r>
+          </a:p>
+          <a:p>
+            <a:r>
+              <a:rPr lang="en-US" b="1" dirty="0" smtClean="0"/>
+              <a:t>Data</a:t>
+            </a:r>
+          </a:p>
+          <a:p>
+            <a:r>
+              <a:rPr lang="en-US" dirty="0" smtClean="0"/>
+              <a:t>Plain Old Storage</a:t>
+            </a:r>
+          </a:p>
+          <a:p>
+            <a:r>
+              <a:rPr lang="en-US" dirty="0" smtClean="0"/>
+              <a:t>Peripheral Concerns</a:t>
+            </a:r>
+            <a:endParaRPr lang="en-US" dirty="0"/>
+          </a:p>
+        </p:txBody>
+      </p:sp>
+      <p:sp>
+        <p:nvSpPr>
+          <p:cNvPr id="4" name="TextBox 3"/>
+          <p:cNvSpPr txBox="1"/>
+          <p:nvPr/>
+        </p:nvSpPr>
+        <p:spPr>
+          <a:xfrm>
+            <a:off x="9906000" y="-1"/>
+            <a:ext cx="2286000" cy="2031325"/>
+          </a:xfrm>
+          <a:prstGeom prst="rect">
+            <a:avLst/>
+          </a:prstGeom>
+          <a:solidFill>
+            <a:srgbClr val="FFFF00"/>
+          </a:solidFill>
+          <a:ln>
+            <a:noFill/>
+          </a:ln>
+        </p:spPr>
+        <p:txBody>
+          <a:bodyPr wrap="square" rtlCol="0">
+            <a:spAutoFit/>
+          </a:bodyPr>
+          <a:lstStyle/>
+          <a:p>
+            <a:pPr algn="ctr"/>
+            <a:endParaRPr lang="en-US" dirty="0" smtClean="0"/>
+          </a:p>
+          <a:p>
+            <a:pPr algn="ctr"/>
+            <a:endParaRPr lang="en-US" dirty="0"/>
+          </a:p>
+          <a:p>
+            <a:pPr algn="ctr"/>
+            <a:r>
+              <a:rPr lang="en-US" dirty="0" smtClean="0"/>
+              <a:t>Please leave this area blank to allow for picture in picture recording</a:t>
+            </a:r>
+          </a:p>
+          <a:p>
+            <a:pPr algn="ctr"/>
+            <a:endParaRPr lang="en-US" dirty="0"/>
+          </a:p>
+        </p:txBody>
+      </p:sp>
+      <p:sp>
+        <p:nvSpPr>
+          <p:cNvPr id="8" name="Content Placeholder 2"/>
+          <p:cNvSpPr txBox="1">
+            <a:spLocks/>
+          </p:cNvSpPr>
+          <p:nvPr/>
+        </p:nvSpPr>
+        <p:spPr>
+          <a:xfrm>
+            <a:off x="5486400" y="3373726"/>
+            <a:ext cx="3862605" cy="2402150"/>
+          </a:xfrm>
+          <a:prstGeom prst="rect">
+            <a:avLst/>
+          </a:prstGeom>
+          <a:solidFill>
+            <a:schemeClr val="accent3">
+              <a:lumMod val="20000"/>
+              <a:lumOff val="80000"/>
+            </a:schemeClr>
+          </a:solidFill>
+        </p:spPr>
+        <p:txBody>
+          <a:bodyPr/>
+          <a:lstStyle>
+            <a:lvl1pPr marL="342783" indent="-342783" algn="l" defTabSz="914088" rtl="0" eaLnBrk="1" latinLnBrk="0" hangingPunct="1">
+              <a:spcBef>
+                <a:spcPts val="1400"/>
+              </a:spcBef>
+              <a:buFont typeface="Arial" pitchFamily="34" charset="0"/>
+              <a:buChar char="•"/>
+              <a:defRPr sz="3200" b="0" kern="0" baseline="0">
+                <a:solidFill>
+                  <a:schemeClr val="tx1"/>
+                </a:solidFill>
+                <a:latin typeface="Segoe UI Light" panose="020B0502040204020203" pitchFamily="34" charset="0"/>
+                <a:ea typeface="Segoe UI Light" panose="020B0502040204020203" pitchFamily="34" charset="0"/>
+                <a:cs typeface="Segoe UI Light" panose="020B0502040204020203" pitchFamily="34" charset="0"/>
+              </a:defRPr>
+            </a:lvl1pPr>
+            <a:lvl2pPr marL="742698" indent="-285652" algn="l" defTabSz="914088" rtl="0" eaLnBrk="1" latinLnBrk="0" hangingPunct="1">
+              <a:spcBef>
+                <a:spcPts val="300"/>
+              </a:spcBef>
+              <a:spcAft>
+                <a:spcPts val="300"/>
+              </a:spcAft>
+              <a:buFont typeface="Arial" pitchFamily="34" charset="0"/>
+              <a:buChar char="–"/>
+              <a:defRPr sz="2800" kern="0" baseline="0">
+                <a:solidFill>
+                  <a:schemeClr val="tx1"/>
+                </a:solidFill>
+                <a:latin typeface="Segoe UI Light" panose="020B0502040204020203" pitchFamily="34" charset="0"/>
+                <a:ea typeface="Segoe UI Light" panose="020B0502040204020203" pitchFamily="34" charset="0"/>
+                <a:cs typeface="Segoe UI Light" panose="020B0502040204020203" pitchFamily="34" charset="0"/>
+              </a:defRPr>
+            </a:lvl2pPr>
+            <a:lvl3pPr marL="1142612" indent="-228522" algn="l" defTabSz="914088" rtl="0" eaLnBrk="1" latinLnBrk="0" hangingPunct="1">
+              <a:spcBef>
+                <a:spcPts val="200"/>
+              </a:spcBef>
+              <a:spcAft>
+                <a:spcPts val="200"/>
+              </a:spcAft>
+              <a:buFont typeface="Arial" pitchFamily="34" charset="0"/>
+              <a:buChar char="•"/>
+              <a:defRPr sz="2400" kern="0" baseline="0">
+                <a:solidFill>
+                  <a:schemeClr val="tx1"/>
+                </a:solidFill>
+                <a:latin typeface="Segoe UI Light" panose="020B0502040204020203" pitchFamily="34" charset="0"/>
+                <a:ea typeface="Segoe UI Light" panose="020B0502040204020203" pitchFamily="34" charset="0"/>
+                <a:cs typeface="Segoe UI Light" panose="020B0502040204020203" pitchFamily="34" charset="0"/>
+              </a:defRPr>
+            </a:lvl3pPr>
+            <a:lvl4pPr marL="1599657" indent="-228522" algn="l" defTabSz="914088" rtl="0" eaLnBrk="1" latinLnBrk="0" hangingPunct="1">
+              <a:spcBef>
+                <a:spcPct val="20000"/>
+              </a:spcBef>
+              <a:buFont typeface="Arial" pitchFamily="34" charset="0"/>
+              <a:buChar char="–"/>
+              <a:defRPr sz="2000" kern="0" baseline="0">
+                <a:solidFill>
+                  <a:schemeClr val="tx1"/>
+                </a:solidFill>
+                <a:latin typeface="Segoe UI Light" panose="020B0502040204020203" pitchFamily="34" charset="0"/>
+                <a:ea typeface="Segoe UI Light" panose="020B0502040204020203" pitchFamily="34" charset="0"/>
+                <a:cs typeface="Segoe UI Light" panose="020B0502040204020203" pitchFamily="34" charset="0"/>
+              </a:defRPr>
+            </a:lvl4pPr>
+            <a:lvl5pPr marL="2056700" indent="-228522" algn="l" defTabSz="914088" rtl="0" eaLnBrk="1" latinLnBrk="0" hangingPunct="1">
+              <a:spcBef>
+                <a:spcPct val="20000"/>
+              </a:spcBef>
+              <a:buFont typeface="Arial" pitchFamily="34" charset="0"/>
+              <a:buChar char="»"/>
+              <a:defRPr sz="2000" kern="0" baseline="0">
+                <a:solidFill>
+                  <a:schemeClr val="tx1"/>
+                </a:solidFill>
+                <a:latin typeface="Segoe UI Light" panose="020B0502040204020203" pitchFamily="34" charset="0"/>
+                <a:ea typeface="Segoe UI Light" panose="020B0502040204020203" pitchFamily="34" charset="0"/>
+                <a:cs typeface="Segoe UI Light" panose="020B0502040204020203" pitchFamily="34" charset="0"/>
+              </a:defRPr>
+            </a:lvl5pPr>
+            <a:lvl6pPr marL="2513745" indent="-228522" algn="l" defTabSz="914088" rtl="0" eaLnBrk="1" latinLnBrk="0" hangingPunct="1">
+              <a:spcBef>
+                <a:spcPct val="20000"/>
+              </a:spcBef>
+              <a:buFont typeface="Arial" pitchFamily="34" charset="0"/>
+              <a:buChar char="•"/>
+              <a:defRPr sz="2000" kern="1200">
+                <a:solidFill>
+                  <a:schemeClr val="tx1"/>
+                </a:solidFill>
+                <a:latin typeface="+mn-lt"/>
+                <a:ea typeface="+mn-ea"/>
+                <a:cs typeface="+mn-cs"/>
+              </a:defRPr>
+            </a:lvl6pPr>
+            <a:lvl7pPr marL="2970789" indent="-228522" algn="l" defTabSz="914088" rtl="0" eaLnBrk="1" latinLnBrk="0" hangingPunct="1">
+              <a:spcBef>
+                <a:spcPct val="20000"/>
+              </a:spcBef>
+              <a:buFont typeface="Arial" pitchFamily="34" charset="0"/>
+              <a:buChar char="•"/>
+              <a:defRPr sz="2000" kern="1200">
+                <a:solidFill>
+                  <a:schemeClr val="tx1"/>
+                </a:solidFill>
+                <a:latin typeface="+mn-lt"/>
+                <a:ea typeface="+mn-ea"/>
+                <a:cs typeface="+mn-cs"/>
+              </a:defRPr>
+            </a:lvl7pPr>
+            <a:lvl8pPr marL="3427833" indent="-228522" algn="l" defTabSz="914088" rtl="0" eaLnBrk="1" latinLnBrk="0" hangingPunct="1">
+              <a:spcBef>
+                <a:spcPct val="20000"/>
+              </a:spcBef>
+              <a:buFont typeface="Arial" pitchFamily="34" charset="0"/>
+              <a:buChar char="•"/>
+              <a:defRPr sz="2000" kern="1200">
+                <a:solidFill>
+                  <a:schemeClr val="tx1"/>
+                </a:solidFill>
+                <a:latin typeface="+mn-lt"/>
+                <a:ea typeface="+mn-ea"/>
+                <a:cs typeface="+mn-cs"/>
+              </a:defRPr>
+            </a:lvl8pPr>
+            <a:lvl9pPr marL="3884878" indent="-228522" algn="l" defTabSz="914088" rtl="0" eaLnBrk="1" latinLnBrk="0" hangingPunct="1">
+              <a:spcBef>
+                <a:spcPct val="20000"/>
+              </a:spcBef>
+              <a:buFont typeface="Arial" pitchFamily="34" charset="0"/>
+              <a:buChar char="•"/>
+              <a:defRPr sz="2000" kern="1200">
+                <a:solidFill>
+                  <a:schemeClr val="tx1"/>
+                </a:solidFill>
+                <a:latin typeface="+mn-lt"/>
+                <a:ea typeface="+mn-ea"/>
+                <a:cs typeface="+mn-cs"/>
+              </a:defRPr>
+            </a:lvl9pPr>
+          </a:lstStyle>
+          <a:p>
+            <a:pPr marL="0" indent="0" algn="r">
+              <a:buNone/>
+            </a:pPr>
+            <a:r>
+              <a:rPr lang="en-US" sz="2800" dirty="0" smtClean="0"/>
+              <a:t>Relational Data</a:t>
+            </a:r>
+          </a:p>
+          <a:p>
+            <a:pPr marL="0" indent="0" algn="r">
+              <a:buNone/>
+            </a:pPr>
+            <a:r>
+              <a:rPr lang="en-US" sz="2800" dirty="0"/>
+              <a:t>Table Storage</a:t>
+            </a:r>
+          </a:p>
+          <a:p>
+            <a:pPr marL="0" indent="0" algn="r">
+              <a:buNone/>
+            </a:pPr>
+            <a:r>
+              <a:rPr lang="en-US" sz="2800" dirty="0" err="1" smtClean="0"/>
+              <a:t>DocumentDB</a:t>
+            </a:r>
+            <a:endParaRPr lang="en-US" sz="2800" dirty="0" smtClean="0"/>
+          </a:p>
+          <a:p>
+            <a:pPr marL="0" indent="0" algn="r">
+              <a:buNone/>
+            </a:pPr>
+            <a:r>
+              <a:rPr lang="en-US" sz="2800" dirty="0" smtClean="0"/>
+              <a:t>Search and Cache</a:t>
+            </a:r>
+          </a:p>
+          <a:p>
+            <a:pPr marL="0" indent="0" algn="r">
+              <a:buNone/>
+            </a:pPr>
+            <a:endParaRPr lang="en-US" sz="2800" dirty="0"/>
+          </a:p>
+        </p:txBody>
+      </p:sp>
+    </p:spTree>
+    <p:extLst>
+      <p:ext uri="{BB962C8B-B14F-4D97-AF65-F5344CB8AC3E}">
+        <p14:creationId xmlns:p14="http://schemas.microsoft.com/office/powerpoint/2010/main" val="2075938855"/>
+      </p:ext>
+    </p:extLst>
+  </p:cSld>
+  <p:clrMapOvr>
+    <a:masterClrMapping/>
+  </p:clrMapOvr>
+  <p:timing>
+    <p:tnLst>
+      <p:par>
+        <p:cTn id="1" dur="indefinite" restart="never" nodeType="tmRoot">
+          <p:childTnLst>
+            <p:seq concurrent="1" nextAc="seek">
+              <p:cTn id="2" dur="indefinite" nodeType="mainSeq">
+                <p:childTnLst>
+                  <p:par>
+                    <p:cTn id="3" fill="hold">
+                      <p:stCondLst>
+                        <p:cond delay="indefinite"/>
+                      </p:stCondLst>
+                      <p:childTnLst>
+                        <p:par>
+                          <p:cTn id="4" fill="hold">
+                            <p:stCondLst>
+                              <p:cond delay="0"/>
+                            </p:stCondLst>
+                            <p:childTnLst>
+                              <p:par>
+                                <p:cTn id="5" presetID="1" presetClass="entr" presetSubtype="0" fill="hold" grpId="0" nodeType="clickEffect">
+                                  <p:stCondLst>
+                                    <p:cond delay="0"/>
+                                  </p:stCondLst>
+                                  <p:childTnLst>
+                                    <p:set>
+                                      <p:cBhvr>
+                                        <p:cTn id="6" dur="1" fill="hold">
+                                          <p:stCondLst>
+                                            <p:cond delay="0"/>
+                                          </p:stCondLst>
+                                        </p:cTn>
+                                        <p:tgtEl>
+                                          <p:spTgt spid="8"/>
+                                        </p:tgtEl>
+                                        <p:attrNameLst>
+                                          <p:attrName>style.visibility</p:attrName>
+                                        </p:attrNameLst>
+                                      </p:cBhvr>
+                                      <p:to>
+                                        <p:strVal val="visible"/>
+                                      </p:to>
+                                    </p:set>
+                                  </p:childTnLst>
+                                </p:cTn>
+                              </p:par>
+                            </p:childTnLst>
+                          </p:cTn>
+                        </p:par>
+                      </p:childTnLst>
+                    </p:cTn>
+                  </p:par>
+                  <p:par>
+                    <p:cTn id="7" fill="hold">
+                      <p:stCondLst>
+                        <p:cond delay="indefinite"/>
+                      </p:stCondLst>
+                      <p:childTnLst>
+                        <p:par>
+                          <p:cTn id="8" fill="hold">
+                            <p:stCondLst>
+                              <p:cond delay="0"/>
+                            </p:stCondLst>
+                            <p:childTnLst>
+                              <p:par>
+                                <p:cTn id="9" presetID="1" presetClass="exit" presetSubtype="0" fill="hold" grpId="1" nodeType="clickEffect">
+                                  <p:stCondLst>
+                                    <p:cond delay="0"/>
+                                  </p:stCondLst>
+                                  <p:childTnLst>
+                                    <p:set>
+                                      <p:cBhvr>
+                                        <p:cTn id="10" dur="1" fill="hold">
+                                          <p:stCondLst>
+                                            <p:cond delay="0"/>
+                                          </p:stCondLst>
+                                        </p:cTn>
+                                        <p:tgtEl>
+                                          <p:spTgt spid="8"/>
+                                        </p:tgtEl>
+                                        <p:attrNameLst>
+                                          <p:attrName>style.visibility</p:attrName>
+                                        </p:attrNameLst>
+                                      </p:cBhvr>
+                                      <p:to>
+                                        <p:strVal val="hidden"/>
+                                      </p:to>
+                                    </p:set>
+                                  </p:childTnLst>
+                                </p:cTn>
+                              </p:par>
+                            </p:childTnLst>
+                          </p:cTn>
+                        </p:par>
+                      </p:childTnLst>
+                    </p:cTn>
+                  </p:par>
+                </p:childTnLst>
+              </p:cTn>
+              <p:prevCondLst>
+                <p:cond evt="onPrev" delay="0">
+                  <p:tgtEl>
+                    <p:sldTgt/>
+                  </p:tgtEl>
+                </p:cond>
+              </p:prevCondLst>
+              <p:nextCondLst>
+                <p:cond evt="onNext" delay="0">
+                  <p:tgtEl>
+                    <p:sldTgt/>
+                  </p:tgtEl>
+                </p:cond>
+              </p:nextCondLst>
+            </p:seq>
+          </p:childTnLst>
+        </p:cTn>
+      </p:par>
+    </p:tnLst>
+    <p:bldLst>
+      <p:bldP spid="8" grpId="0" animBg="1"/>
+      <p:bldP spid="8" grpId="1" animBg="1"/>
+    </p:bldLst>
+  </p:timing>
+</p:sld>
+</file>
+
+<file path=ppt/slides/slide7.xml><?xml version="1.0" encoding="utf-8"?>
+<p:sld xmlns:a="http://schemas.openxmlformats.org/drawingml/2006/main" xmlns:r="http://schemas.openxmlformats.org/officeDocument/2006/relationships" xmlns:p="http://schemas.openxmlformats.org/presentationml/2006/main">
+  <p:cSld>
+    <p:spTree>
+      <p:nvGrpSpPr>
+        <p:cNvPr id="1" name=""/>
+        <p:cNvGrpSpPr/>
+        <p:nvPr/>
+      </p:nvGrpSpPr>
+      <p:grpSpPr>
+        <a:xfrm>
+          <a:off x="0" y="0"/>
+          <a:ext cx="0" cy="0"/>
+          <a:chOff x="0" y="0"/>
+          <a:chExt cx="0" cy="0"/>
+        </a:xfrm>
+      </p:grpSpPr>
+      <p:sp>
+        <p:nvSpPr>
+          <p:cNvPr id="2" name="Title 1"/>
+          <p:cNvSpPr>
+            <a:spLocks noGrp="1"/>
+          </p:cNvSpPr>
+          <p:nvPr>
+            <p:ph type="title"/>
+          </p:nvPr>
+        </p:nvSpPr>
+        <p:spPr/>
+        <p:txBody>
+          <a:bodyPr/>
+          <a:lstStyle/>
+          <a:p>
+            <a:r>
+              <a:rPr lang="en-US" dirty="0" smtClean="0"/>
+              <a:t>Storage Types</a:t>
+            </a:r>
+            <a:endParaRPr lang="en-US" dirty="0"/>
+          </a:p>
+        </p:txBody>
+      </p:sp>
+      <p:sp>
+        <p:nvSpPr>
+          <p:cNvPr id="3" name="Content Placeholder 2"/>
+          <p:cNvSpPr>
+            <a:spLocks noGrp="1"/>
+          </p:cNvSpPr>
+          <p:nvPr>
+            <p:ph sz="quarter" idx="10"/>
+          </p:nvPr>
+        </p:nvSpPr>
+        <p:spPr>
+          <a:xfrm>
+            <a:off x="379414" y="1388226"/>
+            <a:ext cx="4179140" cy="5290388"/>
+          </a:xfrm>
+        </p:spPr>
+        <p:txBody>
+          <a:bodyPr/>
+          <a:lstStyle/>
+          <a:p>
+            <a:r>
+              <a:rPr lang="en-US" dirty="0" smtClean="0"/>
+              <a:t>Security</a:t>
+            </a:r>
+          </a:p>
+          <a:p>
+            <a:r>
+              <a:rPr lang="en-US" dirty="0" smtClean="0"/>
+              <a:t>Integration</a:t>
+            </a:r>
+          </a:p>
+          <a:p>
+            <a:r>
+              <a:rPr lang="en-US" dirty="0" smtClean="0"/>
+              <a:t>Analytics</a:t>
+            </a:r>
+          </a:p>
+          <a:p>
+            <a:r>
+              <a:rPr lang="en-US" dirty="0" smtClean="0"/>
+              <a:t>Data</a:t>
+            </a:r>
+          </a:p>
+          <a:p>
+            <a:r>
+              <a:rPr lang="en-US" b="1" dirty="0" smtClean="0"/>
+              <a:t>Plain Old Storage</a:t>
+            </a:r>
+          </a:p>
+          <a:p>
+            <a:r>
+              <a:rPr lang="en-US" dirty="0" smtClean="0"/>
+              <a:t>Peripheral Concerns</a:t>
+            </a:r>
+            <a:endParaRPr lang="en-US" dirty="0"/>
+          </a:p>
+        </p:txBody>
+      </p:sp>
+      <p:sp>
+        <p:nvSpPr>
+          <p:cNvPr id="4" name="TextBox 3"/>
+          <p:cNvSpPr txBox="1"/>
+          <p:nvPr/>
+        </p:nvSpPr>
+        <p:spPr>
+          <a:xfrm>
+            <a:off x="9906000" y="-1"/>
+            <a:ext cx="2286000" cy="2031325"/>
+          </a:xfrm>
+          <a:prstGeom prst="rect">
+            <a:avLst/>
+          </a:prstGeom>
+          <a:solidFill>
+            <a:srgbClr val="FFFF00"/>
+          </a:solidFill>
+          <a:ln>
+            <a:noFill/>
+          </a:ln>
+        </p:spPr>
+        <p:txBody>
+          <a:bodyPr wrap="square" rtlCol="0">
+            <a:spAutoFit/>
+          </a:bodyPr>
+          <a:lstStyle/>
+          <a:p>
+            <a:pPr algn="ctr"/>
+            <a:endParaRPr lang="en-US" dirty="0" smtClean="0"/>
+          </a:p>
+          <a:p>
+            <a:pPr algn="ctr"/>
+            <a:endParaRPr lang="en-US" dirty="0"/>
+          </a:p>
+          <a:p>
+            <a:pPr algn="ctr"/>
+            <a:r>
+              <a:rPr lang="en-US" dirty="0" smtClean="0"/>
+              <a:t>Please leave this area blank to allow for picture in picture recording</a:t>
+            </a:r>
+          </a:p>
+          <a:p>
+            <a:pPr algn="ctr"/>
+            <a:endParaRPr lang="en-US" dirty="0"/>
+          </a:p>
+        </p:txBody>
+      </p:sp>
+      <p:sp>
+        <p:nvSpPr>
+          <p:cNvPr id="9" name="Content Placeholder 2"/>
+          <p:cNvSpPr txBox="1">
+            <a:spLocks/>
+          </p:cNvSpPr>
+          <p:nvPr/>
+        </p:nvSpPr>
+        <p:spPr>
+          <a:xfrm>
+            <a:off x="5486400" y="4056564"/>
+            <a:ext cx="3862604" cy="1368674"/>
+          </a:xfrm>
+          <a:prstGeom prst="rect">
+            <a:avLst/>
+          </a:prstGeom>
+          <a:solidFill>
+            <a:schemeClr val="accent3">
+              <a:lumMod val="20000"/>
+              <a:lumOff val="80000"/>
+            </a:schemeClr>
+          </a:solidFill>
+        </p:spPr>
+        <p:txBody>
+          <a:bodyPr/>
+          <a:lstStyle>
+            <a:lvl1pPr marL="342783" indent="-342783" algn="l" defTabSz="914088" rtl="0" eaLnBrk="1" latinLnBrk="0" hangingPunct="1">
+              <a:spcBef>
+                <a:spcPts val="1400"/>
+              </a:spcBef>
+              <a:buFont typeface="Arial" pitchFamily="34" charset="0"/>
+              <a:buChar char="•"/>
+              <a:defRPr sz="3200" b="0" kern="0" baseline="0">
+                <a:solidFill>
+                  <a:schemeClr val="tx1"/>
+                </a:solidFill>
+                <a:latin typeface="Segoe UI Light" panose="020B0502040204020203" pitchFamily="34" charset="0"/>
+                <a:ea typeface="Segoe UI Light" panose="020B0502040204020203" pitchFamily="34" charset="0"/>
+                <a:cs typeface="Segoe UI Light" panose="020B0502040204020203" pitchFamily="34" charset="0"/>
+              </a:defRPr>
+            </a:lvl1pPr>
+            <a:lvl2pPr marL="742698" indent="-285652" algn="l" defTabSz="914088" rtl="0" eaLnBrk="1" latinLnBrk="0" hangingPunct="1">
+              <a:spcBef>
+                <a:spcPts val="300"/>
+              </a:spcBef>
+              <a:spcAft>
+                <a:spcPts val="300"/>
+              </a:spcAft>
+              <a:buFont typeface="Arial" pitchFamily="34" charset="0"/>
+              <a:buChar char="–"/>
+              <a:defRPr sz="2800" kern="0" baseline="0">
+                <a:solidFill>
+                  <a:schemeClr val="tx1"/>
+                </a:solidFill>
+                <a:latin typeface="Segoe UI Light" panose="020B0502040204020203" pitchFamily="34" charset="0"/>
+                <a:ea typeface="Segoe UI Light" panose="020B0502040204020203" pitchFamily="34" charset="0"/>
+                <a:cs typeface="Segoe UI Light" panose="020B0502040204020203" pitchFamily="34" charset="0"/>
+              </a:defRPr>
+            </a:lvl2pPr>
+            <a:lvl3pPr marL="1142612" indent="-228522" algn="l" defTabSz="914088" rtl="0" eaLnBrk="1" latinLnBrk="0" hangingPunct="1">
+              <a:spcBef>
+                <a:spcPts val="200"/>
+              </a:spcBef>
+              <a:spcAft>
+                <a:spcPts val="200"/>
+              </a:spcAft>
+              <a:buFont typeface="Arial" pitchFamily="34" charset="0"/>
+              <a:buChar char="•"/>
+              <a:defRPr sz="2400" kern="0" baseline="0">
+                <a:solidFill>
+                  <a:schemeClr val="tx1"/>
+                </a:solidFill>
+                <a:latin typeface="Segoe UI Light" panose="020B0502040204020203" pitchFamily="34" charset="0"/>
+                <a:ea typeface="Segoe UI Light" panose="020B0502040204020203" pitchFamily="34" charset="0"/>
+                <a:cs typeface="Segoe UI Light" panose="020B0502040204020203" pitchFamily="34" charset="0"/>
+              </a:defRPr>
+            </a:lvl3pPr>
+            <a:lvl4pPr marL="1599657" indent="-228522" algn="l" defTabSz="914088" rtl="0" eaLnBrk="1" latinLnBrk="0" hangingPunct="1">
+              <a:spcBef>
+                <a:spcPct val="20000"/>
+              </a:spcBef>
+              <a:buFont typeface="Arial" pitchFamily="34" charset="0"/>
+              <a:buChar char="–"/>
+              <a:defRPr sz="2000" kern="0" baseline="0">
+                <a:solidFill>
+                  <a:schemeClr val="tx1"/>
+                </a:solidFill>
+                <a:latin typeface="Segoe UI Light" panose="020B0502040204020203" pitchFamily="34" charset="0"/>
+                <a:ea typeface="Segoe UI Light" panose="020B0502040204020203" pitchFamily="34" charset="0"/>
+                <a:cs typeface="Segoe UI Light" panose="020B0502040204020203" pitchFamily="34" charset="0"/>
+              </a:defRPr>
+            </a:lvl4pPr>
+            <a:lvl5pPr marL="2056700" indent="-228522" algn="l" defTabSz="914088" rtl="0" eaLnBrk="1" latinLnBrk="0" hangingPunct="1">
+              <a:spcBef>
+                <a:spcPct val="20000"/>
+              </a:spcBef>
+              <a:buFont typeface="Arial" pitchFamily="34" charset="0"/>
+              <a:buChar char="»"/>
+              <a:defRPr sz="2000" kern="0" baseline="0">
+                <a:solidFill>
+                  <a:schemeClr val="tx1"/>
+                </a:solidFill>
+                <a:latin typeface="Segoe UI Light" panose="020B0502040204020203" pitchFamily="34" charset="0"/>
+                <a:ea typeface="Segoe UI Light" panose="020B0502040204020203" pitchFamily="34" charset="0"/>
+                <a:cs typeface="Segoe UI Light" panose="020B0502040204020203" pitchFamily="34" charset="0"/>
+              </a:defRPr>
+            </a:lvl5pPr>
+            <a:lvl6pPr marL="2513745" indent="-228522" algn="l" defTabSz="914088" rtl="0" eaLnBrk="1" latinLnBrk="0" hangingPunct="1">
+              <a:spcBef>
+                <a:spcPct val="20000"/>
+              </a:spcBef>
+              <a:buFont typeface="Arial" pitchFamily="34" charset="0"/>
+              <a:buChar char="•"/>
+              <a:defRPr sz="2000" kern="1200">
+                <a:solidFill>
+                  <a:schemeClr val="tx1"/>
+                </a:solidFill>
+                <a:latin typeface="+mn-lt"/>
+                <a:ea typeface="+mn-ea"/>
+                <a:cs typeface="+mn-cs"/>
+              </a:defRPr>
+            </a:lvl6pPr>
+            <a:lvl7pPr marL="2970789" indent="-228522" algn="l" defTabSz="914088" rtl="0" eaLnBrk="1" latinLnBrk="0" hangingPunct="1">
+              <a:spcBef>
+                <a:spcPct val="20000"/>
+              </a:spcBef>
+              <a:buFont typeface="Arial" pitchFamily="34" charset="0"/>
+              <a:buChar char="•"/>
+              <a:defRPr sz="2000" kern="1200">
+                <a:solidFill>
+                  <a:schemeClr val="tx1"/>
+                </a:solidFill>
+                <a:latin typeface="+mn-lt"/>
+                <a:ea typeface="+mn-ea"/>
+                <a:cs typeface="+mn-cs"/>
+              </a:defRPr>
+            </a:lvl7pPr>
+            <a:lvl8pPr marL="3427833" indent="-228522" algn="l" defTabSz="914088" rtl="0" eaLnBrk="1" latinLnBrk="0" hangingPunct="1">
+              <a:spcBef>
+                <a:spcPct val="20000"/>
+              </a:spcBef>
+              <a:buFont typeface="Arial" pitchFamily="34" charset="0"/>
+              <a:buChar char="•"/>
+              <a:defRPr sz="2000" kern="1200">
+                <a:solidFill>
+                  <a:schemeClr val="tx1"/>
+                </a:solidFill>
+                <a:latin typeface="+mn-lt"/>
+                <a:ea typeface="+mn-ea"/>
+                <a:cs typeface="+mn-cs"/>
+              </a:defRPr>
+            </a:lvl8pPr>
+            <a:lvl9pPr marL="3884878" indent="-228522" algn="l" defTabSz="914088" rtl="0" eaLnBrk="1" latinLnBrk="0" hangingPunct="1">
+              <a:spcBef>
+                <a:spcPct val="20000"/>
+              </a:spcBef>
+              <a:buFont typeface="Arial" pitchFamily="34" charset="0"/>
+              <a:buChar char="•"/>
+              <a:defRPr sz="2000" kern="1200">
+                <a:solidFill>
+                  <a:schemeClr val="tx1"/>
+                </a:solidFill>
+                <a:latin typeface="+mn-lt"/>
+                <a:ea typeface="+mn-ea"/>
+                <a:cs typeface="+mn-cs"/>
+              </a:defRPr>
+            </a:lvl9pPr>
+          </a:lstStyle>
+          <a:p>
+            <a:pPr marL="0" indent="0" algn="r">
+              <a:buNone/>
+            </a:pPr>
+            <a:r>
+              <a:rPr lang="en-US" sz="2800" dirty="0" smtClean="0"/>
+              <a:t>Blobs</a:t>
+            </a:r>
+          </a:p>
+          <a:p>
+            <a:pPr marL="0" indent="0" algn="r">
+              <a:buNone/>
+            </a:pPr>
+            <a:r>
+              <a:rPr lang="en-US" sz="2800" dirty="0" smtClean="0"/>
+              <a:t>Files</a:t>
+            </a:r>
+          </a:p>
+          <a:p>
+            <a:pPr marL="0" indent="0" algn="r">
+              <a:buNone/>
+            </a:pPr>
+            <a:endParaRPr lang="en-US" sz="2800" dirty="0"/>
+          </a:p>
+        </p:txBody>
+      </p:sp>
+    </p:spTree>
+    <p:extLst>
+      <p:ext uri="{BB962C8B-B14F-4D97-AF65-F5344CB8AC3E}">
+        <p14:creationId xmlns:p14="http://schemas.microsoft.com/office/powerpoint/2010/main" val="3680661139"/>
+      </p:ext>
+    </p:extLst>
+  </p:cSld>
+  <p:clrMapOvr>
+    <a:masterClrMapping/>
+  </p:clrMapOvr>
+  <p:timing>
+    <p:tnLst>
+      <p:par>
+        <p:cTn id="1" dur="indefinite" restart="never" nodeType="tmRoot">
+          <p:childTnLst>
+            <p:seq concurrent="1" nextAc="seek">
+              <p:cTn id="2" dur="indefinite" nodeType="mainSeq">
+                <p:childTnLst>
+                  <p:par>
+                    <p:cTn id="3" fill="hold">
+                      <p:stCondLst>
+                        <p:cond delay="indefinite"/>
+                      </p:stCondLst>
+                      <p:childTnLst>
+                        <p:par>
+                          <p:cTn id="4" fill="hold">
+                            <p:stCondLst>
+                              <p:cond delay="0"/>
+                            </p:stCondLst>
+                            <p:childTnLst>
+                              <p:par>
+                                <p:cTn id="5" presetID="1" presetClass="entr" presetSubtype="0" fill="hold" grpId="0" nodeType="clickEffect">
+                                  <p:stCondLst>
+                                    <p:cond delay="0"/>
+                                  </p:stCondLst>
+                                  <p:childTnLst>
+                                    <p:set>
+                                      <p:cBhvr>
+                                        <p:cTn id="6" dur="1" fill="hold">
+                                          <p:stCondLst>
+                                            <p:cond delay="0"/>
+                                          </p:stCondLst>
+                                        </p:cTn>
+                                        <p:tgtEl>
+                                          <p:spTgt spid="9"/>
+                                        </p:tgtEl>
+                                        <p:attrNameLst>
+                                          <p:attrName>style.visibility</p:attrName>
+                                        </p:attrNameLst>
+                                      </p:cBhvr>
+                                      <p:to>
+                                        <p:strVal val="visible"/>
+                                      </p:to>
+                                    </p:set>
+                                  </p:childTnLst>
+                                </p:cTn>
+                              </p:par>
+                            </p:childTnLst>
+                          </p:cTn>
+                        </p:par>
+                      </p:childTnLst>
+                    </p:cTn>
+                  </p:par>
+                  <p:par>
+                    <p:cTn id="7" fill="hold">
+                      <p:stCondLst>
+                        <p:cond delay="indefinite"/>
+                      </p:stCondLst>
+                      <p:childTnLst>
+                        <p:par>
+                          <p:cTn id="8" fill="hold">
+                            <p:stCondLst>
+                              <p:cond delay="0"/>
+                            </p:stCondLst>
+                            <p:childTnLst>
+                              <p:par>
+                                <p:cTn id="9" presetID="1" presetClass="exit" presetSubtype="0" fill="hold" grpId="1" nodeType="clickEffect">
+                                  <p:stCondLst>
+                                    <p:cond delay="0"/>
+                                  </p:stCondLst>
+                                  <p:childTnLst>
+                                    <p:set>
+                                      <p:cBhvr>
+                                        <p:cTn id="10" dur="1" fill="hold">
+                                          <p:stCondLst>
+                                            <p:cond delay="0"/>
+                                          </p:stCondLst>
+                                        </p:cTn>
+                                        <p:tgtEl>
+                                          <p:spTgt spid="9"/>
+                                        </p:tgtEl>
+                                        <p:attrNameLst>
+                                          <p:attrName>style.visibility</p:attrName>
+                                        </p:attrNameLst>
+                                      </p:cBhvr>
+                                      <p:to>
+                                        <p:strVal val="hidden"/>
+                                      </p:to>
+                                    </p:set>
+                                  </p:childTnLst>
+                                </p:cTn>
+                              </p:par>
+                            </p:childTnLst>
+                          </p:cTn>
+                        </p:par>
+                      </p:childTnLst>
+                    </p:cTn>
+                  </p:par>
+                </p:childTnLst>
+              </p:cTn>
+              <p:prevCondLst>
+                <p:cond evt="onPrev" delay="0">
+                  <p:tgtEl>
+                    <p:sldTgt/>
+                  </p:tgtEl>
+                </p:cond>
+              </p:prevCondLst>
+              <p:nextCondLst>
+                <p:cond evt="onNext" delay="0">
+                  <p:tgtEl>
+                    <p:sldTgt/>
+                  </p:tgtEl>
+                </p:cond>
+              </p:nextCondLst>
+            </p:seq>
+          </p:childTnLst>
+        </p:cTn>
+      </p:par>
+    </p:tnLst>
+    <p:bldLst>
+      <p:bldP spid="9" grpId="0" animBg="1"/>
+      <p:bldP spid="9" grpId="1" animBg="1"/>
+    </p:bldLst>
+  </p:timing>
+</p:sld>
+</file>
+
+<file path=ppt/slides/slide8.xml><?xml version="1.0" encoding="utf-8"?>
+<p:sld xmlns:a="http://schemas.openxmlformats.org/drawingml/2006/main" xmlns:r="http://schemas.openxmlformats.org/officeDocument/2006/relationships" xmlns:p="http://schemas.openxmlformats.org/presentationml/2006/main">
+  <p:cSld>
+    <p:spTree>
+      <p:nvGrpSpPr>
+        <p:cNvPr id="1" name=""/>
+        <p:cNvGrpSpPr/>
+        <p:nvPr/>
+      </p:nvGrpSpPr>
+      <p:grpSpPr>
+        <a:xfrm>
+          <a:off x="0" y="0"/>
+          <a:ext cx="0" cy="0"/>
+          <a:chOff x="0" y="0"/>
+          <a:chExt cx="0" cy="0"/>
+        </a:xfrm>
+      </p:grpSpPr>
+      <p:sp>
+        <p:nvSpPr>
+          <p:cNvPr id="2" name="Title 1"/>
+          <p:cNvSpPr>
+            <a:spLocks noGrp="1"/>
+          </p:cNvSpPr>
+          <p:nvPr>
+            <p:ph type="title"/>
+          </p:nvPr>
+        </p:nvSpPr>
+        <p:spPr/>
+        <p:txBody>
+          <a:bodyPr/>
+          <a:lstStyle/>
+          <a:p>
+            <a:r>
+              <a:rPr lang="en-US" dirty="0" smtClean="0"/>
+              <a:t>Storage Types</a:t>
+            </a:r>
+            <a:endParaRPr lang="en-US" dirty="0"/>
+          </a:p>
+        </p:txBody>
+      </p:sp>
+      <p:sp>
+        <p:nvSpPr>
+          <p:cNvPr id="3" name="Content Placeholder 2"/>
+          <p:cNvSpPr>
+            <a:spLocks noGrp="1"/>
+          </p:cNvSpPr>
+          <p:nvPr>
+            <p:ph sz="quarter" idx="10"/>
+          </p:nvPr>
+        </p:nvSpPr>
+        <p:spPr>
+          <a:xfrm>
+            <a:off x="379414" y="1388226"/>
+            <a:ext cx="4179140" cy="5290388"/>
+          </a:xfrm>
+        </p:spPr>
+        <p:txBody>
+          <a:bodyPr/>
+          <a:lstStyle/>
+          <a:p>
+            <a:r>
+              <a:rPr lang="en-US" dirty="0" smtClean="0"/>
+              <a:t>Security</a:t>
+            </a:r>
+          </a:p>
+          <a:p>
+            <a:r>
+              <a:rPr lang="en-US" dirty="0" smtClean="0"/>
+              <a:t>Integration</a:t>
+            </a:r>
+          </a:p>
+          <a:p>
+            <a:r>
+              <a:rPr lang="en-US" dirty="0" smtClean="0"/>
+              <a:t>Analytics</a:t>
+            </a:r>
+          </a:p>
+          <a:p>
+            <a:r>
+              <a:rPr lang="en-US" dirty="0" smtClean="0"/>
+              <a:t>Data</a:t>
+            </a:r>
+          </a:p>
+          <a:p>
+            <a:r>
+              <a:rPr lang="en-US" dirty="0" smtClean="0"/>
+              <a:t>Plain Old Storage</a:t>
+            </a:r>
+          </a:p>
+          <a:p>
+            <a:r>
+              <a:rPr lang="en-US" b="1" dirty="0" smtClean="0"/>
+              <a:t>Peripheral Concerns</a:t>
+            </a:r>
+            <a:endParaRPr lang="en-US" b="1" dirty="0"/>
+          </a:p>
+        </p:txBody>
+      </p:sp>
+      <p:sp>
+        <p:nvSpPr>
+          <p:cNvPr id="4" name="TextBox 3"/>
+          <p:cNvSpPr txBox="1"/>
+          <p:nvPr/>
+        </p:nvSpPr>
+        <p:spPr>
+          <a:xfrm>
+            <a:off x="9906000" y="-1"/>
+            <a:ext cx="2286000" cy="2031325"/>
+          </a:xfrm>
+          <a:prstGeom prst="rect">
+            <a:avLst/>
+          </a:prstGeom>
+          <a:solidFill>
+            <a:srgbClr val="FFFF00"/>
+          </a:solidFill>
+          <a:ln>
+            <a:noFill/>
+          </a:ln>
+        </p:spPr>
+        <p:txBody>
+          <a:bodyPr wrap="square" rtlCol="0">
+            <a:spAutoFit/>
+          </a:bodyPr>
+          <a:lstStyle/>
+          <a:p>
+            <a:pPr algn="ctr"/>
+            <a:endParaRPr lang="en-US" dirty="0" smtClean="0"/>
+          </a:p>
+          <a:p>
+            <a:pPr algn="ctr"/>
+            <a:endParaRPr lang="en-US" dirty="0"/>
+          </a:p>
+          <a:p>
+            <a:pPr algn="ctr"/>
+            <a:r>
+              <a:rPr lang="en-US" dirty="0" smtClean="0"/>
+              <a:t>Please leave this area blank to allow for picture in picture recording</a:t>
+            </a:r>
+          </a:p>
+          <a:p>
+            <a:pPr algn="ctr"/>
+            <a:endParaRPr lang="en-US" dirty="0"/>
+          </a:p>
+        </p:txBody>
+      </p:sp>
+    </p:spTree>
+    <p:extLst>
+      <p:ext uri="{BB962C8B-B14F-4D97-AF65-F5344CB8AC3E}">
+        <p14:creationId xmlns:p14="http://schemas.microsoft.com/office/powerpoint/2010/main" val="818671344"/>
+      </p:ext>
+    </p:extLst>
+  </p:cSld>
+  <p:clrMapOvr>
+    <a:masterClrMapping/>
+  </p:clrMapOvr>
+  <p:timing>
+    <p:tnLst>
+      <p:par>
         <p:cTn id="1" dur="indefinite" restart="never" nodeType="tmRoot"/>
+      </p:par>
+    </p:tnLst>
+  </p:timing>
+</p:sld>
+</file>
+
+<file path=ppt/slides/slide9.xml><?xml version="1.0" encoding="utf-8"?>
+<p:sld xmlns:a="http://schemas.openxmlformats.org/drawingml/2006/main" xmlns:r="http://schemas.openxmlformats.org/officeDocument/2006/relationships" xmlns:p="http://schemas.openxmlformats.org/presentationml/2006/main">
+  <p:cSld>
+    <p:spTree>
+      <p:nvGrpSpPr>
+        <p:cNvPr id="1" name=""/>
+        <p:cNvGrpSpPr/>
+        <p:nvPr/>
+      </p:nvGrpSpPr>
+      <p:grpSpPr>
+        <a:xfrm>
+          <a:off x="0" y="0"/>
+          <a:ext cx="0" cy="0"/>
+          <a:chOff x="0" y="0"/>
+          <a:chExt cx="0" cy="0"/>
+        </a:xfrm>
+      </p:grpSpPr>
+      <p:sp>
+        <p:nvSpPr>
+          <p:cNvPr id="2" name="Title 1"/>
+          <p:cNvSpPr>
+            <a:spLocks noGrp="1"/>
+          </p:cNvSpPr>
+          <p:nvPr>
+            <p:ph type="title"/>
+          </p:nvPr>
+        </p:nvSpPr>
+        <p:spPr/>
+        <p:txBody>
+          <a:bodyPr/>
+          <a:lstStyle/>
+          <a:p>
+            <a:r>
+              <a:rPr lang="en-US" dirty="0" smtClean="0"/>
+              <a:t>It Comes Down To…</a:t>
+            </a:r>
+            <a:endParaRPr lang="en-US" dirty="0"/>
+          </a:p>
+        </p:txBody>
+      </p:sp>
+      <p:sp>
+        <p:nvSpPr>
+          <p:cNvPr id="3" name="Content Placeholder 2"/>
+          <p:cNvSpPr>
+            <a:spLocks noGrp="1"/>
+          </p:cNvSpPr>
+          <p:nvPr>
+            <p:ph sz="quarter" idx="10"/>
+          </p:nvPr>
+        </p:nvSpPr>
+        <p:spPr>
+          <a:xfrm>
+            <a:off x="379413" y="1388226"/>
+            <a:ext cx="11525250" cy="3109129"/>
+          </a:xfrm>
+        </p:spPr>
+        <p:txBody>
+          <a:bodyPr/>
+          <a:lstStyle/>
+          <a:p>
+            <a:r>
+              <a:rPr lang="en-US" dirty="0"/>
+              <a:t>Type of data</a:t>
+            </a:r>
+          </a:p>
+          <a:p>
+            <a:r>
+              <a:rPr lang="en-US" dirty="0" smtClean="0"/>
+              <a:t>Concerns of scalability</a:t>
+            </a:r>
+          </a:p>
+          <a:p>
+            <a:r>
+              <a:rPr lang="en-US" dirty="0" smtClean="0"/>
+              <a:t>Nature of your project</a:t>
+            </a:r>
+          </a:p>
+          <a:p>
+            <a:r>
+              <a:rPr lang="en-US" dirty="0" smtClean="0"/>
+              <a:t>Budget</a:t>
+            </a:r>
+          </a:p>
+          <a:p>
+            <a:endParaRPr lang="en-US" dirty="0"/>
+          </a:p>
+        </p:txBody>
+      </p:sp>
+      <p:sp>
+        <p:nvSpPr>
+          <p:cNvPr id="4" name="TextBox 3"/>
+          <p:cNvSpPr txBox="1"/>
+          <p:nvPr/>
+        </p:nvSpPr>
+        <p:spPr>
+          <a:xfrm>
+            <a:off x="9906000" y="-1"/>
+            <a:ext cx="2286000" cy="2031325"/>
+          </a:xfrm>
+          <a:prstGeom prst="rect">
+            <a:avLst/>
+          </a:prstGeom>
+          <a:solidFill>
+            <a:srgbClr val="FFFF00"/>
+          </a:solidFill>
+          <a:ln>
+            <a:noFill/>
+          </a:ln>
+        </p:spPr>
+        <p:txBody>
+          <a:bodyPr wrap="square" rtlCol="0">
+            <a:spAutoFit/>
+          </a:bodyPr>
+          <a:lstStyle/>
+          <a:p>
+            <a:pPr algn="ctr"/>
+            <a:endParaRPr lang="en-US" dirty="0" smtClean="0"/>
+          </a:p>
+          <a:p>
+            <a:pPr algn="ctr"/>
+            <a:endParaRPr lang="en-US" dirty="0"/>
+          </a:p>
+          <a:p>
+            <a:pPr algn="ctr"/>
+            <a:r>
+              <a:rPr lang="en-US" dirty="0" smtClean="0"/>
+              <a:t>Please leave this area blank to allow for picture in picture recording</a:t>
+            </a:r>
+          </a:p>
+          <a:p>
+            <a:pPr algn="ctr"/>
+            <a:endParaRPr lang="en-US" dirty="0"/>
+          </a:p>
+        </p:txBody>
+      </p:sp>
+    </p:spTree>
+    <p:extLst>
+      <p:ext uri="{BB962C8B-B14F-4D97-AF65-F5344CB8AC3E}">
+        <p14:creationId xmlns:p14="http://schemas.microsoft.com/office/powerpoint/2010/main" val="2439866652"/>
+      </p:ext>
+    </p:extLst>
+  </p:cSld>
+  <p:clrMapOvr>
+    <a:masterClrMapping/>
+  </p:clrMapOvr>
+  <p:timing>
+    <p:tnLst>
+      <p:par>
+        <p:cTn id="1" dur="indefinite" restart="never" nodeType="tmRoot">
+          <p:childTnLst>
+            <p:seq concurrent="1" nextAc="seek">
+              <p:cTn id="2" dur="indefinite" nodeType="mainSeq">
+                <p:childTnLst>
+                  <p:par>
+                    <p:cTn id="3" fill="hold">
+                      <p:stCondLst>
+                        <p:cond delay="indefinite"/>
+                      </p:stCondLst>
+                      <p:childTnLst>
+                        <p:par>
+                          <p:cTn id="4" fill="hold">
+                            <p:stCondLst>
+                              <p:cond delay="0"/>
+                            </p:stCondLst>
+                            <p:childTnLst>
+                              <p:par>
+                                <p:cTn id="5" presetID="1" presetClass="entr" presetSubtype="0" fill="hold" nodeType="clickEffect">
+                                  <p:stCondLst>
+                                    <p:cond delay="0"/>
+                                  </p:stCondLst>
+                                  <p:childTnLst>
+                                    <p:set>
+                                      <p:cBhvr>
+                                        <p:cTn id="6" dur="1" fill="hold">
+                                          <p:stCondLst>
+                                            <p:cond delay="0"/>
+                                          </p:stCondLst>
+                                        </p:cTn>
+                                        <p:tgtEl>
+                                          <p:spTgt spid="3">
+                                            <p:txEl>
+                                              <p:pRg st="0" end="0"/>
+                                            </p:txEl>
+                                          </p:spTgt>
+                                        </p:tgtEl>
+                                        <p:attrNameLst>
+                                          <p:attrName>style.visibility</p:attrName>
+                                        </p:attrNameLst>
+                                      </p:cBhvr>
+                                      <p:to>
+                                        <p:strVal val="visible"/>
+                                      </p:to>
+                                    </p:set>
+                                  </p:childTnLst>
+                                </p:cTn>
+                              </p:par>
+                            </p:childTnLst>
+                          </p:cTn>
+                        </p:par>
+                      </p:childTnLst>
+                    </p:cTn>
+                  </p:par>
+                  <p:par>
+                    <p:cTn id="7" fill="hold">
+                      <p:stCondLst>
+                        <p:cond delay="indefinite"/>
+                      </p:stCondLst>
+                      <p:childTnLst>
+                        <p:par>
+                          <p:cTn id="8" fill="hold">
+                            <p:stCondLst>
+                              <p:cond delay="0"/>
+                            </p:stCondLst>
+                            <p:childTnLst>
+                              <p:par>
+                                <p:cTn id="9" presetID="1" presetClass="entr" presetSubtype="0" fill="hold" nodeType="clickEffect">
+                                  <p:stCondLst>
+                                    <p:cond delay="0"/>
+                                  </p:stCondLst>
+                                  <p:childTnLst>
+                                    <p:set>
+                                      <p:cBhvr>
+                                        <p:cTn id="10" dur="1" fill="hold">
+                                          <p:stCondLst>
+                                            <p:cond delay="0"/>
+                                          </p:stCondLst>
+                                        </p:cTn>
+                                        <p:tgtEl>
+                                          <p:spTgt spid="3">
+                                            <p:txEl>
+                                              <p:pRg st="1" end="1"/>
+                                            </p:txEl>
+                                          </p:spTgt>
+                                        </p:tgtEl>
+                                        <p:attrNameLst>
+                                          <p:attrName>style.visibility</p:attrName>
+                                        </p:attrNameLst>
+                                      </p:cBhvr>
+                                      <p:to>
+                                        <p:strVal val="visible"/>
+                                      </p:to>
+                                    </p:set>
+                                  </p:childTnLst>
+                                </p:cTn>
+                              </p:par>
+                            </p:childTnLst>
+                          </p:cTn>
+                        </p:par>
+                      </p:childTnLst>
+                    </p:cTn>
+                  </p:par>
+                  <p:par>
+                    <p:cTn id="11" fill="hold">
+                      <p:stCondLst>
+                        <p:cond delay="indefinite"/>
+                      </p:stCondLst>
+                      <p:childTnLst>
+                        <p:par>
+                          <p:cTn id="12" fill="hold">
+                            <p:stCondLst>
+                              <p:cond delay="0"/>
+                            </p:stCondLst>
+                            <p:childTnLst>
+                              <p:par>
+                                <p:cTn id="13" presetID="1" presetClass="entr" presetSubtype="0" fill="hold" nodeType="clickEffect">
+                                  <p:stCondLst>
+                                    <p:cond delay="0"/>
+                                  </p:stCondLst>
+                                  <p:childTnLst>
+                                    <p:set>
+                                      <p:cBhvr>
+                                        <p:cTn id="14" dur="1" fill="hold">
+                                          <p:stCondLst>
+                                            <p:cond delay="0"/>
+                                          </p:stCondLst>
+                                        </p:cTn>
+                                        <p:tgtEl>
+                                          <p:spTgt spid="3">
+                                            <p:txEl>
+                                              <p:pRg st="2" end="2"/>
+                                            </p:txEl>
+                                          </p:spTgt>
+                                        </p:tgtEl>
+                                        <p:attrNameLst>
+                                          <p:attrName>style.visibility</p:attrName>
+                                        </p:attrNameLst>
+                                      </p:cBhvr>
+                                      <p:to>
+                                        <p:strVal val="visible"/>
+                                      </p:to>
+                                    </p:set>
+                                  </p:childTnLst>
+                                </p:cTn>
+                              </p:par>
+                            </p:childTnLst>
+                          </p:cTn>
+                        </p:par>
+                      </p:childTnLst>
+                    </p:cTn>
+                  </p:par>
+                  <p:par>
+                    <p:cTn id="15" fill="hold">
+                      <p:stCondLst>
+                        <p:cond delay="indefinite"/>
+                      </p:stCondLst>
+                      <p:childTnLst>
+                        <p:par>
+                          <p:cTn id="16" fill="hold">
+                            <p:stCondLst>
+                              <p:cond delay="0"/>
+                            </p:stCondLst>
+                            <p:childTnLst>
+                              <p:par>
+                                <p:cTn id="17" presetID="1" presetClass="entr" presetSubtype="0" fill="hold" nodeType="clickEffect">
+                                  <p:stCondLst>
+                                    <p:cond delay="0"/>
+                                  </p:stCondLst>
+                                  <p:childTnLst>
+                                    <p:set>
+                                      <p:cBhvr>
+                                        <p:cTn id="18" dur="1" fill="hold">
+                                          <p:stCondLst>
+                                            <p:cond delay="0"/>
+                                          </p:stCondLst>
+                                        </p:cTn>
+                                        <p:tgtEl>
+                                          <p:spTgt spid="3">
+                                            <p:txEl>
+                                              <p:pRg st="3" end="3"/>
+                                            </p:txEl>
+                                          </p:spTgt>
+                                        </p:tgtEl>
+                                        <p:attrNameLst>
+                                          <p:attrName>style.visibility</p:attrName>
+                                        </p:attrNameLst>
+                                      </p:cBhvr>
+                                      <p:to>
+                                        <p:strVal val="visible"/>
+                                      </p:to>
+                                    </p:set>
+                                  </p:childTnLst>
+                                </p:cTn>
+                              </p:par>
+                            </p:childTnLst>
+                          </p:cTn>
+                        </p:par>
+                      </p:childTnLst>
+                    </p:cTn>
+                  </p:par>
+                </p:childTnLst>
+              </p:cTn>
+              <p:prevCondLst>
+                <p:cond evt="onPrev" delay="0">
+                  <p:tgtEl>
+                    <p:sldTgt/>
+                  </p:tgtEl>
+                </p:cond>
+              </p:prevCondLst>
+              <p:nextCondLst>
+                <p:cond evt="onNext" delay="0">
+                  <p:tgtEl>
+                    <p:sldTgt/>
+                  </p:tgtEl>
+                </p:cond>
+              </p:nextCondLst>
+            </p:seq>
+          </p:childTnLst>
+        </p:cTn>
       </p:par>
     </p:tnLst>
   </p:timing>
@@ -4858,12 +9012,46 @@
 </file>
 
 <file path=customXml/item1.xml><?xml version="1.0" encoding="utf-8"?>
-<?mso-contentType ?>
-<FormTemplates xmlns="http://schemas.microsoft.com/sharepoint/v3/contenttype/forms">
-  <Display>DocumentLibraryForm</Display>
-  <Edit>DocumentLibraryForm</Edit>
-  <New>DocumentLibraryForm</New>
-</FormTemplates>
+<p:properties xmlns:p="http://schemas.microsoft.com/office/2006/metadata/properties" xmlns:xsi="http://www.w3.org/2001/XMLSchema-instance" xmlns:pc="http://schemas.microsoft.com/office/infopath/2007/PartnerControls">
+  <documentManagement>
+    <TaxCatchAll xmlns="230e9df3-be65-4c73-a93b-d1236ebd677e"/>
+    <PublishingExpirationDate xmlns="http://schemas.microsoft.com/sharepoint/v3" xsi:nil="true"/>
+    <PublishingStartDate xmlns="http://schemas.microsoft.com/sharepoint/v3" xsi:nil="true"/>
+    <TaxKeywordTaxHTField xmlns="230e9df3-be65-4c73-a93b-d1236ebd677e">
+      <Terms xmlns="http://schemas.microsoft.com/office/infopath/2007/PartnerControls"/>
+    </TaxKeywordTaxHTField>
+    <SharedWithUsers xmlns="27aa9422-7f1f-4c84-9cdf-302b1a67e513">
+      <UserInfo>
+        <DisplayName>Shriram Natarajan (SHRI)</DisplayName>
+        <AccountId>3899</AccountId>
+        <AccountType/>
+      </UserInfo>
+      <UserInfo>
+        <DisplayName>Andrew Nickels</DisplayName>
+        <AccountId>24014</AccountId>
+        <AccountType/>
+      </UserInfo>
+      <UserInfo>
+        <DisplayName>Steven Goddard (WSSC)</DisplayName>
+        <AccountId>29711</AccountId>
+        <AccountType/>
+      </UserInfo>
+      <UserInfo>
+        <DisplayName>Jim Clark (LEARNING)</DisplayName>
+        <AccountId>86</AccountId>
+        <AccountType/>
+      </UserInfo>
+      <UserInfo>
+        <DisplayName>Vijay Kumar</DisplayName>
+        <AccountId>53758</AccountId>
+        <AccountType/>
+      </UserInfo>
+    </SharedWithUsers>
+    <SharingHintHash xmlns="27aa9422-7f1f-4c84-9cdf-302b1a67e513">1366665793</SharingHintHash>
+    <_ip_UnifiedCompliancePolicyUIAction xmlns="http://schemas.microsoft.com/sharepoint/v3" xsi:nil="true"/>
+    <_ip_UnifiedCompliancePolicyProperties xmlns="http://schemas.microsoft.com/sharepoint/v3" xsi:nil="true"/>
+  </documentManagement>
+</p:properties>
 </file>
 
 <file path=customXml/item2.xml><?xml version="1.0" encoding="utf-8"?>
@@ -5075,52 +9263,28 @@
 </file>
 
 <file path=customXml/item3.xml><?xml version="1.0" encoding="utf-8"?>
-<p:properties xmlns:p="http://schemas.microsoft.com/office/2006/metadata/properties" xmlns:xsi="http://www.w3.org/2001/XMLSchema-instance" xmlns:pc="http://schemas.microsoft.com/office/infopath/2007/PartnerControls">
-  <documentManagement>
-    <TaxCatchAll xmlns="230e9df3-be65-4c73-a93b-d1236ebd677e"/>
-    <PublishingExpirationDate xmlns="http://schemas.microsoft.com/sharepoint/v3" xsi:nil="true"/>
-    <PublishingStartDate xmlns="http://schemas.microsoft.com/sharepoint/v3" xsi:nil="true"/>
-    <TaxKeywordTaxHTField xmlns="230e9df3-be65-4c73-a93b-d1236ebd677e">
-      <Terms xmlns="http://schemas.microsoft.com/office/infopath/2007/PartnerControls"/>
-    </TaxKeywordTaxHTField>
-    <SharedWithUsers xmlns="27aa9422-7f1f-4c84-9cdf-302b1a67e513">
-      <UserInfo>
-        <DisplayName>Shriram Natarajan (SHRI)</DisplayName>
-        <AccountId>3899</AccountId>
-        <AccountType/>
-      </UserInfo>
-      <UserInfo>
-        <DisplayName>Andrew Nickels</DisplayName>
-        <AccountId>24014</AccountId>
-        <AccountType/>
-      </UserInfo>
-      <UserInfo>
-        <DisplayName>Steven Goddard (WSSC)</DisplayName>
-        <AccountId>29711</AccountId>
-        <AccountType/>
-      </UserInfo>
-      <UserInfo>
-        <DisplayName>Jim Clark (LEARNING)</DisplayName>
-        <AccountId>86</AccountId>
-        <AccountType/>
-      </UserInfo>
-      <UserInfo>
-        <DisplayName>Vijay Kumar</DisplayName>
-        <AccountId>53758</AccountId>
-        <AccountType/>
-      </UserInfo>
-    </SharedWithUsers>
-    <SharingHintHash xmlns="27aa9422-7f1f-4c84-9cdf-302b1a67e513">1366665793</SharingHintHash>
-    <_ip_UnifiedCompliancePolicyUIAction xmlns="http://schemas.microsoft.com/sharepoint/v3" xsi:nil="true"/>
-    <_ip_UnifiedCompliancePolicyProperties xmlns="http://schemas.microsoft.com/sharepoint/v3" xsi:nil="true"/>
-  </documentManagement>
-</p:properties>
+<?mso-contentType ?>
+<FormTemplates xmlns="http://schemas.microsoft.com/sharepoint/v3/contenttype/forms">
+  <Display>DocumentLibraryForm</Display>
+  <Edit>DocumentLibraryForm</Edit>
+  <New>DocumentLibraryForm</New>
+</FormTemplates>
 </file>
 
 <file path=customXml/itemProps1.xml><?xml version="1.0" encoding="utf-8"?>
-<ds:datastoreItem xmlns:ds="http://schemas.openxmlformats.org/officeDocument/2006/customXml" ds:itemID="{B0CA13EC-1D3C-4D6F-8D1C-E8A452CFC79A}">
+<ds:datastoreItem xmlns:ds="http://schemas.openxmlformats.org/officeDocument/2006/customXml" ds:itemID="{7025FDD9-4C58-4084-9F89-0E6ADD6FFF55}">
   <ds:schemaRefs>
-    <ds:schemaRef ds:uri="http://schemas.microsoft.com/sharepoint/v3/contenttype/forms"/>
+    <ds:schemaRef ds:uri="http://purl.org/dc/dcmitype/"/>
+    <ds:schemaRef ds:uri="http://purl.org/dc/terms/"/>
+    <ds:schemaRef ds:uri="http://schemas.microsoft.com/office/2006/documentManagement/types"/>
+    <ds:schemaRef ds:uri="http://www.w3.org/XML/1998/namespace"/>
+    <ds:schemaRef ds:uri="http://purl.org/dc/elements/1.1/"/>
+    <ds:schemaRef ds:uri="http://schemas.microsoft.com/office/infopath/2007/PartnerControls"/>
+    <ds:schemaRef ds:uri="http://schemas.openxmlformats.org/package/2006/metadata/core-properties"/>
+    <ds:schemaRef ds:uri="http://schemas.microsoft.com/office/2006/metadata/properties"/>
+    <ds:schemaRef ds:uri="27aa9422-7f1f-4c84-9cdf-302b1a67e513"/>
+    <ds:schemaRef ds:uri="230e9df3-be65-4c73-a93b-d1236ebd677e"/>
+    <ds:schemaRef ds:uri="http://schemas.microsoft.com/sharepoint/v3"/>
   </ds:schemaRefs>
 </ds:datastoreItem>
 </file>
@@ -5146,19 +9310,9 @@
 </file>
 
 <file path=customXml/itemProps3.xml><?xml version="1.0" encoding="utf-8"?>
-<ds:datastoreItem xmlns:ds="http://schemas.openxmlformats.org/officeDocument/2006/customXml" ds:itemID="{7025FDD9-4C58-4084-9F89-0E6ADD6FFF55}">
+<ds:datastoreItem xmlns:ds="http://schemas.openxmlformats.org/officeDocument/2006/customXml" ds:itemID="{B0CA13EC-1D3C-4D6F-8D1C-E8A452CFC79A}">
   <ds:schemaRefs>
-    <ds:schemaRef ds:uri="http://purl.org/dc/terms/"/>
-    <ds:schemaRef ds:uri="http://purl.org/dc/dcmitype/"/>
-    <ds:schemaRef ds:uri="http://schemas.microsoft.com/office/2006/documentManagement/types"/>
-    <ds:schemaRef ds:uri="http://www.w3.org/XML/1998/namespace"/>
-    <ds:schemaRef ds:uri="http://schemas.microsoft.com/office/infopath/2007/PartnerControls"/>
-    <ds:schemaRef ds:uri="http://schemas.microsoft.com/office/2006/metadata/properties"/>
-    <ds:schemaRef ds:uri="27aa9422-7f1f-4c84-9cdf-302b1a67e513"/>
-    <ds:schemaRef ds:uri="http://purl.org/dc/elements/1.1/"/>
-    <ds:schemaRef ds:uri="http://schemas.openxmlformats.org/package/2006/metadata/core-properties"/>
-    <ds:schemaRef ds:uri="230e9df3-be65-4c73-a93b-d1236ebd677e"/>
-    <ds:schemaRef ds:uri="http://schemas.microsoft.com/sharepoint/v3"/>
+    <ds:schemaRef ds:uri="http://schemas.microsoft.com/sharepoint/v3/contenttype/forms"/>
   </ds:schemaRefs>
 </ds:datastoreItem>
 </file>
</xml_diff>

<commit_message>
scaling and load testing
</commit_message>
<xml_diff>
--- a/Presentation Materials/MVA-ApplicationsOnAzure-05.pptx
+++ b/Presentation Materials/MVA-ApplicationsOnAzure-05.pptx
@@ -5,15 +5,22 @@
     <p:sldMasterId id="2147483660" r:id="rId4"/>
   </p:sldMasterIdLst>
   <p:notesMasterIdLst>
-    <p:notesMasterId r:id="rId8"/>
+    <p:notesMasterId r:id="rId15"/>
   </p:notesMasterIdLst>
   <p:handoutMasterIdLst>
-    <p:handoutMasterId r:id="rId9"/>
+    <p:handoutMasterId r:id="rId16"/>
   </p:handoutMasterIdLst>
   <p:sldIdLst>
     <p:sldId id="277" r:id="rId5"/>
     <p:sldId id="278" r:id="rId6"/>
     <p:sldId id="282" r:id="rId7"/>
+    <p:sldId id="285" r:id="rId8"/>
+    <p:sldId id="286" r:id="rId9"/>
+    <p:sldId id="287" r:id="rId10"/>
+    <p:sldId id="288" r:id="rId11"/>
+    <p:sldId id="289" r:id="rId12"/>
+    <p:sldId id="283" r:id="rId13"/>
+    <p:sldId id="284" r:id="rId14"/>
   </p:sldIdLst>
   <p:sldSz cx="12192000" cy="6858000"/>
   <p:notesSz cx="6858000" cy="9144000"/>
@@ -205,7 +212,7 @@
           <a:p>
             <a:fld id="{312E7B4A-039C-48A2-9B2C-AF16AA3873D8}" type="datetimeFigureOut">
               <a:rPr lang="en-US" smtClean="0"/>
-              <a:t>10/14/2015</a:t>
+              <a:t>11/6/2015</a:t>
             </a:fld>
             <a:endParaRPr lang="en-US"/>
           </a:p>
@@ -370,7 +377,7 @@
           <a:p>
             <a:fld id="{DA005A0C-54D9-45AA-87D4-C551D08DFCE1}" type="datetimeFigureOut">
               <a:rPr lang="en-US" smtClean="0"/>
-              <a:t>10/14/2015</a:t>
+              <a:t>11/6/2015</a:t>
             </a:fld>
             <a:endParaRPr lang="en-US"/>
           </a:p>
@@ -728,6 +735,90 @@
 </p:notes>
 </file>
 
+<file path=ppt/notesSlides/notesSlide10.xml><?xml version="1.0" encoding="utf-8"?>
+<p:notes xmlns:a="http://schemas.openxmlformats.org/drawingml/2006/main" xmlns:r="http://schemas.openxmlformats.org/officeDocument/2006/relationships" xmlns:p="http://schemas.openxmlformats.org/presentationml/2006/main">
+  <p:cSld>
+    <p:spTree>
+      <p:nvGrpSpPr>
+        <p:cNvPr id="1" name=""/>
+        <p:cNvGrpSpPr/>
+        <p:nvPr/>
+      </p:nvGrpSpPr>
+      <p:grpSpPr>
+        <a:xfrm>
+          <a:off x="0" y="0"/>
+          <a:ext cx="0" cy="0"/>
+          <a:chOff x="0" y="0"/>
+          <a:chExt cx="0" cy="0"/>
+        </a:xfrm>
+      </p:grpSpPr>
+      <p:sp>
+        <p:nvSpPr>
+          <p:cNvPr id="2" name="Slide Image Placeholder 1"/>
+          <p:cNvSpPr>
+            <a:spLocks noGrp="1" noRot="1" noChangeAspect="1"/>
+          </p:cNvSpPr>
+          <p:nvPr>
+            <p:ph type="sldImg"/>
+          </p:nvPr>
+        </p:nvSpPr>
+        <p:spPr/>
+      </p:sp>
+      <p:sp>
+        <p:nvSpPr>
+          <p:cNvPr id="3" name="Notes Placeholder 2"/>
+          <p:cNvSpPr>
+            <a:spLocks noGrp="1"/>
+          </p:cNvSpPr>
+          <p:nvPr>
+            <p:ph type="body" idx="1"/>
+          </p:nvPr>
+        </p:nvSpPr>
+        <p:spPr/>
+        <p:txBody>
+          <a:bodyPr/>
+          <a:lstStyle/>
+          <a:p>
+            <a:endParaRPr lang="en-US"/>
+          </a:p>
+        </p:txBody>
+      </p:sp>
+      <p:sp>
+        <p:nvSpPr>
+          <p:cNvPr id="4" name="Slide Number Placeholder 3"/>
+          <p:cNvSpPr>
+            <a:spLocks noGrp="1"/>
+          </p:cNvSpPr>
+          <p:nvPr>
+            <p:ph type="sldNum" sz="quarter" idx="10"/>
+          </p:nvPr>
+        </p:nvSpPr>
+        <p:spPr/>
+        <p:txBody>
+          <a:bodyPr/>
+          <a:lstStyle/>
+          <a:p>
+            <a:fld id="{4CFD207A-07DF-40AD-A916-9872E089CE7A}" type="slidenum">
+              <a:rPr lang="en-US" smtClean="0"/>
+              <a:t>10</a:t>
+            </a:fld>
+            <a:endParaRPr lang="en-US"/>
+          </a:p>
+        </p:txBody>
+      </p:sp>
+    </p:spTree>
+    <p:extLst>
+      <p:ext uri="{BB962C8B-B14F-4D97-AF65-F5344CB8AC3E}">
+        <p14:creationId xmlns:p14="http://schemas.microsoft.com/office/powerpoint/2010/main" val="2535830585"/>
+      </p:ext>
+    </p:extLst>
+  </p:cSld>
+  <p:clrMapOvr>
+    <a:masterClrMapping/>
+  </p:clrMapOvr>
+</p:notes>
+</file>
+
 <file path=ppt/notesSlides/notesSlide2.xml><?xml version="1.0" encoding="utf-8"?>
 <p:notes xmlns:a="http://schemas.openxmlformats.org/drawingml/2006/main" xmlns:r="http://schemas.openxmlformats.org/officeDocument/2006/relationships" xmlns:p="http://schemas.openxmlformats.org/presentationml/2006/main">
   <p:cSld>
@@ -864,7 +955,7 @@
           <a:bodyPr/>
           <a:lstStyle/>
           <a:p>
-            <a:endParaRPr lang="en-US"/>
+            <a:endParaRPr lang="en-US" dirty="0"/>
           </a:p>
         </p:txBody>
       </p:sp>
@@ -895,6 +986,578 @@
     <p:extLst>
       <p:ext uri="{BB962C8B-B14F-4D97-AF65-F5344CB8AC3E}">
         <p14:creationId xmlns:p14="http://schemas.microsoft.com/office/powerpoint/2010/main" val="1692121609"/>
+      </p:ext>
+    </p:extLst>
+  </p:cSld>
+  <p:clrMapOvr>
+    <a:masterClrMapping/>
+  </p:clrMapOvr>
+</p:notes>
+</file>
+
+<file path=ppt/notesSlides/notesSlide4.xml><?xml version="1.0" encoding="utf-8"?>
+<p:notes xmlns:a="http://schemas.openxmlformats.org/drawingml/2006/main" xmlns:r="http://schemas.openxmlformats.org/officeDocument/2006/relationships" xmlns:p="http://schemas.openxmlformats.org/presentationml/2006/main">
+  <p:cSld>
+    <p:spTree>
+      <p:nvGrpSpPr>
+        <p:cNvPr id="1" name=""/>
+        <p:cNvGrpSpPr/>
+        <p:nvPr/>
+      </p:nvGrpSpPr>
+      <p:grpSpPr>
+        <a:xfrm>
+          <a:off x="0" y="0"/>
+          <a:ext cx="0" cy="0"/>
+          <a:chOff x="0" y="0"/>
+          <a:chExt cx="0" cy="0"/>
+        </a:xfrm>
+      </p:grpSpPr>
+      <p:sp>
+        <p:nvSpPr>
+          <p:cNvPr id="2" name="Slide Image Placeholder 1"/>
+          <p:cNvSpPr>
+            <a:spLocks noGrp="1" noRot="1" noChangeAspect="1"/>
+          </p:cNvSpPr>
+          <p:nvPr>
+            <p:ph type="sldImg"/>
+          </p:nvPr>
+        </p:nvSpPr>
+        <p:spPr/>
+      </p:sp>
+      <p:sp>
+        <p:nvSpPr>
+          <p:cNvPr id="3" name="Notes Placeholder 2"/>
+          <p:cNvSpPr>
+            <a:spLocks noGrp="1"/>
+          </p:cNvSpPr>
+          <p:nvPr>
+            <p:ph type="body" idx="1"/>
+          </p:nvPr>
+        </p:nvSpPr>
+        <p:spPr/>
+        <p:txBody>
+          <a:bodyPr/>
+          <a:lstStyle/>
+          <a:p>
+            <a:endParaRPr lang="en-US" dirty="0"/>
+          </a:p>
+        </p:txBody>
+      </p:sp>
+      <p:sp>
+        <p:nvSpPr>
+          <p:cNvPr id="4" name="Slide Number Placeholder 3"/>
+          <p:cNvSpPr>
+            <a:spLocks noGrp="1"/>
+          </p:cNvSpPr>
+          <p:nvPr>
+            <p:ph type="sldNum" sz="quarter" idx="10"/>
+          </p:nvPr>
+        </p:nvSpPr>
+        <p:spPr/>
+        <p:txBody>
+          <a:bodyPr/>
+          <a:lstStyle/>
+          <a:p>
+            <a:fld id="{4CFD207A-07DF-40AD-A916-9872E089CE7A}" type="slidenum">
+              <a:rPr lang="en-US" smtClean="0"/>
+              <a:t>4</a:t>
+            </a:fld>
+            <a:endParaRPr lang="en-US"/>
+          </a:p>
+        </p:txBody>
+      </p:sp>
+    </p:spTree>
+    <p:extLst>
+      <p:ext uri="{BB962C8B-B14F-4D97-AF65-F5344CB8AC3E}">
+        <p14:creationId xmlns:p14="http://schemas.microsoft.com/office/powerpoint/2010/main" val="3676754883"/>
+      </p:ext>
+    </p:extLst>
+  </p:cSld>
+  <p:clrMapOvr>
+    <a:masterClrMapping/>
+  </p:clrMapOvr>
+</p:notes>
+</file>
+
+<file path=ppt/notesSlides/notesSlide5.xml><?xml version="1.0" encoding="utf-8"?>
+<p:notes xmlns:a="http://schemas.openxmlformats.org/drawingml/2006/main" xmlns:r="http://schemas.openxmlformats.org/officeDocument/2006/relationships" xmlns:p="http://schemas.openxmlformats.org/presentationml/2006/main">
+  <p:cSld>
+    <p:spTree>
+      <p:nvGrpSpPr>
+        <p:cNvPr id="1" name=""/>
+        <p:cNvGrpSpPr/>
+        <p:nvPr/>
+      </p:nvGrpSpPr>
+      <p:grpSpPr>
+        <a:xfrm>
+          <a:off x="0" y="0"/>
+          <a:ext cx="0" cy="0"/>
+          <a:chOff x="0" y="0"/>
+          <a:chExt cx="0" cy="0"/>
+        </a:xfrm>
+      </p:grpSpPr>
+      <p:sp>
+        <p:nvSpPr>
+          <p:cNvPr id="2" name="Slide Image Placeholder 1"/>
+          <p:cNvSpPr>
+            <a:spLocks noGrp="1" noRot="1" noChangeAspect="1"/>
+          </p:cNvSpPr>
+          <p:nvPr>
+            <p:ph type="sldImg"/>
+          </p:nvPr>
+        </p:nvSpPr>
+        <p:spPr/>
+      </p:sp>
+      <p:sp>
+        <p:nvSpPr>
+          <p:cNvPr id="3" name="Notes Placeholder 2"/>
+          <p:cNvSpPr>
+            <a:spLocks noGrp="1"/>
+          </p:cNvSpPr>
+          <p:nvPr>
+            <p:ph type="body" idx="1"/>
+          </p:nvPr>
+        </p:nvSpPr>
+        <p:spPr/>
+        <p:txBody>
+          <a:bodyPr/>
+          <a:lstStyle/>
+          <a:p>
+            <a:endParaRPr lang="en-US" dirty="0"/>
+          </a:p>
+        </p:txBody>
+      </p:sp>
+      <p:sp>
+        <p:nvSpPr>
+          <p:cNvPr id="4" name="Slide Number Placeholder 3"/>
+          <p:cNvSpPr>
+            <a:spLocks noGrp="1"/>
+          </p:cNvSpPr>
+          <p:nvPr>
+            <p:ph type="sldNum" sz="quarter" idx="10"/>
+          </p:nvPr>
+        </p:nvSpPr>
+        <p:spPr/>
+        <p:txBody>
+          <a:bodyPr/>
+          <a:lstStyle/>
+          <a:p>
+            <a:fld id="{4CFD207A-07DF-40AD-A916-9872E089CE7A}" type="slidenum">
+              <a:rPr lang="en-US" smtClean="0"/>
+              <a:t>5</a:t>
+            </a:fld>
+            <a:endParaRPr lang="en-US"/>
+          </a:p>
+        </p:txBody>
+      </p:sp>
+    </p:spTree>
+    <p:extLst>
+      <p:ext uri="{BB962C8B-B14F-4D97-AF65-F5344CB8AC3E}">
+        <p14:creationId xmlns:p14="http://schemas.microsoft.com/office/powerpoint/2010/main" val="2352229153"/>
+      </p:ext>
+    </p:extLst>
+  </p:cSld>
+  <p:clrMapOvr>
+    <a:masterClrMapping/>
+  </p:clrMapOvr>
+</p:notes>
+</file>
+
+<file path=ppt/notesSlides/notesSlide6.xml><?xml version="1.0" encoding="utf-8"?>
+<p:notes xmlns:a="http://schemas.openxmlformats.org/drawingml/2006/main" xmlns:r="http://schemas.openxmlformats.org/officeDocument/2006/relationships" xmlns:p="http://schemas.openxmlformats.org/presentationml/2006/main">
+  <p:cSld>
+    <p:spTree>
+      <p:nvGrpSpPr>
+        <p:cNvPr id="1" name=""/>
+        <p:cNvGrpSpPr/>
+        <p:nvPr/>
+      </p:nvGrpSpPr>
+      <p:grpSpPr>
+        <a:xfrm>
+          <a:off x="0" y="0"/>
+          <a:ext cx="0" cy="0"/>
+          <a:chOff x="0" y="0"/>
+          <a:chExt cx="0" cy="0"/>
+        </a:xfrm>
+      </p:grpSpPr>
+      <p:sp>
+        <p:nvSpPr>
+          <p:cNvPr id="2" name="Slide Image Placeholder 1"/>
+          <p:cNvSpPr>
+            <a:spLocks noGrp="1" noRot="1" noChangeAspect="1"/>
+          </p:cNvSpPr>
+          <p:nvPr>
+            <p:ph type="sldImg"/>
+          </p:nvPr>
+        </p:nvSpPr>
+        <p:spPr/>
+      </p:sp>
+      <p:sp>
+        <p:nvSpPr>
+          <p:cNvPr id="3" name="Notes Placeholder 2"/>
+          <p:cNvSpPr>
+            <a:spLocks noGrp="1"/>
+          </p:cNvSpPr>
+          <p:nvPr>
+            <p:ph type="body" idx="1"/>
+          </p:nvPr>
+        </p:nvSpPr>
+        <p:spPr/>
+        <p:txBody>
+          <a:bodyPr/>
+          <a:lstStyle/>
+          <a:p>
+            <a:endParaRPr lang="en-US" dirty="0"/>
+          </a:p>
+        </p:txBody>
+      </p:sp>
+      <p:sp>
+        <p:nvSpPr>
+          <p:cNvPr id="4" name="Slide Number Placeholder 3"/>
+          <p:cNvSpPr>
+            <a:spLocks noGrp="1"/>
+          </p:cNvSpPr>
+          <p:nvPr>
+            <p:ph type="sldNum" sz="quarter" idx="10"/>
+          </p:nvPr>
+        </p:nvSpPr>
+        <p:spPr/>
+        <p:txBody>
+          <a:bodyPr/>
+          <a:lstStyle/>
+          <a:p>
+            <a:fld id="{4CFD207A-07DF-40AD-A916-9872E089CE7A}" type="slidenum">
+              <a:rPr lang="en-US" smtClean="0"/>
+              <a:t>6</a:t>
+            </a:fld>
+            <a:endParaRPr lang="en-US"/>
+          </a:p>
+        </p:txBody>
+      </p:sp>
+    </p:spTree>
+    <p:extLst>
+      <p:ext uri="{BB962C8B-B14F-4D97-AF65-F5344CB8AC3E}">
+        <p14:creationId xmlns:p14="http://schemas.microsoft.com/office/powerpoint/2010/main" val="1821843673"/>
+      </p:ext>
+    </p:extLst>
+  </p:cSld>
+  <p:clrMapOvr>
+    <a:masterClrMapping/>
+  </p:clrMapOvr>
+</p:notes>
+</file>
+
+<file path=ppt/notesSlides/notesSlide7.xml><?xml version="1.0" encoding="utf-8"?>
+<p:notes xmlns:a="http://schemas.openxmlformats.org/drawingml/2006/main" xmlns:r="http://schemas.openxmlformats.org/officeDocument/2006/relationships" xmlns:p="http://schemas.openxmlformats.org/presentationml/2006/main">
+  <p:cSld>
+    <p:spTree>
+      <p:nvGrpSpPr>
+        <p:cNvPr id="1" name=""/>
+        <p:cNvGrpSpPr/>
+        <p:nvPr/>
+      </p:nvGrpSpPr>
+      <p:grpSpPr>
+        <a:xfrm>
+          <a:off x="0" y="0"/>
+          <a:ext cx="0" cy="0"/>
+          <a:chOff x="0" y="0"/>
+          <a:chExt cx="0" cy="0"/>
+        </a:xfrm>
+      </p:grpSpPr>
+      <p:sp>
+        <p:nvSpPr>
+          <p:cNvPr id="2" name="Slide Image Placeholder 1"/>
+          <p:cNvSpPr>
+            <a:spLocks noGrp="1" noRot="1" noChangeAspect="1"/>
+          </p:cNvSpPr>
+          <p:nvPr>
+            <p:ph type="sldImg"/>
+          </p:nvPr>
+        </p:nvSpPr>
+        <p:spPr/>
+      </p:sp>
+      <p:sp>
+        <p:nvSpPr>
+          <p:cNvPr id="3" name="Notes Placeholder 2"/>
+          <p:cNvSpPr>
+            <a:spLocks noGrp="1"/>
+          </p:cNvSpPr>
+          <p:nvPr>
+            <p:ph type="body" idx="1"/>
+          </p:nvPr>
+        </p:nvSpPr>
+        <p:spPr/>
+        <p:txBody>
+          <a:bodyPr/>
+          <a:lstStyle/>
+          <a:p>
+            <a:endParaRPr lang="en-US" dirty="0"/>
+          </a:p>
+        </p:txBody>
+      </p:sp>
+      <p:sp>
+        <p:nvSpPr>
+          <p:cNvPr id="4" name="Slide Number Placeholder 3"/>
+          <p:cNvSpPr>
+            <a:spLocks noGrp="1"/>
+          </p:cNvSpPr>
+          <p:nvPr>
+            <p:ph type="sldNum" sz="quarter" idx="10"/>
+          </p:nvPr>
+        </p:nvSpPr>
+        <p:spPr/>
+        <p:txBody>
+          <a:bodyPr/>
+          <a:lstStyle/>
+          <a:p>
+            <a:fld id="{4CFD207A-07DF-40AD-A916-9872E089CE7A}" type="slidenum">
+              <a:rPr lang="en-US" smtClean="0"/>
+              <a:t>7</a:t>
+            </a:fld>
+            <a:endParaRPr lang="en-US"/>
+          </a:p>
+        </p:txBody>
+      </p:sp>
+    </p:spTree>
+    <p:extLst>
+      <p:ext uri="{BB962C8B-B14F-4D97-AF65-F5344CB8AC3E}">
+        <p14:creationId xmlns:p14="http://schemas.microsoft.com/office/powerpoint/2010/main" val="1153985469"/>
+      </p:ext>
+    </p:extLst>
+  </p:cSld>
+  <p:clrMapOvr>
+    <a:masterClrMapping/>
+  </p:clrMapOvr>
+</p:notes>
+</file>
+
+<file path=ppt/notesSlides/notesSlide8.xml><?xml version="1.0" encoding="utf-8"?>
+<p:notes xmlns:a="http://schemas.openxmlformats.org/drawingml/2006/main" xmlns:r="http://schemas.openxmlformats.org/officeDocument/2006/relationships" xmlns:p="http://schemas.openxmlformats.org/presentationml/2006/main">
+  <p:cSld>
+    <p:spTree>
+      <p:nvGrpSpPr>
+        <p:cNvPr id="1" name=""/>
+        <p:cNvGrpSpPr/>
+        <p:nvPr/>
+      </p:nvGrpSpPr>
+      <p:grpSpPr>
+        <a:xfrm>
+          <a:off x="0" y="0"/>
+          <a:ext cx="0" cy="0"/>
+          <a:chOff x="0" y="0"/>
+          <a:chExt cx="0" cy="0"/>
+        </a:xfrm>
+      </p:grpSpPr>
+      <p:sp>
+        <p:nvSpPr>
+          <p:cNvPr id="2" name="Slide Image Placeholder 1"/>
+          <p:cNvSpPr>
+            <a:spLocks noGrp="1" noRot="1" noChangeAspect="1"/>
+          </p:cNvSpPr>
+          <p:nvPr>
+            <p:ph type="sldImg"/>
+          </p:nvPr>
+        </p:nvSpPr>
+        <p:spPr/>
+      </p:sp>
+      <p:sp>
+        <p:nvSpPr>
+          <p:cNvPr id="3" name="Notes Placeholder 2"/>
+          <p:cNvSpPr>
+            <a:spLocks noGrp="1"/>
+          </p:cNvSpPr>
+          <p:nvPr>
+            <p:ph type="body" idx="1"/>
+          </p:nvPr>
+        </p:nvSpPr>
+        <p:spPr/>
+        <p:txBody>
+          <a:bodyPr/>
+          <a:lstStyle/>
+          <a:p>
+            <a:pPr marL="0" indent="0">
+              <a:buFontTx/>
+              <a:buNone/>
+            </a:pPr>
+            <a:r>
+              <a:rPr lang="en-US" dirty="0" smtClean="0"/>
+              <a:t>Peripheral Concerns</a:t>
+            </a:r>
+          </a:p>
+          <a:p>
+            <a:pPr marL="171450" indent="-171450">
+              <a:buFontTx/>
+              <a:buChar char="-"/>
+            </a:pPr>
+            <a:r>
+              <a:rPr lang="en-US" dirty="0" smtClean="0"/>
+              <a:t>Media services</a:t>
+            </a:r>
+          </a:p>
+          <a:p>
+            <a:pPr marL="171450" indent="-171450">
+              <a:buFontTx/>
+              <a:buChar char="-"/>
+            </a:pPr>
+            <a:r>
+              <a:rPr lang="en-US" dirty="0" smtClean="0"/>
+              <a:t>Network information</a:t>
+            </a:r>
+          </a:p>
+          <a:p>
+            <a:pPr marL="171450" indent="-171450">
+              <a:buFontTx/>
+              <a:buChar char="-"/>
+            </a:pPr>
+            <a:r>
+              <a:rPr lang="en-US" dirty="0" smtClean="0"/>
+              <a:t>Source</a:t>
+            </a:r>
+            <a:r>
+              <a:rPr lang="en-US" baseline="0" dirty="0" smtClean="0"/>
+              <a:t> code</a:t>
+            </a:r>
+            <a:endParaRPr lang="en-US" dirty="0"/>
+          </a:p>
+        </p:txBody>
+      </p:sp>
+      <p:sp>
+        <p:nvSpPr>
+          <p:cNvPr id="4" name="Slide Number Placeholder 3"/>
+          <p:cNvSpPr>
+            <a:spLocks noGrp="1"/>
+          </p:cNvSpPr>
+          <p:nvPr>
+            <p:ph type="sldNum" sz="quarter" idx="10"/>
+          </p:nvPr>
+        </p:nvSpPr>
+        <p:spPr/>
+        <p:txBody>
+          <a:bodyPr/>
+          <a:lstStyle/>
+          <a:p>
+            <a:fld id="{4CFD207A-07DF-40AD-A916-9872E089CE7A}" type="slidenum">
+              <a:rPr lang="en-US" smtClean="0"/>
+              <a:t>8</a:t>
+            </a:fld>
+            <a:endParaRPr lang="en-US"/>
+          </a:p>
+        </p:txBody>
+      </p:sp>
+    </p:spTree>
+    <p:extLst>
+      <p:ext uri="{BB962C8B-B14F-4D97-AF65-F5344CB8AC3E}">
+        <p14:creationId xmlns:p14="http://schemas.microsoft.com/office/powerpoint/2010/main" val="1893233003"/>
+      </p:ext>
+    </p:extLst>
+  </p:cSld>
+  <p:clrMapOvr>
+    <a:masterClrMapping/>
+  </p:clrMapOvr>
+</p:notes>
+</file>
+
+<file path=ppt/notesSlides/notesSlide9.xml><?xml version="1.0" encoding="utf-8"?>
+<p:notes xmlns:a="http://schemas.openxmlformats.org/drawingml/2006/main" xmlns:r="http://schemas.openxmlformats.org/officeDocument/2006/relationships" xmlns:p="http://schemas.openxmlformats.org/presentationml/2006/main">
+  <p:cSld>
+    <p:spTree>
+      <p:nvGrpSpPr>
+        <p:cNvPr id="1" name=""/>
+        <p:cNvGrpSpPr/>
+        <p:nvPr/>
+      </p:nvGrpSpPr>
+      <p:grpSpPr>
+        <a:xfrm>
+          <a:off x="0" y="0"/>
+          <a:ext cx="0" cy="0"/>
+          <a:chOff x="0" y="0"/>
+          <a:chExt cx="0" cy="0"/>
+        </a:xfrm>
+      </p:grpSpPr>
+      <p:sp>
+        <p:nvSpPr>
+          <p:cNvPr id="2" name="Slide Image Placeholder 1"/>
+          <p:cNvSpPr>
+            <a:spLocks noGrp="1" noRot="1" noChangeAspect="1"/>
+          </p:cNvSpPr>
+          <p:nvPr>
+            <p:ph type="sldImg"/>
+          </p:nvPr>
+        </p:nvSpPr>
+        <p:spPr/>
+      </p:sp>
+      <p:sp>
+        <p:nvSpPr>
+          <p:cNvPr id="3" name="Notes Placeholder 2"/>
+          <p:cNvSpPr>
+            <a:spLocks noGrp="1"/>
+          </p:cNvSpPr>
+          <p:nvPr>
+            <p:ph type="body" idx="1"/>
+          </p:nvPr>
+        </p:nvSpPr>
+        <p:spPr/>
+        <p:txBody>
+          <a:bodyPr/>
+          <a:lstStyle/>
+          <a:p>
+            <a:r>
+              <a:rPr lang="en-US" dirty="0" smtClean="0"/>
+              <a:t>What are you trying to store?</a:t>
+            </a:r>
+          </a:p>
+          <a:p>
+            <a:r>
+              <a:rPr lang="en-US" dirty="0" smtClean="0"/>
+              <a:t>Don’t reinvent the wheel</a:t>
+            </a:r>
+          </a:p>
+          <a:p>
+            <a:r>
+              <a:rPr lang="en-US" dirty="0" smtClean="0"/>
+              <a:t>Find</a:t>
+            </a:r>
+            <a:r>
+              <a:rPr lang="en-US" baseline="0" dirty="0" smtClean="0"/>
+              <a:t> the right container</a:t>
+            </a:r>
+          </a:p>
+          <a:p>
+            <a:r>
+              <a:rPr lang="en-US" baseline="0" dirty="0" smtClean="0"/>
+              <a:t>Plan out your path, choose the affordable but most pragmatic approach</a:t>
+            </a:r>
+            <a:endParaRPr lang="en-US" dirty="0"/>
+          </a:p>
+        </p:txBody>
+      </p:sp>
+      <p:sp>
+        <p:nvSpPr>
+          <p:cNvPr id="4" name="Slide Number Placeholder 3"/>
+          <p:cNvSpPr>
+            <a:spLocks noGrp="1"/>
+          </p:cNvSpPr>
+          <p:nvPr>
+            <p:ph type="sldNum" sz="quarter" idx="10"/>
+          </p:nvPr>
+        </p:nvSpPr>
+        <p:spPr/>
+        <p:txBody>
+          <a:bodyPr/>
+          <a:lstStyle/>
+          <a:p>
+            <a:fld id="{4CFD207A-07DF-40AD-A916-9872E089CE7A}" type="slidenum">
+              <a:rPr lang="en-US" smtClean="0"/>
+              <a:t>9</a:t>
+            </a:fld>
+            <a:endParaRPr lang="en-US"/>
+          </a:p>
+        </p:txBody>
+      </p:sp>
+    </p:spTree>
+    <p:extLst>
+      <p:ext uri="{BB962C8B-B14F-4D97-AF65-F5344CB8AC3E}">
+        <p14:creationId xmlns:p14="http://schemas.microsoft.com/office/powerpoint/2010/main" val="3357417595"/>
       </p:ext>
     </p:extLst>
   </p:cSld>
@@ -3748,6 +4411,721 @@
 </p:sld>
 </file>
 
+<file path=ppt/slides/slide10.xml><?xml version="1.0" encoding="utf-8"?>
+<p:sld xmlns:a="http://schemas.openxmlformats.org/drawingml/2006/main" xmlns:r="http://schemas.openxmlformats.org/officeDocument/2006/relationships" xmlns:p="http://schemas.openxmlformats.org/presentationml/2006/main">
+  <p:cSld>
+    <p:spTree>
+      <p:nvGrpSpPr>
+        <p:cNvPr id="1" name=""/>
+        <p:cNvGrpSpPr/>
+        <p:nvPr/>
+      </p:nvGrpSpPr>
+      <p:grpSpPr>
+        <a:xfrm>
+          <a:off x="0" y="0"/>
+          <a:ext cx="0" cy="0"/>
+          <a:chOff x="0" y="0"/>
+          <a:chExt cx="0" cy="0"/>
+        </a:xfrm>
+      </p:grpSpPr>
+      <p:sp>
+        <p:nvSpPr>
+          <p:cNvPr id="2" name="Title 1"/>
+          <p:cNvSpPr>
+            <a:spLocks noGrp="1"/>
+          </p:cNvSpPr>
+          <p:nvPr>
+            <p:ph type="title"/>
+          </p:nvPr>
+        </p:nvSpPr>
+        <p:spPr/>
+        <p:txBody>
+          <a:bodyPr/>
+          <a:lstStyle/>
+          <a:p>
+            <a:r>
+              <a:rPr lang="en-US" dirty="0" err="1"/>
+              <a:t>i</a:t>
+            </a:r>
+            <a:r>
+              <a:rPr lang="en-US" dirty="0" err="1" smtClean="0"/>
+              <a:t>magenomnom</a:t>
+            </a:r>
+            <a:r>
+              <a:rPr lang="en-US" dirty="0" smtClean="0"/>
+              <a:t> Storage Concerns</a:t>
+            </a:r>
+            <a:endParaRPr lang="en-US" dirty="0"/>
+          </a:p>
+        </p:txBody>
+      </p:sp>
+      <p:sp>
+        <p:nvSpPr>
+          <p:cNvPr id="3" name="Content Placeholder 2"/>
+          <p:cNvSpPr>
+            <a:spLocks noGrp="1"/>
+          </p:cNvSpPr>
+          <p:nvPr>
+            <p:ph sz="quarter" idx="10"/>
+          </p:nvPr>
+        </p:nvSpPr>
+        <p:spPr>
+          <a:xfrm>
+            <a:off x="379514" y="1099971"/>
+            <a:ext cx="11525250" cy="4825962"/>
+          </a:xfrm>
+        </p:spPr>
+        <p:txBody>
+          <a:bodyPr/>
+          <a:lstStyle/>
+          <a:p>
+            <a:r>
+              <a:rPr lang="en-US" sz="2800" dirty="0" smtClean="0"/>
+              <a:t>User credentials</a:t>
+            </a:r>
+          </a:p>
+          <a:p>
+            <a:pPr lvl="1"/>
+            <a:r>
+              <a:rPr lang="en-US" sz="2400" dirty="0" smtClean="0"/>
+              <a:t>SQL Database</a:t>
+            </a:r>
+          </a:p>
+          <a:p>
+            <a:r>
+              <a:rPr lang="en-US" sz="2800" dirty="0" smtClean="0"/>
+              <a:t>Images</a:t>
+            </a:r>
+          </a:p>
+          <a:p>
+            <a:pPr lvl="1"/>
+            <a:r>
+              <a:rPr lang="en-US" sz="2400" dirty="0" smtClean="0"/>
+              <a:t>Blob Storage</a:t>
+            </a:r>
+          </a:p>
+          <a:p>
+            <a:r>
+              <a:rPr lang="en-US" sz="2800" dirty="0" smtClean="0"/>
+              <a:t>Image Metadata</a:t>
+            </a:r>
+          </a:p>
+          <a:p>
+            <a:pPr lvl="1"/>
+            <a:r>
+              <a:rPr lang="en-US" sz="2400" dirty="0" smtClean="0"/>
+              <a:t>Table Storage</a:t>
+            </a:r>
+          </a:p>
+          <a:p>
+            <a:r>
+              <a:rPr lang="en-US" sz="2800" dirty="0" smtClean="0"/>
+              <a:t>Logging information</a:t>
+            </a:r>
+          </a:p>
+          <a:p>
+            <a:pPr lvl="1"/>
+            <a:r>
+              <a:rPr lang="en-US" sz="2400" dirty="0" smtClean="0"/>
+              <a:t>Elastic Search</a:t>
+            </a:r>
+          </a:p>
+          <a:p>
+            <a:r>
+              <a:rPr lang="en-US" sz="2800" dirty="0" smtClean="0"/>
+              <a:t>Sign-up processing</a:t>
+            </a:r>
+          </a:p>
+          <a:p>
+            <a:pPr lvl="1"/>
+            <a:r>
+              <a:rPr lang="en-US" sz="2400" dirty="0" smtClean="0"/>
+              <a:t>Storage Queue</a:t>
+            </a:r>
+            <a:endParaRPr lang="en-US" sz="2400" dirty="0"/>
+          </a:p>
+        </p:txBody>
+      </p:sp>
+      <p:sp>
+        <p:nvSpPr>
+          <p:cNvPr id="4" name="TextBox 3"/>
+          <p:cNvSpPr txBox="1"/>
+          <p:nvPr/>
+        </p:nvSpPr>
+        <p:spPr>
+          <a:xfrm>
+            <a:off x="9906000" y="-1"/>
+            <a:ext cx="2286000" cy="2031325"/>
+          </a:xfrm>
+          <a:prstGeom prst="rect">
+            <a:avLst/>
+          </a:prstGeom>
+          <a:solidFill>
+            <a:srgbClr val="FFFF00"/>
+          </a:solidFill>
+          <a:ln>
+            <a:noFill/>
+          </a:ln>
+        </p:spPr>
+        <p:txBody>
+          <a:bodyPr wrap="square" rtlCol="0">
+            <a:spAutoFit/>
+          </a:bodyPr>
+          <a:lstStyle/>
+          <a:p>
+            <a:pPr algn="ctr"/>
+            <a:endParaRPr lang="en-US" dirty="0" smtClean="0"/>
+          </a:p>
+          <a:p>
+            <a:pPr algn="ctr"/>
+            <a:endParaRPr lang="en-US" dirty="0"/>
+          </a:p>
+          <a:p>
+            <a:pPr algn="ctr"/>
+            <a:r>
+              <a:rPr lang="en-US" dirty="0" smtClean="0"/>
+              <a:t>Please leave this area blank to allow for picture in picture recording</a:t>
+            </a:r>
+          </a:p>
+          <a:p>
+            <a:pPr algn="ctr"/>
+            <a:endParaRPr lang="en-US" dirty="0"/>
+          </a:p>
+        </p:txBody>
+      </p:sp>
+    </p:spTree>
+    <p:extLst>
+      <p:ext uri="{BB962C8B-B14F-4D97-AF65-F5344CB8AC3E}">
+        <p14:creationId xmlns:p14="http://schemas.microsoft.com/office/powerpoint/2010/main" val="2059098654"/>
+      </p:ext>
+    </p:extLst>
+  </p:cSld>
+  <p:clrMapOvr>
+    <a:masterClrMapping/>
+  </p:clrMapOvr>
+  <p:timing>
+    <p:tnLst>
+      <p:par>
+        <p:cTn id="1" dur="indefinite" restart="never" nodeType="tmRoot">
+          <p:childTnLst>
+            <p:seq concurrent="1" nextAc="seek">
+              <p:cTn id="2" dur="indefinite" nodeType="mainSeq">
+                <p:childTnLst>
+                  <p:par>
+                    <p:cTn id="3" fill="hold">
+                      <p:stCondLst>
+                        <p:cond delay="indefinite"/>
+                      </p:stCondLst>
+                      <p:childTnLst>
+                        <p:par>
+                          <p:cTn id="4" fill="hold">
+                            <p:stCondLst>
+                              <p:cond delay="0"/>
+                            </p:stCondLst>
+                            <p:childTnLst>
+                              <p:par>
+                                <p:cTn id="5" presetID="1" presetClass="entr" presetSubtype="0" fill="hold" nodeType="clickEffect">
+                                  <p:stCondLst>
+                                    <p:cond delay="0"/>
+                                  </p:stCondLst>
+                                  <p:childTnLst>
+                                    <p:set>
+                                      <p:cBhvr>
+                                        <p:cTn id="6" dur="1" fill="hold">
+                                          <p:stCondLst>
+                                            <p:cond delay="0"/>
+                                          </p:stCondLst>
+                                        </p:cTn>
+                                        <p:tgtEl>
+                                          <p:spTgt spid="3">
+                                            <p:txEl>
+                                              <p:pRg st="0" end="0"/>
+                                            </p:txEl>
+                                          </p:spTgt>
+                                        </p:tgtEl>
+                                        <p:attrNameLst>
+                                          <p:attrName>style.visibility</p:attrName>
+                                        </p:attrNameLst>
+                                      </p:cBhvr>
+                                      <p:to>
+                                        <p:strVal val="visible"/>
+                                      </p:to>
+                                    </p:set>
+                                  </p:childTnLst>
+                                </p:cTn>
+                              </p:par>
+                            </p:childTnLst>
+                          </p:cTn>
+                        </p:par>
+                      </p:childTnLst>
+                    </p:cTn>
+                  </p:par>
+                  <p:par>
+                    <p:cTn id="7" fill="hold">
+                      <p:stCondLst>
+                        <p:cond delay="indefinite"/>
+                      </p:stCondLst>
+                      <p:childTnLst>
+                        <p:par>
+                          <p:cTn id="8" fill="hold">
+                            <p:stCondLst>
+                              <p:cond delay="0"/>
+                            </p:stCondLst>
+                            <p:childTnLst>
+                              <p:par>
+                                <p:cTn id="9" presetID="1" presetClass="entr" presetSubtype="0" fill="hold" nodeType="clickEffect">
+                                  <p:stCondLst>
+                                    <p:cond delay="0"/>
+                                  </p:stCondLst>
+                                  <p:childTnLst>
+                                    <p:set>
+                                      <p:cBhvr>
+                                        <p:cTn id="10" dur="1" fill="hold">
+                                          <p:stCondLst>
+                                            <p:cond delay="0"/>
+                                          </p:stCondLst>
+                                        </p:cTn>
+                                        <p:tgtEl>
+                                          <p:spTgt spid="3">
+                                            <p:txEl>
+                                              <p:pRg st="1" end="1"/>
+                                            </p:txEl>
+                                          </p:spTgt>
+                                        </p:tgtEl>
+                                        <p:attrNameLst>
+                                          <p:attrName>style.visibility</p:attrName>
+                                        </p:attrNameLst>
+                                      </p:cBhvr>
+                                      <p:to>
+                                        <p:strVal val="visible"/>
+                                      </p:to>
+                                    </p:set>
+                                  </p:childTnLst>
+                                </p:cTn>
+                              </p:par>
+                            </p:childTnLst>
+                          </p:cTn>
+                        </p:par>
+                      </p:childTnLst>
+                    </p:cTn>
+                  </p:par>
+                  <p:par>
+                    <p:cTn id="11" fill="hold">
+                      <p:stCondLst>
+                        <p:cond delay="indefinite"/>
+                      </p:stCondLst>
+                      <p:childTnLst>
+                        <p:par>
+                          <p:cTn id="12" fill="hold">
+                            <p:stCondLst>
+                              <p:cond delay="0"/>
+                            </p:stCondLst>
+                            <p:childTnLst>
+                              <p:par>
+                                <p:cTn id="13" presetID="1" presetClass="entr" presetSubtype="0" fill="hold" nodeType="clickEffect">
+                                  <p:stCondLst>
+                                    <p:cond delay="0"/>
+                                  </p:stCondLst>
+                                  <p:childTnLst>
+                                    <p:set>
+                                      <p:cBhvr>
+                                        <p:cTn id="14" dur="1" fill="hold">
+                                          <p:stCondLst>
+                                            <p:cond delay="0"/>
+                                          </p:stCondLst>
+                                        </p:cTn>
+                                        <p:tgtEl>
+                                          <p:spTgt spid="3">
+                                            <p:txEl>
+                                              <p:pRg st="2" end="2"/>
+                                            </p:txEl>
+                                          </p:spTgt>
+                                        </p:tgtEl>
+                                        <p:attrNameLst>
+                                          <p:attrName>style.visibility</p:attrName>
+                                        </p:attrNameLst>
+                                      </p:cBhvr>
+                                      <p:to>
+                                        <p:strVal val="visible"/>
+                                      </p:to>
+                                    </p:set>
+                                  </p:childTnLst>
+                                </p:cTn>
+                              </p:par>
+                            </p:childTnLst>
+                          </p:cTn>
+                        </p:par>
+                      </p:childTnLst>
+                    </p:cTn>
+                  </p:par>
+                  <p:par>
+                    <p:cTn id="15" fill="hold">
+                      <p:stCondLst>
+                        <p:cond delay="indefinite"/>
+                      </p:stCondLst>
+                      <p:childTnLst>
+                        <p:par>
+                          <p:cTn id="16" fill="hold">
+                            <p:stCondLst>
+                              <p:cond delay="0"/>
+                            </p:stCondLst>
+                            <p:childTnLst>
+                              <p:par>
+                                <p:cTn id="17" presetID="1" presetClass="entr" presetSubtype="0" fill="hold" nodeType="clickEffect">
+                                  <p:stCondLst>
+                                    <p:cond delay="0"/>
+                                  </p:stCondLst>
+                                  <p:childTnLst>
+                                    <p:set>
+                                      <p:cBhvr>
+                                        <p:cTn id="18" dur="1" fill="hold">
+                                          <p:stCondLst>
+                                            <p:cond delay="0"/>
+                                          </p:stCondLst>
+                                        </p:cTn>
+                                        <p:tgtEl>
+                                          <p:spTgt spid="3">
+                                            <p:txEl>
+                                              <p:pRg st="3" end="3"/>
+                                            </p:txEl>
+                                          </p:spTgt>
+                                        </p:tgtEl>
+                                        <p:attrNameLst>
+                                          <p:attrName>style.visibility</p:attrName>
+                                        </p:attrNameLst>
+                                      </p:cBhvr>
+                                      <p:to>
+                                        <p:strVal val="visible"/>
+                                      </p:to>
+                                    </p:set>
+                                  </p:childTnLst>
+                                </p:cTn>
+                              </p:par>
+                            </p:childTnLst>
+                          </p:cTn>
+                        </p:par>
+                      </p:childTnLst>
+                    </p:cTn>
+                  </p:par>
+                  <p:par>
+                    <p:cTn id="19" fill="hold">
+                      <p:stCondLst>
+                        <p:cond delay="indefinite"/>
+                      </p:stCondLst>
+                      <p:childTnLst>
+                        <p:par>
+                          <p:cTn id="20" fill="hold">
+                            <p:stCondLst>
+                              <p:cond delay="0"/>
+                            </p:stCondLst>
+                            <p:childTnLst>
+                              <p:par>
+                                <p:cTn id="21" presetID="1" presetClass="entr" presetSubtype="0" fill="hold" nodeType="clickEffect">
+                                  <p:stCondLst>
+                                    <p:cond delay="0"/>
+                                  </p:stCondLst>
+                                  <p:childTnLst>
+                                    <p:set>
+                                      <p:cBhvr>
+                                        <p:cTn id="22" dur="1" fill="hold">
+                                          <p:stCondLst>
+                                            <p:cond delay="0"/>
+                                          </p:stCondLst>
+                                        </p:cTn>
+                                        <p:tgtEl>
+                                          <p:spTgt spid="3">
+                                            <p:txEl>
+                                              <p:pRg st="4" end="4"/>
+                                            </p:txEl>
+                                          </p:spTgt>
+                                        </p:tgtEl>
+                                        <p:attrNameLst>
+                                          <p:attrName>style.visibility</p:attrName>
+                                        </p:attrNameLst>
+                                      </p:cBhvr>
+                                      <p:to>
+                                        <p:strVal val="visible"/>
+                                      </p:to>
+                                    </p:set>
+                                  </p:childTnLst>
+                                </p:cTn>
+                              </p:par>
+                            </p:childTnLst>
+                          </p:cTn>
+                        </p:par>
+                      </p:childTnLst>
+                    </p:cTn>
+                  </p:par>
+                  <p:par>
+                    <p:cTn id="23" fill="hold">
+                      <p:stCondLst>
+                        <p:cond delay="indefinite"/>
+                      </p:stCondLst>
+                      <p:childTnLst>
+                        <p:par>
+                          <p:cTn id="24" fill="hold">
+                            <p:stCondLst>
+                              <p:cond delay="0"/>
+                            </p:stCondLst>
+                            <p:childTnLst>
+                              <p:par>
+                                <p:cTn id="25" presetID="1" presetClass="entr" presetSubtype="0" fill="hold" nodeType="clickEffect">
+                                  <p:stCondLst>
+                                    <p:cond delay="0"/>
+                                  </p:stCondLst>
+                                  <p:childTnLst>
+                                    <p:set>
+                                      <p:cBhvr>
+                                        <p:cTn id="26" dur="1" fill="hold">
+                                          <p:stCondLst>
+                                            <p:cond delay="0"/>
+                                          </p:stCondLst>
+                                        </p:cTn>
+                                        <p:tgtEl>
+                                          <p:spTgt spid="3">
+                                            <p:txEl>
+                                              <p:pRg st="5" end="5"/>
+                                            </p:txEl>
+                                          </p:spTgt>
+                                        </p:tgtEl>
+                                        <p:attrNameLst>
+                                          <p:attrName>style.visibility</p:attrName>
+                                        </p:attrNameLst>
+                                      </p:cBhvr>
+                                      <p:to>
+                                        <p:strVal val="visible"/>
+                                      </p:to>
+                                    </p:set>
+                                  </p:childTnLst>
+                                </p:cTn>
+                              </p:par>
+                            </p:childTnLst>
+                          </p:cTn>
+                        </p:par>
+                      </p:childTnLst>
+                    </p:cTn>
+                  </p:par>
+                  <p:par>
+                    <p:cTn id="27" fill="hold">
+                      <p:stCondLst>
+                        <p:cond delay="indefinite"/>
+                      </p:stCondLst>
+                      <p:childTnLst>
+                        <p:par>
+                          <p:cTn id="28" fill="hold">
+                            <p:stCondLst>
+                              <p:cond delay="0"/>
+                            </p:stCondLst>
+                            <p:childTnLst>
+                              <p:par>
+                                <p:cTn id="29" presetID="1" presetClass="entr" presetSubtype="0" fill="hold" nodeType="clickEffect">
+                                  <p:stCondLst>
+                                    <p:cond delay="0"/>
+                                  </p:stCondLst>
+                                  <p:childTnLst>
+                                    <p:set>
+                                      <p:cBhvr>
+                                        <p:cTn id="30" dur="1" fill="hold">
+                                          <p:stCondLst>
+                                            <p:cond delay="0"/>
+                                          </p:stCondLst>
+                                        </p:cTn>
+                                        <p:tgtEl>
+                                          <p:spTgt spid="3">
+                                            <p:txEl>
+                                              <p:pRg st="6" end="6"/>
+                                            </p:txEl>
+                                          </p:spTgt>
+                                        </p:tgtEl>
+                                        <p:attrNameLst>
+                                          <p:attrName>style.visibility</p:attrName>
+                                        </p:attrNameLst>
+                                      </p:cBhvr>
+                                      <p:to>
+                                        <p:strVal val="visible"/>
+                                      </p:to>
+                                    </p:set>
+                                  </p:childTnLst>
+                                </p:cTn>
+                              </p:par>
+                            </p:childTnLst>
+                          </p:cTn>
+                        </p:par>
+                      </p:childTnLst>
+                    </p:cTn>
+                  </p:par>
+                  <p:par>
+                    <p:cTn id="31" fill="hold">
+                      <p:stCondLst>
+                        <p:cond delay="indefinite"/>
+                      </p:stCondLst>
+                      <p:childTnLst>
+                        <p:par>
+                          <p:cTn id="32" fill="hold">
+                            <p:stCondLst>
+                              <p:cond delay="0"/>
+                            </p:stCondLst>
+                            <p:childTnLst>
+                              <p:par>
+                                <p:cTn id="33" presetID="1" presetClass="entr" presetSubtype="0" fill="hold" nodeType="clickEffect">
+                                  <p:stCondLst>
+                                    <p:cond delay="0"/>
+                                  </p:stCondLst>
+                                  <p:childTnLst>
+                                    <p:set>
+                                      <p:cBhvr>
+                                        <p:cTn id="34" dur="1" fill="hold">
+                                          <p:stCondLst>
+                                            <p:cond delay="0"/>
+                                          </p:stCondLst>
+                                        </p:cTn>
+                                        <p:tgtEl>
+                                          <p:spTgt spid="3">
+                                            <p:txEl>
+                                              <p:pRg st="7" end="7"/>
+                                            </p:txEl>
+                                          </p:spTgt>
+                                        </p:tgtEl>
+                                        <p:attrNameLst>
+                                          <p:attrName>style.visibility</p:attrName>
+                                        </p:attrNameLst>
+                                      </p:cBhvr>
+                                      <p:to>
+                                        <p:strVal val="visible"/>
+                                      </p:to>
+                                    </p:set>
+                                  </p:childTnLst>
+                                </p:cTn>
+                              </p:par>
+                            </p:childTnLst>
+                          </p:cTn>
+                        </p:par>
+                      </p:childTnLst>
+                    </p:cTn>
+                  </p:par>
+                  <p:par>
+                    <p:cTn id="35" fill="hold">
+                      <p:stCondLst>
+                        <p:cond delay="indefinite"/>
+                      </p:stCondLst>
+                      <p:childTnLst>
+                        <p:par>
+                          <p:cTn id="36" fill="hold">
+                            <p:stCondLst>
+                              <p:cond delay="0"/>
+                            </p:stCondLst>
+                            <p:childTnLst>
+                              <p:par>
+                                <p:cTn id="37" presetID="1" presetClass="entr" presetSubtype="0" fill="hold" nodeType="clickEffect">
+                                  <p:stCondLst>
+                                    <p:cond delay="0"/>
+                                  </p:stCondLst>
+                                  <p:childTnLst>
+                                    <p:set>
+                                      <p:cBhvr>
+                                        <p:cTn id="38" dur="1" fill="hold">
+                                          <p:stCondLst>
+                                            <p:cond delay="0"/>
+                                          </p:stCondLst>
+                                        </p:cTn>
+                                        <p:tgtEl>
+                                          <p:spTgt spid="3">
+                                            <p:txEl>
+                                              <p:pRg st="8" end="8"/>
+                                            </p:txEl>
+                                          </p:spTgt>
+                                        </p:tgtEl>
+                                        <p:attrNameLst>
+                                          <p:attrName>style.visibility</p:attrName>
+                                        </p:attrNameLst>
+                                      </p:cBhvr>
+                                      <p:to>
+                                        <p:strVal val="visible"/>
+                                      </p:to>
+                                    </p:set>
+                                  </p:childTnLst>
+                                </p:cTn>
+                              </p:par>
+                            </p:childTnLst>
+                          </p:cTn>
+                        </p:par>
+                      </p:childTnLst>
+                    </p:cTn>
+                  </p:par>
+                  <p:par>
+                    <p:cTn id="39" fill="hold">
+                      <p:stCondLst>
+                        <p:cond delay="indefinite"/>
+                      </p:stCondLst>
+                      <p:childTnLst>
+                        <p:par>
+                          <p:cTn id="40" fill="hold">
+                            <p:stCondLst>
+                              <p:cond delay="0"/>
+                            </p:stCondLst>
+                            <p:childTnLst>
+                              <p:par>
+                                <p:cTn id="41" presetID="1" presetClass="entr" presetSubtype="0" fill="hold" nodeType="clickEffect">
+                                  <p:stCondLst>
+                                    <p:cond delay="0"/>
+                                  </p:stCondLst>
+                                  <p:childTnLst>
+                                    <p:set>
+                                      <p:cBhvr>
+                                        <p:cTn id="42" dur="1" fill="hold">
+                                          <p:stCondLst>
+                                            <p:cond delay="0"/>
+                                          </p:stCondLst>
+                                        </p:cTn>
+                                        <p:tgtEl>
+                                          <p:spTgt spid="3">
+                                            <p:txEl>
+                                              <p:pRg st="9" end="9"/>
+                                            </p:txEl>
+                                          </p:spTgt>
+                                        </p:tgtEl>
+                                        <p:attrNameLst>
+                                          <p:attrName>style.visibility</p:attrName>
+                                        </p:attrNameLst>
+                                      </p:cBhvr>
+                                      <p:to>
+                                        <p:strVal val="visible"/>
+                                      </p:to>
+                                    </p:set>
+                                  </p:childTnLst>
+                                </p:cTn>
+                              </p:par>
+                            </p:childTnLst>
+                          </p:cTn>
+                        </p:par>
+                      </p:childTnLst>
+                    </p:cTn>
+                  </p:par>
+                </p:childTnLst>
+              </p:cTn>
+              <p:prevCondLst>
+                <p:cond evt="onPrev" delay="0">
+                  <p:tgtEl>
+                    <p:sldTgt/>
+                  </p:tgtEl>
+                </p:cond>
+              </p:prevCondLst>
+              <p:nextCondLst>
+                <p:cond evt="onNext" delay="0">
+                  <p:tgtEl>
+                    <p:sldTgt/>
+                  </p:tgtEl>
+                </p:cond>
+              </p:nextCondLst>
+            </p:seq>
+          </p:childTnLst>
+        </p:cTn>
+      </p:par>
+    </p:tnLst>
+  </p:timing>
+</p:sld>
+</file>
+
 <file path=ppt/slides/slide2.xml><?xml version="1.0" encoding="utf-8"?>
 <p:sld xmlns:a="http://schemas.openxmlformats.org/drawingml/2006/main" xmlns:r="http://schemas.openxmlformats.org/officeDocument/2006/relationships" xmlns:p="http://schemas.openxmlformats.org/presentationml/2006/main">
   <p:cSld>
@@ -3784,19 +5162,25 @@
           <a:p>
             <a:r>
               <a:rPr lang="en-GB" dirty="0" smtClean="0"/>
-              <a:t>Topic One</a:t>
-            </a:r>
+              <a:t>Examine the different types of storage</a:t>
+            </a:r>
+            <a:endParaRPr lang="en-GB" dirty="0" smtClean="0"/>
           </a:p>
           <a:p>
             <a:r>
               <a:rPr lang="en-GB" dirty="0" smtClean="0"/>
-              <a:t>Topic Two</a:t>
-            </a:r>
+              <a:t>Brief discussion on usage scenarios</a:t>
+            </a:r>
+            <a:endParaRPr lang="en-GB" dirty="0" smtClean="0"/>
           </a:p>
           <a:p>
             <a:r>
               <a:rPr lang="en-GB" dirty="0" smtClean="0"/>
-              <a:t>Topic Three</a:t>
+              <a:t>Walkthrough of storage usage in </a:t>
+            </a:r>
+            <a:r>
+              <a:rPr lang="en-GB" dirty="0" err="1" smtClean="0"/>
+              <a:t>imagenomnom</a:t>
             </a:r>
             <a:endParaRPr lang="en-GB" dirty="0"/>
           </a:p>
@@ -3820,38 +5204,6 @@
             <a:r>
               <a:rPr lang="en-US" smtClean="0"/>
               <a:t>Module Overview</a:t>
-            </a:r>
-            <a:endParaRPr lang="en-US" dirty="0"/>
-          </a:p>
-        </p:txBody>
-      </p:sp>
-      <p:sp>
-        <p:nvSpPr>
-          <p:cNvPr id="4" name="TextBox 3"/>
-          <p:cNvSpPr txBox="1"/>
-          <p:nvPr/>
-        </p:nvSpPr>
-        <p:spPr>
-          <a:xfrm>
-            <a:off x="4432363" y="1155171"/>
-            <a:ext cx="3671248" cy="646331"/>
-          </a:xfrm>
-          <a:prstGeom prst="rect">
-            <a:avLst/>
-          </a:prstGeom>
-          <a:solidFill>
-            <a:srgbClr val="FFFF00"/>
-          </a:solidFill>
-        </p:spPr>
-        <p:txBody>
-          <a:bodyPr wrap="square" rtlCol="0">
-            <a:spAutoFit/>
-          </a:bodyPr>
-          <a:lstStyle/>
-          <a:p>
-            <a:r>
-              <a:rPr lang="en-US" dirty="0" smtClean="0"/>
-              <a:t>Please make sure there’s a “Module Overview” slide for every module</a:t>
             </a:r>
             <a:endParaRPr lang="en-US" dirty="0"/>
           </a:p>
@@ -3958,7 +5310,7 @@
           <a:p>
             <a:r>
               <a:rPr lang="en-US" dirty="0" smtClean="0"/>
-              <a:t>Lesson slide</a:t>
+              <a:t>Storage Types</a:t>
             </a:r>
             <a:endParaRPr lang="en-US" dirty="0"/>
           </a:p>
@@ -3974,11 +5326,50 @@
             <p:ph sz="quarter" idx="10"/>
           </p:nvPr>
         </p:nvSpPr>
-        <p:spPr/>
+        <p:spPr>
+          <a:xfrm>
+            <a:off x="379414" y="1388226"/>
+            <a:ext cx="4179140" cy="5290388"/>
+          </a:xfrm>
+        </p:spPr>
         <p:txBody>
           <a:bodyPr/>
           <a:lstStyle/>
           <a:p>
+            <a:r>
+              <a:rPr lang="en-US" b="1" dirty="0" smtClean="0"/>
+              <a:t>Security</a:t>
+            </a:r>
+          </a:p>
+          <a:p>
+            <a:r>
+              <a:rPr lang="en-US" dirty="0" smtClean="0"/>
+              <a:t>Integration</a:t>
+            </a:r>
+          </a:p>
+          <a:p>
+            <a:r>
+              <a:rPr lang="en-US" dirty="0" smtClean="0"/>
+              <a:t>Analytics</a:t>
+            </a:r>
+          </a:p>
+          <a:p>
+            <a:r>
+              <a:rPr lang="en-US" dirty="0" smtClean="0"/>
+              <a:t>Data</a:t>
+            </a:r>
+          </a:p>
+          <a:p>
+            <a:r>
+              <a:rPr lang="en-US" dirty="0" smtClean="0"/>
+              <a:t>Plain Old Storage</a:t>
+            </a:r>
+          </a:p>
+          <a:p>
+            <a:r>
+              <a:rPr lang="en-US" dirty="0" smtClean="0"/>
+              <a:t>Peripheral Concerns</a:t>
+            </a:r>
             <a:endParaRPr lang="en-US" dirty="0"/>
           </a:p>
         </p:txBody>
@@ -4030,6 +5421,195 @@
           </a:p>
         </p:txBody>
       </p:sp>
+      <p:sp>
+        <p:nvSpPr>
+          <p:cNvPr id="5" name="Content Placeholder 2"/>
+          <p:cNvSpPr txBox="1">
+            <a:spLocks/>
+          </p:cNvSpPr>
+          <p:nvPr/>
+        </p:nvSpPr>
+        <p:spPr>
+          <a:xfrm>
+            <a:off x="5486400" y="1388226"/>
+            <a:ext cx="3862605" cy="1462550"/>
+          </a:xfrm>
+          <a:prstGeom prst="rect">
+            <a:avLst/>
+          </a:prstGeom>
+          <a:solidFill>
+            <a:schemeClr val="accent3">
+              <a:lumMod val="20000"/>
+              <a:lumOff val="80000"/>
+            </a:schemeClr>
+          </a:solidFill>
+        </p:spPr>
+        <p:txBody>
+          <a:bodyPr/>
+          <a:lstStyle>
+            <a:lvl1pPr marL="342783" indent="-342783" algn="l" defTabSz="914088" rtl="0" eaLnBrk="1" latinLnBrk="0" hangingPunct="1">
+              <a:spcBef>
+                <a:spcPts val="1400"/>
+              </a:spcBef>
+              <a:buFont typeface="Arial" pitchFamily="34" charset="0"/>
+              <a:buChar char="•"/>
+              <a:defRPr sz="3200" b="0" kern="0" baseline="0">
+                <a:solidFill>
+                  <a:schemeClr val="tx1"/>
+                </a:solidFill>
+                <a:latin typeface="Segoe UI Light" panose="020B0502040204020203" pitchFamily="34" charset="0"/>
+                <a:ea typeface="Segoe UI Light" panose="020B0502040204020203" pitchFamily="34" charset="0"/>
+                <a:cs typeface="Segoe UI Light" panose="020B0502040204020203" pitchFamily="34" charset="0"/>
+              </a:defRPr>
+            </a:lvl1pPr>
+            <a:lvl2pPr marL="742698" indent="-285652" algn="l" defTabSz="914088" rtl="0" eaLnBrk="1" latinLnBrk="0" hangingPunct="1">
+              <a:spcBef>
+                <a:spcPts val="300"/>
+              </a:spcBef>
+              <a:spcAft>
+                <a:spcPts val="300"/>
+              </a:spcAft>
+              <a:buFont typeface="Arial" pitchFamily="34" charset="0"/>
+              <a:buChar char="–"/>
+              <a:defRPr sz="2800" kern="0" baseline="0">
+                <a:solidFill>
+                  <a:schemeClr val="tx1"/>
+                </a:solidFill>
+                <a:latin typeface="Segoe UI Light" panose="020B0502040204020203" pitchFamily="34" charset="0"/>
+                <a:ea typeface="Segoe UI Light" panose="020B0502040204020203" pitchFamily="34" charset="0"/>
+                <a:cs typeface="Segoe UI Light" panose="020B0502040204020203" pitchFamily="34" charset="0"/>
+              </a:defRPr>
+            </a:lvl2pPr>
+            <a:lvl3pPr marL="1142612" indent="-228522" algn="l" defTabSz="914088" rtl="0" eaLnBrk="1" latinLnBrk="0" hangingPunct="1">
+              <a:spcBef>
+                <a:spcPts val="200"/>
+              </a:spcBef>
+              <a:spcAft>
+                <a:spcPts val="200"/>
+              </a:spcAft>
+              <a:buFont typeface="Arial" pitchFamily="34" charset="0"/>
+              <a:buChar char="•"/>
+              <a:defRPr sz="2400" kern="0" baseline="0">
+                <a:solidFill>
+                  <a:schemeClr val="tx1"/>
+                </a:solidFill>
+                <a:latin typeface="Segoe UI Light" panose="020B0502040204020203" pitchFamily="34" charset="0"/>
+                <a:ea typeface="Segoe UI Light" panose="020B0502040204020203" pitchFamily="34" charset="0"/>
+                <a:cs typeface="Segoe UI Light" panose="020B0502040204020203" pitchFamily="34" charset="0"/>
+              </a:defRPr>
+            </a:lvl3pPr>
+            <a:lvl4pPr marL="1599657" indent="-228522" algn="l" defTabSz="914088" rtl="0" eaLnBrk="1" latinLnBrk="0" hangingPunct="1">
+              <a:spcBef>
+                <a:spcPct val="20000"/>
+              </a:spcBef>
+              <a:buFont typeface="Arial" pitchFamily="34" charset="0"/>
+              <a:buChar char="–"/>
+              <a:defRPr sz="2000" kern="0" baseline="0">
+                <a:solidFill>
+                  <a:schemeClr val="tx1"/>
+                </a:solidFill>
+                <a:latin typeface="Segoe UI Light" panose="020B0502040204020203" pitchFamily="34" charset="0"/>
+                <a:ea typeface="Segoe UI Light" panose="020B0502040204020203" pitchFamily="34" charset="0"/>
+                <a:cs typeface="Segoe UI Light" panose="020B0502040204020203" pitchFamily="34" charset="0"/>
+              </a:defRPr>
+            </a:lvl4pPr>
+            <a:lvl5pPr marL="2056700" indent="-228522" algn="l" defTabSz="914088" rtl="0" eaLnBrk="1" latinLnBrk="0" hangingPunct="1">
+              <a:spcBef>
+                <a:spcPct val="20000"/>
+              </a:spcBef>
+              <a:buFont typeface="Arial" pitchFamily="34" charset="0"/>
+              <a:buChar char="»"/>
+              <a:defRPr sz="2000" kern="0" baseline="0">
+                <a:solidFill>
+                  <a:schemeClr val="tx1"/>
+                </a:solidFill>
+                <a:latin typeface="Segoe UI Light" panose="020B0502040204020203" pitchFamily="34" charset="0"/>
+                <a:ea typeface="Segoe UI Light" panose="020B0502040204020203" pitchFamily="34" charset="0"/>
+                <a:cs typeface="Segoe UI Light" panose="020B0502040204020203" pitchFamily="34" charset="0"/>
+              </a:defRPr>
+            </a:lvl5pPr>
+            <a:lvl6pPr marL="2513745" indent="-228522" algn="l" defTabSz="914088" rtl="0" eaLnBrk="1" latinLnBrk="0" hangingPunct="1">
+              <a:spcBef>
+                <a:spcPct val="20000"/>
+              </a:spcBef>
+              <a:buFont typeface="Arial" pitchFamily="34" charset="0"/>
+              <a:buChar char="•"/>
+              <a:defRPr sz="2000" kern="1200">
+                <a:solidFill>
+                  <a:schemeClr val="tx1"/>
+                </a:solidFill>
+                <a:latin typeface="+mn-lt"/>
+                <a:ea typeface="+mn-ea"/>
+                <a:cs typeface="+mn-cs"/>
+              </a:defRPr>
+            </a:lvl6pPr>
+            <a:lvl7pPr marL="2970789" indent="-228522" algn="l" defTabSz="914088" rtl="0" eaLnBrk="1" latinLnBrk="0" hangingPunct="1">
+              <a:spcBef>
+                <a:spcPct val="20000"/>
+              </a:spcBef>
+              <a:buFont typeface="Arial" pitchFamily="34" charset="0"/>
+              <a:buChar char="•"/>
+              <a:defRPr sz="2000" kern="1200">
+                <a:solidFill>
+                  <a:schemeClr val="tx1"/>
+                </a:solidFill>
+                <a:latin typeface="+mn-lt"/>
+                <a:ea typeface="+mn-ea"/>
+                <a:cs typeface="+mn-cs"/>
+              </a:defRPr>
+            </a:lvl7pPr>
+            <a:lvl8pPr marL="3427833" indent="-228522" algn="l" defTabSz="914088" rtl="0" eaLnBrk="1" latinLnBrk="0" hangingPunct="1">
+              <a:spcBef>
+                <a:spcPct val="20000"/>
+              </a:spcBef>
+              <a:buFont typeface="Arial" pitchFamily="34" charset="0"/>
+              <a:buChar char="•"/>
+              <a:defRPr sz="2000" kern="1200">
+                <a:solidFill>
+                  <a:schemeClr val="tx1"/>
+                </a:solidFill>
+                <a:latin typeface="+mn-lt"/>
+                <a:ea typeface="+mn-ea"/>
+                <a:cs typeface="+mn-cs"/>
+              </a:defRPr>
+            </a:lvl8pPr>
+            <a:lvl9pPr marL="3884878" indent="-228522" algn="l" defTabSz="914088" rtl="0" eaLnBrk="1" latinLnBrk="0" hangingPunct="1">
+              <a:spcBef>
+                <a:spcPct val="20000"/>
+              </a:spcBef>
+              <a:buFont typeface="Arial" pitchFamily="34" charset="0"/>
+              <a:buChar char="•"/>
+              <a:defRPr sz="2000" kern="1200">
+                <a:solidFill>
+                  <a:schemeClr val="tx1"/>
+                </a:solidFill>
+                <a:latin typeface="+mn-lt"/>
+                <a:ea typeface="+mn-ea"/>
+                <a:cs typeface="+mn-cs"/>
+              </a:defRPr>
+            </a:lvl9pPr>
+          </a:lstStyle>
+          <a:p>
+            <a:pPr marL="0" indent="0" algn="r">
+              <a:buNone/>
+            </a:pPr>
+            <a:r>
+              <a:rPr lang="en-US" sz="2800" dirty="0" smtClean="0"/>
+              <a:t>Active Directory Users</a:t>
+            </a:r>
+          </a:p>
+          <a:p>
+            <a:pPr marL="0" indent="0" algn="r">
+              <a:buNone/>
+            </a:pPr>
+            <a:r>
+              <a:rPr lang="en-US" sz="2800" dirty="0" smtClean="0"/>
+              <a:t>Key Vault</a:t>
+            </a:r>
+            <a:endParaRPr lang="en-US" sz="2800" dirty="0"/>
+          </a:p>
+        </p:txBody>
+      </p:sp>
     </p:spTree>
     <p:extLst>
       <p:ext uri="{BB962C8B-B14F-4D97-AF65-F5344CB8AC3E}">
@@ -4043,7 +5623,2581 @@
   <p:timing>
     <p:tnLst>
       <p:par>
+        <p:cTn id="1" dur="indefinite" restart="never" nodeType="tmRoot">
+          <p:childTnLst>
+            <p:seq concurrent="1" nextAc="seek">
+              <p:cTn id="2" dur="indefinite" nodeType="mainSeq">
+                <p:childTnLst>
+                  <p:par>
+                    <p:cTn id="3" fill="hold">
+                      <p:stCondLst>
+                        <p:cond delay="indefinite"/>
+                      </p:stCondLst>
+                      <p:childTnLst>
+                        <p:par>
+                          <p:cTn id="4" fill="hold">
+                            <p:stCondLst>
+                              <p:cond delay="0"/>
+                            </p:stCondLst>
+                            <p:childTnLst>
+                              <p:par>
+                                <p:cTn id="5" presetID="1" presetClass="entr" presetSubtype="0" fill="hold" grpId="0" nodeType="clickEffect">
+                                  <p:stCondLst>
+                                    <p:cond delay="0"/>
+                                  </p:stCondLst>
+                                  <p:childTnLst>
+                                    <p:set>
+                                      <p:cBhvr>
+                                        <p:cTn id="6" dur="1" fill="hold">
+                                          <p:stCondLst>
+                                            <p:cond delay="0"/>
+                                          </p:stCondLst>
+                                        </p:cTn>
+                                        <p:tgtEl>
+                                          <p:spTgt spid="5"/>
+                                        </p:tgtEl>
+                                        <p:attrNameLst>
+                                          <p:attrName>style.visibility</p:attrName>
+                                        </p:attrNameLst>
+                                      </p:cBhvr>
+                                      <p:to>
+                                        <p:strVal val="visible"/>
+                                      </p:to>
+                                    </p:set>
+                                  </p:childTnLst>
+                                </p:cTn>
+                              </p:par>
+                            </p:childTnLst>
+                          </p:cTn>
+                        </p:par>
+                      </p:childTnLst>
+                    </p:cTn>
+                  </p:par>
+                  <p:par>
+                    <p:cTn id="7" fill="hold">
+                      <p:stCondLst>
+                        <p:cond delay="indefinite"/>
+                      </p:stCondLst>
+                      <p:childTnLst>
+                        <p:par>
+                          <p:cTn id="8" fill="hold">
+                            <p:stCondLst>
+                              <p:cond delay="0"/>
+                            </p:stCondLst>
+                            <p:childTnLst>
+                              <p:par>
+                                <p:cTn id="9" presetID="1" presetClass="exit" presetSubtype="0" fill="hold" grpId="1" nodeType="clickEffect">
+                                  <p:stCondLst>
+                                    <p:cond delay="0"/>
+                                  </p:stCondLst>
+                                  <p:childTnLst>
+                                    <p:set>
+                                      <p:cBhvr>
+                                        <p:cTn id="10" dur="1" fill="hold">
+                                          <p:stCondLst>
+                                            <p:cond delay="0"/>
+                                          </p:stCondLst>
+                                        </p:cTn>
+                                        <p:tgtEl>
+                                          <p:spTgt spid="5"/>
+                                        </p:tgtEl>
+                                        <p:attrNameLst>
+                                          <p:attrName>style.visibility</p:attrName>
+                                        </p:attrNameLst>
+                                      </p:cBhvr>
+                                      <p:to>
+                                        <p:strVal val="hidden"/>
+                                      </p:to>
+                                    </p:set>
+                                  </p:childTnLst>
+                                </p:cTn>
+                              </p:par>
+                            </p:childTnLst>
+                          </p:cTn>
+                        </p:par>
+                      </p:childTnLst>
+                    </p:cTn>
+                  </p:par>
+                </p:childTnLst>
+              </p:cTn>
+              <p:prevCondLst>
+                <p:cond evt="onPrev" delay="0">
+                  <p:tgtEl>
+                    <p:sldTgt/>
+                  </p:tgtEl>
+                </p:cond>
+              </p:prevCondLst>
+              <p:nextCondLst>
+                <p:cond evt="onNext" delay="0">
+                  <p:tgtEl>
+                    <p:sldTgt/>
+                  </p:tgtEl>
+                </p:cond>
+              </p:nextCondLst>
+            </p:seq>
+          </p:childTnLst>
+        </p:cTn>
+      </p:par>
+    </p:tnLst>
+    <p:bldLst>
+      <p:bldP spid="5" grpId="0" animBg="1"/>
+      <p:bldP spid="5" grpId="1" animBg="1"/>
+    </p:bldLst>
+  </p:timing>
+</p:sld>
+</file>
+
+<file path=ppt/slides/slide4.xml><?xml version="1.0" encoding="utf-8"?>
+<p:sld xmlns:a="http://schemas.openxmlformats.org/drawingml/2006/main" xmlns:r="http://schemas.openxmlformats.org/officeDocument/2006/relationships" xmlns:p="http://schemas.openxmlformats.org/presentationml/2006/main">
+  <p:cSld>
+    <p:spTree>
+      <p:nvGrpSpPr>
+        <p:cNvPr id="1" name=""/>
+        <p:cNvGrpSpPr/>
+        <p:nvPr/>
+      </p:nvGrpSpPr>
+      <p:grpSpPr>
+        <a:xfrm>
+          <a:off x="0" y="0"/>
+          <a:ext cx="0" cy="0"/>
+          <a:chOff x="0" y="0"/>
+          <a:chExt cx="0" cy="0"/>
+        </a:xfrm>
+      </p:grpSpPr>
+      <p:sp>
+        <p:nvSpPr>
+          <p:cNvPr id="2" name="Title 1"/>
+          <p:cNvSpPr>
+            <a:spLocks noGrp="1"/>
+          </p:cNvSpPr>
+          <p:nvPr>
+            <p:ph type="title"/>
+          </p:nvPr>
+        </p:nvSpPr>
+        <p:spPr/>
+        <p:txBody>
+          <a:bodyPr/>
+          <a:lstStyle/>
+          <a:p>
+            <a:r>
+              <a:rPr lang="en-US" dirty="0" smtClean="0"/>
+              <a:t>Storage Types</a:t>
+            </a:r>
+            <a:endParaRPr lang="en-US" dirty="0"/>
+          </a:p>
+        </p:txBody>
+      </p:sp>
+      <p:sp>
+        <p:nvSpPr>
+          <p:cNvPr id="3" name="Content Placeholder 2"/>
+          <p:cNvSpPr>
+            <a:spLocks noGrp="1"/>
+          </p:cNvSpPr>
+          <p:nvPr>
+            <p:ph sz="quarter" idx="10"/>
+          </p:nvPr>
+        </p:nvSpPr>
+        <p:spPr>
+          <a:xfrm>
+            <a:off x="379414" y="1388226"/>
+            <a:ext cx="4179140" cy="5290388"/>
+          </a:xfrm>
+        </p:spPr>
+        <p:txBody>
+          <a:bodyPr/>
+          <a:lstStyle/>
+          <a:p>
+            <a:r>
+              <a:rPr lang="en-US" dirty="0" smtClean="0"/>
+              <a:t>Security</a:t>
+            </a:r>
+          </a:p>
+          <a:p>
+            <a:r>
+              <a:rPr lang="en-US" b="1" dirty="0" smtClean="0"/>
+              <a:t>Integration</a:t>
+            </a:r>
+          </a:p>
+          <a:p>
+            <a:r>
+              <a:rPr lang="en-US" dirty="0" smtClean="0"/>
+              <a:t>Analytics</a:t>
+            </a:r>
+          </a:p>
+          <a:p>
+            <a:r>
+              <a:rPr lang="en-US" dirty="0" smtClean="0"/>
+              <a:t>Data</a:t>
+            </a:r>
+          </a:p>
+          <a:p>
+            <a:r>
+              <a:rPr lang="en-US" dirty="0" smtClean="0"/>
+              <a:t>Plain Old Storage</a:t>
+            </a:r>
+          </a:p>
+          <a:p>
+            <a:r>
+              <a:rPr lang="en-US" dirty="0" smtClean="0"/>
+              <a:t>Peripheral Concerns</a:t>
+            </a:r>
+            <a:endParaRPr lang="en-US" dirty="0"/>
+          </a:p>
+        </p:txBody>
+      </p:sp>
+      <p:sp>
+        <p:nvSpPr>
+          <p:cNvPr id="4" name="TextBox 3"/>
+          <p:cNvSpPr txBox="1"/>
+          <p:nvPr/>
+        </p:nvSpPr>
+        <p:spPr>
+          <a:xfrm>
+            <a:off x="9906000" y="-1"/>
+            <a:ext cx="2286000" cy="2031325"/>
+          </a:xfrm>
+          <a:prstGeom prst="rect">
+            <a:avLst/>
+          </a:prstGeom>
+          <a:solidFill>
+            <a:srgbClr val="FFFF00"/>
+          </a:solidFill>
+          <a:ln>
+            <a:noFill/>
+          </a:ln>
+        </p:spPr>
+        <p:txBody>
+          <a:bodyPr wrap="square" rtlCol="0">
+            <a:spAutoFit/>
+          </a:bodyPr>
+          <a:lstStyle/>
+          <a:p>
+            <a:pPr algn="ctr"/>
+            <a:endParaRPr lang="en-US" dirty="0" smtClean="0"/>
+          </a:p>
+          <a:p>
+            <a:pPr algn="ctr"/>
+            <a:endParaRPr lang="en-US" dirty="0"/>
+          </a:p>
+          <a:p>
+            <a:pPr algn="ctr"/>
+            <a:r>
+              <a:rPr lang="en-US" dirty="0" smtClean="0"/>
+              <a:t>Please leave this area blank to allow for picture in picture recording</a:t>
+            </a:r>
+          </a:p>
+          <a:p>
+            <a:pPr algn="ctr"/>
+            <a:endParaRPr lang="en-US" dirty="0"/>
+          </a:p>
+        </p:txBody>
+      </p:sp>
+      <p:sp>
+        <p:nvSpPr>
+          <p:cNvPr id="6" name="Content Placeholder 2"/>
+          <p:cNvSpPr txBox="1">
+            <a:spLocks/>
+          </p:cNvSpPr>
+          <p:nvPr/>
+        </p:nvSpPr>
+        <p:spPr>
+          <a:xfrm>
+            <a:off x="5486400" y="2061318"/>
+            <a:ext cx="3862605" cy="1462550"/>
+          </a:xfrm>
+          <a:prstGeom prst="rect">
+            <a:avLst/>
+          </a:prstGeom>
+          <a:solidFill>
+            <a:schemeClr val="accent3">
+              <a:lumMod val="20000"/>
+              <a:lumOff val="80000"/>
+            </a:schemeClr>
+          </a:solidFill>
+        </p:spPr>
+        <p:txBody>
+          <a:bodyPr/>
+          <a:lstStyle>
+            <a:lvl1pPr marL="342783" indent="-342783" algn="l" defTabSz="914088" rtl="0" eaLnBrk="1" latinLnBrk="0" hangingPunct="1">
+              <a:spcBef>
+                <a:spcPts val="1400"/>
+              </a:spcBef>
+              <a:buFont typeface="Arial" pitchFamily="34" charset="0"/>
+              <a:buChar char="•"/>
+              <a:defRPr sz="3200" b="0" kern="0" baseline="0">
+                <a:solidFill>
+                  <a:schemeClr val="tx1"/>
+                </a:solidFill>
+                <a:latin typeface="Segoe UI Light" panose="020B0502040204020203" pitchFamily="34" charset="0"/>
+                <a:ea typeface="Segoe UI Light" panose="020B0502040204020203" pitchFamily="34" charset="0"/>
+                <a:cs typeface="Segoe UI Light" panose="020B0502040204020203" pitchFamily="34" charset="0"/>
+              </a:defRPr>
+            </a:lvl1pPr>
+            <a:lvl2pPr marL="742698" indent="-285652" algn="l" defTabSz="914088" rtl="0" eaLnBrk="1" latinLnBrk="0" hangingPunct="1">
+              <a:spcBef>
+                <a:spcPts val="300"/>
+              </a:spcBef>
+              <a:spcAft>
+                <a:spcPts val="300"/>
+              </a:spcAft>
+              <a:buFont typeface="Arial" pitchFamily="34" charset="0"/>
+              <a:buChar char="–"/>
+              <a:defRPr sz="2800" kern="0" baseline="0">
+                <a:solidFill>
+                  <a:schemeClr val="tx1"/>
+                </a:solidFill>
+                <a:latin typeface="Segoe UI Light" panose="020B0502040204020203" pitchFamily="34" charset="0"/>
+                <a:ea typeface="Segoe UI Light" panose="020B0502040204020203" pitchFamily="34" charset="0"/>
+                <a:cs typeface="Segoe UI Light" panose="020B0502040204020203" pitchFamily="34" charset="0"/>
+              </a:defRPr>
+            </a:lvl2pPr>
+            <a:lvl3pPr marL="1142612" indent="-228522" algn="l" defTabSz="914088" rtl="0" eaLnBrk="1" latinLnBrk="0" hangingPunct="1">
+              <a:spcBef>
+                <a:spcPts val="200"/>
+              </a:spcBef>
+              <a:spcAft>
+                <a:spcPts val="200"/>
+              </a:spcAft>
+              <a:buFont typeface="Arial" pitchFamily="34" charset="0"/>
+              <a:buChar char="•"/>
+              <a:defRPr sz="2400" kern="0" baseline="0">
+                <a:solidFill>
+                  <a:schemeClr val="tx1"/>
+                </a:solidFill>
+                <a:latin typeface="Segoe UI Light" panose="020B0502040204020203" pitchFamily="34" charset="0"/>
+                <a:ea typeface="Segoe UI Light" panose="020B0502040204020203" pitchFamily="34" charset="0"/>
+                <a:cs typeface="Segoe UI Light" panose="020B0502040204020203" pitchFamily="34" charset="0"/>
+              </a:defRPr>
+            </a:lvl3pPr>
+            <a:lvl4pPr marL="1599657" indent="-228522" algn="l" defTabSz="914088" rtl="0" eaLnBrk="1" latinLnBrk="0" hangingPunct="1">
+              <a:spcBef>
+                <a:spcPct val="20000"/>
+              </a:spcBef>
+              <a:buFont typeface="Arial" pitchFamily="34" charset="0"/>
+              <a:buChar char="–"/>
+              <a:defRPr sz="2000" kern="0" baseline="0">
+                <a:solidFill>
+                  <a:schemeClr val="tx1"/>
+                </a:solidFill>
+                <a:latin typeface="Segoe UI Light" panose="020B0502040204020203" pitchFamily="34" charset="0"/>
+                <a:ea typeface="Segoe UI Light" panose="020B0502040204020203" pitchFamily="34" charset="0"/>
+                <a:cs typeface="Segoe UI Light" panose="020B0502040204020203" pitchFamily="34" charset="0"/>
+              </a:defRPr>
+            </a:lvl4pPr>
+            <a:lvl5pPr marL="2056700" indent="-228522" algn="l" defTabSz="914088" rtl="0" eaLnBrk="1" latinLnBrk="0" hangingPunct="1">
+              <a:spcBef>
+                <a:spcPct val="20000"/>
+              </a:spcBef>
+              <a:buFont typeface="Arial" pitchFamily="34" charset="0"/>
+              <a:buChar char="»"/>
+              <a:defRPr sz="2000" kern="0" baseline="0">
+                <a:solidFill>
+                  <a:schemeClr val="tx1"/>
+                </a:solidFill>
+                <a:latin typeface="Segoe UI Light" panose="020B0502040204020203" pitchFamily="34" charset="0"/>
+                <a:ea typeface="Segoe UI Light" panose="020B0502040204020203" pitchFamily="34" charset="0"/>
+                <a:cs typeface="Segoe UI Light" panose="020B0502040204020203" pitchFamily="34" charset="0"/>
+              </a:defRPr>
+            </a:lvl5pPr>
+            <a:lvl6pPr marL="2513745" indent="-228522" algn="l" defTabSz="914088" rtl="0" eaLnBrk="1" latinLnBrk="0" hangingPunct="1">
+              <a:spcBef>
+                <a:spcPct val="20000"/>
+              </a:spcBef>
+              <a:buFont typeface="Arial" pitchFamily="34" charset="0"/>
+              <a:buChar char="•"/>
+              <a:defRPr sz="2000" kern="1200">
+                <a:solidFill>
+                  <a:schemeClr val="tx1"/>
+                </a:solidFill>
+                <a:latin typeface="+mn-lt"/>
+                <a:ea typeface="+mn-ea"/>
+                <a:cs typeface="+mn-cs"/>
+              </a:defRPr>
+            </a:lvl6pPr>
+            <a:lvl7pPr marL="2970789" indent="-228522" algn="l" defTabSz="914088" rtl="0" eaLnBrk="1" latinLnBrk="0" hangingPunct="1">
+              <a:spcBef>
+                <a:spcPct val="20000"/>
+              </a:spcBef>
+              <a:buFont typeface="Arial" pitchFamily="34" charset="0"/>
+              <a:buChar char="•"/>
+              <a:defRPr sz="2000" kern="1200">
+                <a:solidFill>
+                  <a:schemeClr val="tx1"/>
+                </a:solidFill>
+                <a:latin typeface="+mn-lt"/>
+                <a:ea typeface="+mn-ea"/>
+                <a:cs typeface="+mn-cs"/>
+              </a:defRPr>
+            </a:lvl7pPr>
+            <a:lvl8pPr marL="3427833" indent="-228522" algn="l" defTabSz="914088" rtl="0" eaLnBrk="1" latinLnBrk="0" hangingPunct="1">
+              <a:spcBef>
+                <a:spcPct val="20000"/>
+              </a:spcBef>
+              <a:buFont typeface="Arial" pitchFamily="34" charset="0"/>
+              <a:buChar char="•"/>
+              <a:defRPr sz="2000" kern="1200">
+                <a:solidFill>
+                  <a:schemeClr val="tx1"/>
+                </a:solidFill>
+                <a:latin typeface="+mn-lt"/>
+                <a:ea typeface="+mn-ea"/>
+                <a:cs typeface="+mn-cs"/>
+              </a:defRPr>
+            </a:lvl8pPr>
+            <a:lvl9pPr marL="3884878" indent="-228522" algn="l" defTabSz="914088" rtl="0" eaLnBrk="1" latinLnBrk="0" hangingPunct="1">
+              <a:spcBef>
+                <a:spcPct val="20000"/>
+              </a:spcBef>
+              <a:buFont typeface="Arial" pitchFamily="34" charset="0"/>
+              <a:buChar char="•"/>
+              <a:defRPr sz="2000" kern="1200">
+                <a:solidFill>
+                  <a:schemeClr val="tx1"/>
+                </a:solidFill>
+                <a:latin typeface="+mn-lt"/>
+                <a:ea typeface="+mn-ea"/>
+                <a:cs typeface="+mn-cs"/>
+              </a:defRPr>
+            </a:lvl9pPr>
+          </a:lstStyle>
+          <a:p>
+            <a:pPr marL="0" indent="0" algn="r">
+              <a:buNone/>
+            </a:pPr>
+            <a:r>
+              <a:rPr lang="en-US" sz="2800" dirty="0" smtClean="0"/>
+              <a:t>Queues</a:t>
+            </a:r>
+          </a:p>
+          <a:p>
+            <a:pPr marL="0" indent="0" algn="r">
+              <a:buNone/>
+            </a:pPr>
+            <a:r>
+              <a:rPr lang="en-US" sz="2800" dirty="0" smtClean="0"/>
+              <a:t>Service Bus</a:t>
+            </a:r>
+            <a:endParaRPr lang="en-US" sz="2800" dirty="0"/>
+          </a:p>
+        </p:txBody>
+      </p:sp>
+    </p:spTree>
+    <p:extLst>
+      <p:ext uri="{BB962C8B-B14F-4D97-AF65-F5344CB8AC3E}">
+        <p14:creationId xmlns:p14="http://schemas.microsoft.com/office/powerpoint/2010/main" val="1240436347"/>
+      </p:ext>
+    </p:extLst>
+  </p:cSld>
+  <p:clrMapOvr>
+    <a:masterClrMapping/>
+  </p:clrMapOvr>
+  <p:timing>
+    <p:tnLst>
+      <p:par>
+        <p:cTn id="1" dur="indefinite" restart="never" nodeType="tmRoot">
+          <p:childTnLst>
+            <p:seq concurrent="1" nextAc="seek">
+              <p:cTn id="2" dur="indefinite" nodeType="mainSeq">
+                <p:childTnLst>
+                  <p:par>
+                    <p:cTn id="3" fill="hold">
+                      <p:stCondLst>
+                        <p:cond delay="indefinite"/>
+                      </p:stCondLst>
+                      <p:childTnLst>
+                        <p:par>
+                          <p:cTn id="4" fill="hold">
+                            <p:stCondLst>
+                              <p:cond delay="0"/>
+                            </p:stCondLst>
+                            <p:childTnLst>
+                              <p:par>
+                                <p:cTn id="5" presetID="1" presetClass="entr" presetSubtype="0" fill="hold" grpId="0" nodeType="clickEffect">
+                                  <p:stCondLst>
+                                    <p:cond delay="0"/>
+                                  </p:stCondLst>
+                                  <p:childTnLst>
+                                    <p:set>
+                                      <p:cBhvr>
+                                        <p:cTn id="6" dur="1" fill="hold">
+                                          <p:stCondLst>
+                                            <p:cond delay="0"/>
+                                          </p:stCondLst>
+                                        </p:cTn>
+                                        <p:tgtEl>
+                                          <p:spTgt spid="6"/>
+                                        </p:tgtEl>
+                                        <p:attrNameLst>
+                                          <p:attrName>style.visibility</p:attrName>
+                                        </p:attrNameLst>
+                                      </p:cBhvr>
+                                      <p:to>
+                                        <p:strVal val="visible"/>
+                                      </p:to>
+                                    </p:set>
+                                  </p:childTnLst>
+                                </p:cTn>
+                              </p:par>
+                            </p:childTnLst>
+                          </p:cTn>
+                        </p:par>
+                      </p:childTnLst>
+                    </p:cTn>
+                  </p:par>
+                  <p:par>
+                    <p:cTn id="7" fill="hold">
+                      <p:stCondLst>
+                        <p:cond delay="indefinite"/>
+                      </p:stCondLst>
+                      <p:childTnLst>
+                        <p:par>
+                          <p:cTn id="8" fill="hold">
+                            <p:stCondLst>
+                              <p:cond delay="0"/>
+                            </p:stCondLst>
+                            <p:childTnLst>
+                              <p:par>
+                                <p:cTn id="9" presetID="1" presetClass="exit" presetSubtype="0" fill="hold" grpId="1" nodeType="clickEffect">
+                                  <p:stCondLst>
+                                    <p:cond delay="0"/>
+                                  </p:stCondLst>
+                                  <p:childTnLst>
+                                    <p:set>
+                                      <p:cBhvr>
+                                        <p:cTn id="10" dur="1" fill="hold">
+                                          <p:stCondLst>
+                                            <p:cond delay="0"/>
+                                          </p:stCondLst>
+                                        </p:cTn>
+                                        <p:tgtEl>
+                                          <p:spTgt spid="6"/>
+                                        </p:tgtEl>
+                                        <p:attrNameLst>
+                                          <p:attrName>style.visibility</p:attrName>
+                                        </p:attrNameLst>
+                                      </p:cBhvr>
+                                      <p:to>
+                                        <p:strVal val="hidden"/>
+                                      </p:to>
+                                    </p:set>
+                                  </p:childTnLst>
+                                </p:cTn>
+                              </p:par>
+                            </p:childTnLst>
+                          </p:cTn>
+                        </p:par>
+                      </p:childTnLst>
+                    </p:cTn>
+                  </p:par>
+                </p:childTnLst>
+              </p:cTn>
+              <p:prevCondLst>
+                <p:cond evt="onPrev" delay="0">
+                  <p:tgtEl>
+                    <p:sldTgt/>
+                  </p:tgtEl>
+                </p:cond>
+              </p:prevCondLst>
+              <p:nextCondLst>
+                <p:cond evt="onNext" delay="0">
+                  <p:tgtEl>
+                    <p:sldTgt/>
+                  </p:tgtEl>
+                </p:cond>
+              </p:nextCondLst>
+            </p:seq>
+          </p:childTnLst>
+        </p:cTn>
+      </p:par>
+    </p:tnLst>
+    <p:bldLst>
+      <p:bldP spid="6" grpId="0" animBg="1"/>
+      <p:bldP spid="6" grpId="1" animBg="1"/>
+    </p:bldLst>
+  </p:timing>
+</p:sld>
+</file>
+
+<file path=ppt/slides/slide5.xml><?xml version="1.0" encoding="utf-8"?>
+<p:sld xmlns:a="http://schemas.openxmlformats.org/drawingml/2006/main" xmlns:r="http://schemas.openxmlformats.org/officeDocument/2006/relationships" xmlns:p="http://schemas.openxmlformats.org/presentationml/2006/main">
+  <p:cSld>
+    <p:spTree>
+      <p:nvGrpSpPr>
+        <p:cNvPr id="1" name=""/>
+        <p:cNvGrpSpPr/>
+        <p:nvPr/>
+      </p:nvGrpSpPr>
+      <p:grpSpPr>
+        <a:xfrm>
+          <a:off x="0" y="0"/>
+          <a:ext cx="0" cy="0"/>
+          <a:chOff x="0" y="0"/>
+          <a:chExt cx="0" cy="0"/>
+        </a:xfrm>
+      </p:grpSpPr>
+      <p:sp>
+        <p:nvSpPr>
+          <p:cNvPr id="2" name="Title 1"/>
+          <p:cNvSpPr>
+            <a:spLocks noGrp="1"/>
+          </p:cNvSpPr>
+          <p:nvPr>
+            <p:ph type="title"/>
+          </p:nvPr>
+        </p:nvSpPr>
+        <p:spPr/>
+        <p:txBody>
+          <a:bodyPr/>
+          <a:lstStyle/>
+          <a:p>
+            <a:r>
+              <a:rPr lang="en-US" dirty="0" smtClean="0"/>
+              <a:t>Storage Types</a:t>
+            </a:r>
+            <a:endParaRPr lang="en-US" dirty="0"/>
+          </a:p>
+        </p:txBody>
+      </p:sp>
+      <p:sp>
+        <p:nvSpPr>
+          <p:cNvPr id="3" name="Content Placeholder 2"/>
+          <p:cNvSpPr>
+            <a:spLocks noGrp="1"/>
+          </p:cNvSpPr>
+          <p:nvPr>
+            <p:ph sz="quarter" idx="10"/>
+          </p:nvPr>
+        </p:nvSpPr>
+        <p:spPr>
+          <a:xfrm>
+            <a:off x="379414" y="1388226"/>
+            <a:ext cx="4179140" cy="5290388"/>
+          </a:xfrm>
+        </p:spPr>
+        <p:txBody>
+          <a:bodyPr/>
+          <a:lstStyle/>
+          <a:p>
+            <a:r>
+              <a:rPr lang="en-US" dirty="0" smtClean="0"/>
+              <a:t>Security</a:t>
+            </a:r>
+          </a:p>
+          <a:p>
+            <a:r>
+              <a:rPr lang="en-US" dirty="0" smtClean="0"/>
+              <a:t>Integration</a:t>
+            </a:r>
+          </a:p>
+          <a:p>
+            <a:r>
+              <a:rPr lang="en-US" b="1" dirty="0" smtClean="0"/>
+              <a:t>Analytics</a:t>
+            </a:r>
+          </a:p>
+          <a:p>
+            <a:r>
+              <a:rPr lang="en-US" dirty="0" smtClean="0"/>
+              <a:t>Data</a:t>
+            </a:r>
+          </a:p>
+          <a:p>
+            <a:r>
+              <a:rPr lang="en-US" dirty="0" smtClean="0"/>
+              <a:t>Plain Old Storage</a:t>
+            </a:r>
+          </a:p>
+          <a:p>
+            <a:r>
+              <a:rPr lang="en-US" dirty="0" smtClean="0"/>
+              <a:t>Peripheral Concerns</a:t>
+            </a:r>
+            <a:endParaRPr lang="en-US" dirty="0"/>
+          </a:p>
+        </p:txBody>
+      </p:sp>
+      <p:sp>
+        <p:nvSpPr>
+          <p:cNvPr id="4" name="TextBox 3"/>
+          <p:cNvSpPr txBox="1"/>
+          <p:nvPr/>
+        </p:nvSpPr>
+        <p:spPr>
+          <a:xfrm>
+            <a:off x="9906000" y="-1"/>
+            <a:ext cx="2286000" cy="2031325"/>
+          </a:xfrm>
+          <a:prstGeom prst="rect">
+            <a:avLst/>
+          </a:prstGeom>
+          <a:solidFill>
+            <a:srgbClr val="FFFF00"/>
+          </a:solidFill>
+          <a:ln>
+            <a:noFill/>
+          </a:ln>
+        </p:spPr>
+        <p:txBody>
+          <a:bodyPr wrap="square" rtlCol="0">
+            <a:spAutoFit/>
+          </a:bodyPr>
+          <a:lstStyle/>
+          <a:p>
+            <a:pPr algn="ctr"/>
+            <a:endParaRPr lang="en-US" dirty="0" smtClean="0"/>
+          </a:p>
+          <a:p>
+            <a:pPr algn="ctr"/>
+            <a:endParaRPr lang="en-US" dirty="0"/>
+          </a:p>
+          <a:p>
+            <a:pPr algn="ctr"/>
+            <a:r>
+              <a:rPr lang="en-US" dirty="0" smtClean="0"/>
+              <a:t>Please leave this area blank to allow for picture in picture recording</a:t>
+            </a:r>
+          </a:p>
+          <a:p>
+            <a:pPr algn="ctr"/>
+            <a:endParaRPr lang="en-US" dirty="0"/>
+          </a:p>
+        </p:txBody>
+      </p:sp>
+      <p:sp>
+        <p:nvSpPr>
+          <p:cNvPr id="7" name="Content Placeholder 2"/>
+          <p:cNvSpPr txBox="1">
+            <a:spLocks/>
+          </p:cNvSpPr>
+          <p:nvPr/>
+        </p:nvSpPr>
+        <p:spPr>
+          <a:xfrm>
+            <a:off x="5486400" y="2734076"/>
+            <a:ext cx="3862605" cy="1462550"/>
+          </a:xfrm>
+          <a:prstGeom prst="rect">
+            <a:avLst/>
+          </a:prstGeom>
+          <a:solidFill>
+            <a:schemeClr val="accent3">
+              <a:lumMod val="20000"/>
+              <a:lumOff val="80000"/>
+            </a:schemeClr>
+          </a:solidFill>
+        </p:spPr>
+        <p:txBody>
+          <a:bodyPr/>
+          <a:lstStyle>
+            <a:lvl1pPr marL="342783" indent="-342783" algn="l" defTabSz="914088" rtl="0" eaLnBrk="1" latinLnBrk="0" hangingPunct="1">
+              <a:spcBef>
+                <a:spcPts val="1400"/>
+              </a:spcBef>
+              <a:buFont typeface="Arial" pitchFamily="34" charset="0"/>
+              <a:buChar char="•"/>
+              <a:defRPr sz="3200" b="0" kern="0" baseline="0">
+                <a:solidFill>
+                  <a:schemeClr val="tx1"/>
+                </a:solidFill>
+                <a:latin typeface="Segoe UI Light" panose="020B0502040204020203" pitchFamily="34" charset="0"/>
+                <a:ea typeface="Segoe UI Light" panose="020B0502040204020203" pitchFamily="34" charset="0"/>
+                <a:cs typeface="Segoe UI Light" panose="020B0502040204020203" pitchFamily="34" charset="0"/>
+              </a:defRPr>
+            </a:lvl1pPr>
+            <a:lvl2pPr marL="742698" indent="-285652" algn="l" defTabSz="914088" rtl="0" eaLnBrk="1" latinLnBrk="0" hangingPunct="1">
+              <a:spcBef>
+                <a:spcPts val="300"/>
+              </a:spcBef>
+              <a:spcAft>
+                <a:spcPts val="300"/>
+              </a:spcAft>
+              <a:buFont typeface="Arial" pitchFamily="34" charset="0"/>
+              <a:buChar char="–"/>
+              <a:defRPr sz="2800" kern="0" baseline="0">
+                <a:solidFill>
+                  <a:schemeClr val="tx1"/>
+                </a:solidFill>
+                <a:latin typeface="Segoe UI Light" panose="020B0502040204020203" pitchFamily="34" charset="0"/>
+                <a:ea typeface="Segoe UI Light" panose="020B0502040204020203" pitchFamily="34" charset="0"/>
+                <a:cs typeface="Segoe UI Light" panose="020B0502040204020203" pitchFamily="34" charset="0"/>
+              </a:defRPr>
+            </a:lvl2pPr>
+            <a:lvl3pPr marL="1142612" indent="-228522" algn="l" defTabSz="914088" rtl="0" eaLnBrk="1" latinLnBrk="0" hangingPunct="1">
+              <a:spcBef>
+                <a:spcPts val="200"/>
+              </a:spcBef>
+              <a:spcAft>
+                <a:spcPts val="200"/>
+              </a:spcAft>
+              <a:buFont typeface="Arial" pitchFamily="34" charset="0"/>
+              <a:buChar char="•"/>
+              <a:defRPr sz="2400" kern="0" baseline="0">
+                <a:solidFill>
+                  <a:schemeClr val="tx1"/>
+                </a:solidFill>
+                <a:latin typeface="Segoe UI Light" panose="020B0502040204020203" pitchFamily="34" charset="0"/>
+                <a:ea typeface="Segoe UI Light" panose="020B0502040204020203" pitchFamily="34" charset="0"/>
+                <a:cs typeface="Segoe UI Light" panose="020B0502040204020203" pitchFamily="34" charset="0"/>
+              </a:defRPr>
+            </a:lvl3pPr>
+            <a:lvl4pPr marL="1599657" indent="-228522" algn="l" defTabSz="914088" rtl="0" eaLnBrk="1" latinLnBrk="0" hangingPunct="1">
+              <a:spcBef>
+                <a:spcPct val="20000"/>
+              </a:spcBef>
+              <a:buFont typeface="Arial" pitchFamily="34" charset="0"/>
+              <a:buChar char="–"/>
+              <a:defRPr sz="2000" kern="0" baseline="0">
+                <a:solidFill>
+                  <a:schemeClr val="tx1"/>
+                </a:solidFill>
+                <a:latin typeface="Segoe UI Light" panose="020B0502040204020203" pitchFamily="34" charset="0"/>
+                <a:ea typeface="Segoe UI Light" panose="020B0502040204020203" pitchFamily="34" charset="0"/>
+                <a:cs typeface="Segoe UI Light" panose="020B0502040204020203" pitchFamily="34" charset="0"/>
+              </a:defRPr>
+            </a:lvl4pPr>
+            <a:lvl5pPr marL="2056700" indent="-228522" algn="l" defTabSz="914088" rtl="0" eaLnBrk="1" latinLnBrk="0" hangingPunct="1">
+              <a:spcBef>
+                <a:spcPct val="20000"/>
+              </a:spcBef>
+              <a:buFont typeface="Arial" pitchFamily="34" charset="0"/>
+              <a:buChar char="»"/>
+              <a:defRPr sz="2000" kern="0" baseline="0">
+                <a:solidFill>
+                  <a:schemeClr val="tx1"/>
+                </a:solidFill>
+                <a:latin typeface="Segoe UI Light" panose="020B0502040204020203" pitchFamily="34" charset="0"/>
+                <a:ea typeface="Segoe UI Light" panose="020B0502040204020203" pitchFamily="34" charset="0"/>
+                <a:cs typeface="Segoe UI Light" panose="020B0502040204020203" pitchFamily="34" charset="0"/>
+              </a:defRPr>
+            </a:lvl5pPr>
+            <a:lvl6pPr marL="2513745" indent="-228522" algn="l" defTabSz="914088" rtl="0" eaLnBrk="1" latinLnBrk="0" hangingPunct="1">
+              <a:spcBef>
+                <a:spcPct val="20000"/>
+              </a:spcBef>
+              <a:buFont typeface="Arial" pitchFamily="34" charset="0"/>
+              <a:buChar char="•"/>
+              <a:defRPr sz="2000" kern="1200">
+                <a:solidFill>
+                  <a:schemeClr val="tx1"/>
+                </a:solidFill>
+                <a:latin typeface="+mn-lt"/>
+                <a:ea typeface="+mn-ea"/>
+                <a:cs typeface="+mn-cs"/>
+              </a:defRPr>
+            </a:lvl6pPr>
+            <a:lvl7pPr marL="2970789" indent="-228522" algn="l" defTabSz="914088" rtl="0" eaLnBrk="1" latinLnBrk="0" hangingPunct="1">
+              <a:spcBef>
+                <a:spcPct val="20000"/>
+              </a:spcBef>
+              <a:buFont typeface="Arial" pitchFamily="34" charset="0"/>
+              <a:buChar char="•"/>
+              <a:defRPr sz="2000" kern="1200">
+                <a:solidFill>
+                  <a:schemeClr val="tx1"/>
+                </a:solidFill>
+                <a:latin typeface="+mn-lt"/>
+                <a:ea typeface="+mn-ea"/>
+                <a:cs typeface="+mn-cs"/>
+              </a:defRPr>
+            </a:lvl7pPr>
+            <a:lvl8pPr marL="3427833" indent="-228522" algn="l" defTabSz="914088" rtl="0" eaLnBrk="1" latinLnBrk="0" hangingPunct="1">
+              <a:spcBef>
+                <a:spcPct val="20000"/>
+              </a:spcBef>
+              <a:buFont typeface="Arial" pitchFamily="34" charset="0"/>
+              <a:buChar char="•"/>
+              <a:defRPr sz="2000" kern="1200">
+                <a:solidFill>
+                  <a:schemeClr val="tx1"/>
+                </a:solidFill>
+                <a:latin typeface="+mn-lt"/>
+                <a:ea typeface="+mn-ea"/>
+                <a:cs typeface="+mn-cs"/>
+              </a:defRPr>
+            </a:lvl8pPr>
+            <a:lvl9pPr marL="3884878" indent="-228522" algn="l" defTabSz="914088" rtl="0" eaLnBrk="1" latinLnBrk="0" hangingPunct="1">
+              <a:spcBef>
+                <a:spcPct val="20000"/>
+              </a:spcBef>
+              <a:buFont typeface="Arial" pitchFamily="34" charset="0"/>
+              <a:buChar char="•"/>
+              <a:defRPr sz="2000" kern="1200">
+                <a:solidFill>
+                  <a:schemeClr val="tx1"/>
+                </a:solidFill>
+                <a:latin typeface="+mn-lt"/>
+                <a:ea typeface="+mn-ea"/>
+                <a:cs typeface="+mn-cs"/>
+              </a:defRPr>
+            </a:lvl9pPr>
+          </a:lstStyle>
+          <a:p>
+            <a:pPr marL="0" indent="0" algn="r">
+              <a:buNone/>
+            </a:pPr>
+            <a:r>
+              <a:rPr lang="en-US" sz="2800" dirty="0" smtClean="0"/>
+              <a:t>Event Hubs</a:t>
+            </a:r>
+          </a:p>
+          <a:p>
+            <a:pPr marL="0" indent="0" algn="r">
+              <a:buNone/>
+            </a:pPr>
+            <a:r>
+              <a:rPr lang="en-US" sz="2800" dirty="0" smtClean="0"/>
+              <a:t>Logging</a:t>
+            </a:r>
+          </a:p>
+          <a:p>
+            <a:pPr marL="0" indent="0" algn="r">
+              <a:buNone/>
+            </a:pPr>
+            <a:endParaRPr lang="en-US" sz="2800" dirty="0"/>
+          </a:p>
+        </p:txBody>
+      </p:sp>
+    </p:spTree>
+    <p:extLst>
+      <p:ext uri="{BB962C8B-B14F-4D97-AF65-F5344CB8AC3E}">
+        <p14:creationId xmlns:p14="http://schemas.microsoft.com/office/powerpoint/2010/main" val="560814117"/>
+      </p:ext>
+    </p:extLst>
+  </p:cSld>
+  <p:clrMapOvr>
+    <a:masterClrMapping/>
+  </p:clrMapOvr>
+  <p:timing>
+    <p:tnLst>
+      <p:par>
+        <p:cTn id="1" dur="indefinite" restart="never" nodeType="tmRoot">
+          <p:childTnLst>
+            <p:seq concurrent="1" nextAc="seek">
+              <p:cTn id="2" dur="indefinite" nodeType="mainSeq">
+                <p:childTnLst>
+                  <p:par>
+                    <p:cTn id="3" fill="hold">
+                      <p:stCondLst>
+                        <p:cond delay="indefinite"/>
+                      </p:stCondLst>
+                      <p:childTnLst>
+                        <p:par>
+                          <p:cTn id="4" fill="hold">
+                            <p:stCondLst>
+                              <p:cond delay="0"/>
+                            </p:stCondLst>
+                            <p:childTnLst>
+                              <p:par>
+                                <p:cTn id="5" presetID="1" presetClass="entr" presetSubtype="0" fill="hold" grpId="0" nodeType="clickEffect">
+                                  <p:stCondLst>
+                                    <p:cond delay="0"/>
+                                  </p:stCondLst>
+                                  <p:childTnLst>
+                                    <p:set>
+                                      <p:cBhvr>
+                                        <p:cTn id="6" dur="1" fill="hold">
+                                          <p:stCondLst>
+                                            <p:cond delay="0"/>
+                                          </p:stCondLst>
+                                        </p:cTn>
+                                        <p:tgtEl>
+                                          <p:spTgt spid="7"/>
+                                        </p:tgtEl>
+                                        <p:attrNameLst>
+                                          <p:attrName>style.visibility</p:attrName>
+                                        </p:attrNameLst>
+                                      </p:cBhvr>
+                                      <p:to>
+                                        <p:strVal val="visible"/>
+                                      </p:to>
+                                    </p:set>
+                                  </p:childTnLst>
+                                </p:cTn>
+                              </p:par>
+                            </p:childTnLst>
+                          </p:cTn>
+                        </p:par>
+                      </p:childTnLst>
+                    </p:cTn>
+                  </p:par>
+                  <p:par>
+                    <p:cTn id="7" fill="hold">
+                      <p:stCondLst>
+                        <p:cond delay="indefinite"/>
+                      </p:stCondLst>
+                      <p:childTnLst>
+                        <p:par>
+                          <p:cTn id="8" fill="hold">
+                            <p:stCondLst>
+                              <p:cond delay="0"/>
+                            </p:stCondLst>
+                            <p:childTnLst>
+                              <p:par>
+                                <p:cTn id="9" presetID="1" presetClass="exit" presetSubtype="0" fill="hold" grpId="1" nodeType="clickEffect">
+                                  <p:stCondLst>
+                                    <p:cond delay="0"/>
+                                  </p:stCondLst>
+                                  <p:childTnLst>
+                                    <p:set>
+                                      <p:cBhvr>
+                                        <p:cTn id="10" dur="1" fill="hold">
+                                          <p:stCondLst>
+                                            <p:cond delay="0"/>
+                                          </p:stCondLst>
+                                        </p:cTn>
+                                        <p:tgtEl>
+                                          <p:spTgt spid="7"/>
+                                        </p:tgtEl>
+                                        <p:attrNameLst>
+                                          <p:attrName>style.visibility</p:attrName>
+                                        </p:attrNameLst>
+                                      </p:cBhvr>
+                                      <p:to>
+                                        <p:strVal val="hidden"/>
+                                      </p:to>
+                                    </p:set>
+                                  </p:childTnLst>
+                                </p:cTn>
+                              </p:par>
+                            </p:childTnLst>
+                          </p:cTn>
+                        </p:par>
+                      </p:childTnLst>
+                    </p:cTn>
+                  </p:par>
+                </p:childTnLst>
+              </p:cTn>
+              <p:prevCondLst>
+                <p:cond evt="onPrev" delay="0">
+                  <p:tgtEl>
+                    <p:sldTgt/>
+                  </p:tgtEl>
+                </p:cond>
+              </p:prevCondLst>
+              <p:nextCondLst>
+                <p:cond evt="onNext" delay="0">
+                  <p:tgtEl>
+                    <p:sldTgt/>
+                  </p:tgtEl>
+                </p:cond>
+              </p:nextCondLst>
+            </p:seq>
+          </p:childTnLst>
+        </p:cTn>
+      </p:par>
+    </p:tnLst>
+    <p:bldLst>
+      <p:bldP spid="7" grpId="0" animBg="1"/>
+      <p:bldP spid="7" grpId="1" animBg="1"/>
+    </p:bldLst>
+  </p:timing>
+</p:sld>
+</file>
+
+<file path=ppt/slides/slide6.xml><?xml version="1.0" encoding="utf-8"?>
+<p:sld xmlns:a="http://schemas.openxmlformats.org/drawingml/2006/main" xmlns:r="http://schemas.openxmlformats.org/officeDocument/2006/relationships" xmlns:p="http://schemas.openxmlformats.org/presentationml/2006/main">
+  <p:cSld>
+    <p:spTree>
+      <p:nvGrpSpPr>
+        <p:cNvPr id="1" name=""/>
+        <p:cNvGrpSpPr/>
+        <p:nvPr/>
+      </p:nvGrpSpPr>
+      <p:grpSpPr>
+        <a:xfrm>
+          <a:off x="0" y="0"/>
+          <a:ext cx="0" cy="0"/>
+          <a:chOff x="0" y="0"/>
+          <a:chExt cx="0" cy="0"/>
+        </a:xfrm>
+      </p:grpSpPr>
+      <p:sp>
+        <p:nvSpPr>
+          <p:cNvPr id="2" name="Title 1"/>
+          <p:cNvSpPr>
+            <a:spLocks noGrp="1"/>
+          </p:cNvSpPr>
+          <p:nvPr>
+            <p:ph type="title"/>
+          </p:nvPr>
+        </p:nvSpPr>
+        <p:spPr/>
+        <p:txBody>
+          <a:bodyPr/>
+          <a:lstStyle/>
+          <a:p>
+            <a:r>
+              <a:rPr lang="en-US" dirty="0" smtClean="0"/>
+              <a:t>Storage Types</a:t>
+            </a:r>
+            <a:endParaRPr lang="en-US" dirty="0"/>
+          </a:p>
+        </p:txBody>
+      </p:sp>
+      <p:sp>
+        <p:nvSpPr>
+          <p:cNvPr id="3" name="Content Placeholder 2"/>
+          <p:cNvSpPr>
+            <a:spLocks noGrp="1"/>
+          </p:cNvSpPr>
+          <p:nvPr>
+            <p:ph sz="quarter" idx="10"/>
+          </p:nvPr>
+        </p:nvSpPr>
+        <p:spPr>
+          <a:xfrm>
+            <a:off x="379414" y="1388226"/>
+            <a:ext cx="4179140" cy="5290388"/>
+          </a:xfrm>
+        </p:spPr>
+        <p:txBody>
+          <a:bodyPr/>
+          <a:lstStyle/>
+          <a:p>
+            <a:r>
+              <a:rPr lang="en-US" dirty="0" smtClean="0"/>
+              <a:t>Security</a:t>
+            </a:r>
+          </a:p>
+          <a:p>
+            <a:r>
+              <a:rPr lang="en-US" dirty="0" smtClean="0"/>
+              <a:t>Integration</a:t>
+            </a:r>
+          </a:p>
+          <a:p>
+            <a:r>
+              <a:rPr lang="en-US" dirty="0" smtClean="0"/>
+              <a:t>Analytics</a:t>
+            </a:r>
+          </a:p>
+          <a:p>
+            <a:r>
+              <a:rPr lang="en-US" b="1" dirty="0" smtClean="0"/>
+              <a:t>Data</a:t>
+            </a:r>
+          </a:p>
+          <a:p>
+            <a:r>
+              <a:rPr lang="en-US" dirty="0" smtClean="0"/>
+              <a:t>Plain Old Storage</a:t>
+            </a:r>
+          </a:p>
+          <a:p>
+            <a:r>
+              <a:rPr lang="en-US" dirty="0" smtClean="0"/>
+              <a:t>Peripheral Concerns</a:t>
+            </a:r>
+            <a:endParaRPr lang="en-US" dirty="0"/>
+          </a:p>
+        </p:txBody>
+      </p:sp>
+      <p:sp>
+        <p:nvSpPr>
+          <p:cNvPr id="4" name="TextBox 3"/>
+          <p:cNvSpPr txBox="1"/>
+          <p:nvPr/>
+        </p:nvSpPr>
+        <p:spPr>
+          <a:xfrm>
+            <a:off x="9906000" y="-1"/>
+            <a:ext cx="2286000" cy="2031325"/>
+          </a:xfrm>
+          <a:prstGeom prst="rect">
+            <a:avLst/>
+          </a:prstGeom>
+          <a:solidFill>
+            <a:srgbClr val="FFFF00"/>
+          </a:solidFill>
+          <a:ln>
+            <a:noFill/>
+          </a:ln>
+        </p:spPr>
+        <p:txBody>
+          <a:bodyPr wrap="square" rtlCol="0">
+            <a:spAutoFit/>
+          </a:bodyPr>
+          <a:lstStyle/>
+          <a:p>
+            <a:pPr algn="ctr"/>
+            <a:endParaRPr lang="en-US" dirty="0" smtClean="0"/>
+          </a:p>
+          <a:p>
+            <a:pPr algn="ctr"/>
+            <a:endParaRPr lang="en-US" dirty="0"/>
+          </a:p>
+          <a:p>
+            <a:pPr algn="ctr"/>
+            <a:r>
+              <a:rPr lang="en-US" dirty="0" smtClean="0"/>
+              <a:t>Please leave this area blank to allow for picture in picture recording</a:t>
+            </a:r>
+          </a:p>
+          <a:p>
+            <a:pPr algn="ctr"/>
+            <a:endParaRPr lang="en-US" dirty="0"/>
+          </a:p>
+        </p:txBody>
+      </p:sp>
+      <p:sp>
+        <p:nvSpPr>
+          <p:cNvPr id="8" name="Content Placeholder 2"/>
+          <p:cNvSpPr txBox="1">
+            <a:spLocks/>
+          </p:cNvSpPr>
+          <p:nvPr/>
+        </p:nvSpPr>
+        <p:spPr>
+          <a:xfrm>
+            <a:off x="5486400" y="3373726"/>
+            <a:ext cx="3862605" cy="2402150"/>
+          </a:xfrm>
+          <a:prstGeom prst="rect">
+            <a:avLst/>
+          </a:prstGeom>
+          <a:solidFill>
+            <a:schemeClr val="accent3">
+              <a:lumMod val="20000"/>
+              <a:lumOff val="80000"/>
+            </a:schemeClr>
+          </a:solidFill>
+        </p:spPr>
+        <p:txBody>
+          <a:bodyPr/>
+          <a:lstStyle>
+            <a:lvl1pPr marL="342783" indent="-342783" algn="l" defTabSz="914088" rtl="0" eaLnBrk="1" latinLnBrk="0" hangingPunct="1">
+              <a:spcBef>
+                <a:spcPts val="1400"/>
+              </a:spcBef>
+              <a:buFont typeface="Arial" pitchFamily="34" charset="0"/>
+              <a:buChar char="•"/>
+              <a:defRPr sz="3200" b="0" kern="0" baseline="0">
+                <a:solidFill>
+                  <a:schemeClr val="tx1"/>
+                </a:solidFill>
+                <a:latin typeface="Segoe UI Light" panose="020B0502040204020203" pitchFamily="34" charset="0"/>
+                <a:ea typeface="Segoe UI Light" panose="020B0502040204020203" pitchFamily="34" charset="0"/>
+                <a:cs typeface="Segoe UI Light" panose="020B0502040204020203" pitchFamily="34" charset="0"/>
+              </a:defRPr>
+            </a:lvl1pPr>
+            <a:lvl2pPr marL="742698" indent="-285652" algn="l" defTabSz="914088" rtl="0" eaLnBrk="1" latinLnBrk="0" hangingPunct="1">
+              <a:spcBef>
+                <a:spcPts val="300"/>
+              </a:spcBef>
+              <a:spcAft>
+                <a:spcPts val="300"/>
+              </a:spcAft>
+              <a:buFont typeface="Arial" pitchFamily="34" charset="0"/>
+              <a:buChar char="–"/>
+              <a:defRPr sz="2800" kern="0" baseline="0">
+                <a:solidFill>
+                  <a:schemeClr val="tx1"/>
+                </a:solidFill>
+                <a:latin typeface="Segoe UI Light" panose="020B0502040204020203" pitchFamily="34" charset="0"/>
+                <a:ea typeface="Segoe UI Light" panose="020B0502040204020203" pitchFamily="34" charset="0"/>
+                <a:cs typeface="Segoe UI Light" panose="020B0502040204020203" pitchFamily="34" charset="0"/>
+              </a:defRPr>
+            </a:lvl2pPr>
+            <a:lvl3pPr marL="1142612" indent="-228522" algn="l" defTabSz="914088" rtl="0" eaLnBrk="1" latinLnBrk="0" hangingPunct="1">
+              <a:spcBef>
+                <a:spcPts val="200"/>
+              </a:spcBef>
+              <a:spcAft>
+                <a:spcPts val="200"/>
+              </a:spcAft>
+              <a:buFont typeface="Arial" pitchFamily="34" charset="0"/>
+              <a:buChar char="•"/>
+              <a:defRPr sz="2400" kern="0" baseline="0">
+                <a:solidFill>
+                  <a:schemeClr val="tx1"/>
+                </a:solidFill>
+                <a:latin typeface="Segoe UI Light" panose="020B0502040204020203" pitchFamily="34" charset="0"/>
+                <a:ea typeface="Segoe UI Light" panose="020B0502040204020203" pitchFamily="34" charset="0"/>
+                <a:cs typeface="Segoe UI Light" panose="020B0502040204020203" pitchFamily="34" charset="0"/>
+              </a:defRPr>
+            </a:lvl3pPr>
+            <a:lvl4pPr marL="1599657" indent="-228522" algn="l" defTabSz="914088" rtl="0" eaLnBrk="1" latinLnBrk="0" hangingPunct="1">
+              <a:spcBef>
+                <a:spcPct val="20000"/>
+              </a:spcBef>
+              <a:buFont typeface="Arial" pitchFamily="34" charset="0"/>
+              <a:buChar char="–"/>
+              <a:defRPr sz="2000" kern="0" baseline="0">
+                <a:solidFill>
+                  <a:schemeClr val="tx1"/>
+                </a:solidFill>
+                <a:latin typeface="Segoe UI Light" panose="020B0502040204020203" pitchFamily="34" charset="0"/>
+                <a:ea typeface="Segoe UI Light" panose="020B0502040204020203" pitchFamily="34" charset="0"/>
+                <a:cs typeface="Segoe UI Light" panose="020B0502040204020203" pitchFamily="34" charset="0"/>
+              </a:defRPr>
+            </a:lvl4pPr>
+            <a:lvl5pPr marL="2056700" indent="-228522" algn="l" defTabSz="914088" rtl="0" eaLnBrk="1" latinLnBrk="0" hangingPunct="1">
+              <a:spcBef>
+                <a:spcPct val="20000"/>
+              </a:spcBef>
+              <a:buFont typeface="Arial" pitchFamily="34" charset="0"/>
+              <a:buChar char="»"/>
+              <a:defRPr sz="2000" kern="0" baseline="0">
+                <a:solidFill>
+                  <a:schemeClr val="tx1"/>
+                </a:solidFill>
+                <a:latin typeface="Segoe UI Light" panose="020B0502040204020203" pitchFamily="34" charset="0"/>
+                <a:ea typeface="Segoe UI Light" panose="020B0502040204020203" pitchFamily="34" charset="0"/>
+                <a:cs typeface="Segoe UI Light" panose="020B0502040204020203" pitchFamily="34" charset="0"/>
+              </a:defRPr>
+            </a:lvl5pPr>
+            <a:lvl6pPr marL="2513745" indent="-228522" algn="l" defTabSz="914088" rtl="0" eaLnBrk="1" latinLnBrk="0" hangingPunct="1">
+              <a:spcBef>
+                <a:spcPct val="20000"/>
+              </a:spcBef>
+              <a:buFont typeface="Arial" pitchFamily="34" charset="0"/>
+              <a:buChar char="•"/>
+              <a:defRPr sz="2000" kern="1200">
+                <a:solidFill>
+                  <a:schemeClr val="tx1"/>
+                </a:solidFill>
+                <a:latin typeface="+mn-lt"/>
+                <a:ea typeface="+mn-ea"/>
+                <a:cs typeface="+mn-cs"/>
+              </a:defRPr>
+            </a:lvl6pPr>
+            <a:lvl7pPr marL="2970789" indent="-228522" algn="l" defTabSz="914088" rtl="0" eaLnBrk="1" latinLnBrk="0" hangingPunct="1">
+              <a:spcBef>
+                <a:spcPct val="20000"/>
+              </a:spcBef>
+              <a:buFont typeface="Arial" pitchFamily="34" charset="0"/>
+              <a:buChar char="•"/>
+              <a:defRPr sz="2000" kern="1200">
+                <a:solidFill>
+                  <a:schemeClr val="tx1"/>
+                </a:solidFill>
+                <a:latin typeface="+mn-lt"/>
+                <a:ea typeface="+mn-ea"/>
+                <a:cs typeface="+mn-cs"/>
+              </a:defRPr>
+            </a:lvl7pPr>
+            <a:lvl8pPr marL="3427833" indent="-228522" algn="l" defTabSz="914088" rtl="0" eaLnBrk="1" latinLnBrk="0" hangingPunct="1">
+              <a:spcBef>
+                <a:spcPct val="20000"/>
+              </a:spcBef>
+              <a:buFont typeface="Arial" pitchFamily="34" charset="0"/>
+              <a:buChar char="•"/>
+              <a:defRPr sz="2000" kern="1200">
+                <a:solidFill>
+                  <a:schemeClr val="tx1"/>
+                </a:solidFill>
+                <a:latin typeface="+mn-lt"/>
+                <a:ea typeface="+mn-ea"/>
+                <a:cs typeface="+mn-cs"/>
+              </a:defRPr>
+            </a:lvl8pPr>
+            <a:lvl9pPr marL="3884878" indent="-228522" algn="l" defTabSz="914088" rtl="0" eaLnBrk="1" latinLnBrk="0" hangingPunct="1">
+              <a:spcBef>
+                <a:spcPct val="20000"/>
+              </a:spcBef>
+              <a:buFont typeface="Arial" pitchFamily="34" charset="0"/>
+              <a:buChar char="•"/>
+              <a:defRPr sz="2000" kern="1200">
+                <a:solidFill>
+                  <a:schemeClr val="tx1"/>
+                </a:solidFill>
+                <a:latin typeface="+mn-lt"/>
+                <a:ea typeface="+mn-ea"/>
+                <a:cs typeface="+mn-cs"/>
+              </a:defRPr>
+            </a:lvl9pPr>
+          </a:lstStyle>
+          <a:p>
+            <a:pPr marL="0" indent="0" algn="r">
+              <a:buNone/>
+            </a:pPr>
+            <a:r>
+              <a:rPr lang="en-US" sz="2800" dirty="0" smtClean="0"/>
+              <a:t>Relational Data</a:t>
+            </a:r>
+          </a:p>
+          <a:p>
+            <a:pPr marL="0" indent="0" algn="r">
+              <a:buNone/>
+            </a:pPr>
+            <a:r>
+              <a:rPr lang="en-US" sz="2800" dirty="0"/>
+              <a:t>Table Storage</a:t>
+            </a:r>
+          </a:p>
+          <a:p>
+            <a:pPr marL="0" indent="0" algn="r">
+              <a:buNone/>
+            </a:pPr>
+            <a:r>
+              <a:rPr lang="en-US" sz="2800" dirty="0" err="1" smtClean="0"/>
+              <a:t>DocumentDB</a:t>
+            </a:r>
+            <a:endParaRPr lang="en-US" sz="2800" dirty="0" smtClean="0"/>
+          </a:p>
+          <a:p>
+            <a:pPr marL="0" indent="0" algn="r">
+              <a:buNone/>
+            </a:pPr>
+            <a:r>
+              <a:rPr lang="en-US" sz="2800" dirty="0" smtClean="0"/>
+              <a:t>Search and Cache</a:t>
+            </a:r>
+          </a:p>
+          <a:p>
+            <a:pPr marL="0" indent="0" algn="r">
+              <a:buNone/>
+            </a:pPr>
+            <a:endParaRPr lang="en-US" sz="2800" dirty="0"/>
+          </a:p>
+        </p:txBody>
+      </p:sp>
+    </p:spTree>
+    <p:extLst>
+      <p:ext uri="{BB962C8B-B14F-4D97-AF65-F5344CB8AC3E}">
+        <p14:creationId xmlns:p14="http://schemas.microsoft.com/office/powerpoint/2010/main" val="2075938855"/>
+      </p:ext>
+    </p:extLst>
+  </p:cSld>
+  <p:clrMapOvr>
+    <a:masterClrMapping/>
+  </p:clrMapOvr>
+  <p:timing>
+    <p:tnLst>
+      <p:par>
+        <p:cTn id="1" dur="indefinite" restart="never" nodeType="tmRoot">
+          <p:childTnLst>
+            <p:seq concurrent="1" nextAc="seek">
+              <p:cTn id="2" dur="indefinite" nodeType="mainSeq">
+                <p:childTnLst>
+                  <p:par>
+                    <p:cTn id="3" fill="hold">
+                      <p:stCondLst>
+                        <p:cond delay="indefinite"/>
+                      </p:stCondLst>
+                      <p:childTnLst>
+                        <p:par>
+                          <p:cTn id="4" fill="hold">
+                            <p:stCondLst>
+                              <p:cond delay="0"/>
+                            </p:stCondLst>
+                            <p:childTnLst>
+                              <p:par>
+                                <p:cTn id="5" presetID="1" presetClass="entr" presetSubtype="0" fill="hold" grpId="0" nodeType="clickEffect">
+                                  <p:stCondLst>
+                                    <p:cond delay="0"/>
+                                  </p:stCondLst>
+                                  <p:childTnLst>
+                                    <p:set>
+                                      <p:cBhvr>
+                                        <p:cTn id="6" dur="1" fill="hold">
+                                          <p:stCondLst>
+                                            <p:cond delay="0"/>
+                                          </p:stCondLst>
+                                        </p:cTn>
+                                        <p:tgtEl>
+                                          <p:spTgt spid="8"/>
+                                        </p:tgtEl>
+                                        <p:attrNameLst>
+                                          <p:attrName>style.visibility</p:attrName>
+                                        </p:attrNameLst>
+                                      </p:cBhvr>
+                                      <p:to>
+                                        <p:strVal val="visible"/>
+                                      </p:to>
+                                    </p:set>
+                                  </p:childTnLst>
+                                </p:cTn>
+                              </p:par>
+                            </p:childTnLst>
+                          </p:cTn>
+                        </p:par>
+                      </p:childTnLst>
+                    </p:cTn>
+                  </p:par>
+                  <p:par>
+                    <p:cTn id="7" fill="hold">
+                      <p:stCondLst>
+                        <p:cond delay="indefinite"/>
+                      </p:stCondLst>
+                      <p:childTnLst>
+                        <p:par>
+                          <p:cTn id="8" fill="hold">
+                            <p:stCondLst>
+                              <p:cond delay="0"/>
+                            </p:stCondLst>
+                            <p:childTnLst>
+                              <p:par>
+                                <p:cTn id="9" presetID="1" presetClass="exit" presetSubtype="0" fill="hold" grpId="1" nodeType="clickEffect">
+                                  <p:stCondLst>
+                                    <p:cond delay="0"/>
+                                  </p:stCondLst>
+                                  <p:childTnLst>
+                                    <p:set>
+                                      <p:cBhvr>
+                                        <p:cTn id="10" dur="1" fill="hold">
+                                          <p:stCondLst>
+                                            <p:cond delay="0"/>
+                                          </p:stCondLst>
+                                        </p:cTn>
+                                        <p:tgtEl>
+                                          <p:spTgt spid="8"/>
+                                        </p:tgtEl>
+                                        <p:attrNameLst>
+                                          <p:attrName>style.visibility</p:attrName>
+                                        </p:attrNameLst>
+                                      </p:cBhvr>
+                                      <p:to>
+                                        <p:strVal val="hidden"/>
+                                      </p:to>
+                                    </p:set>
+                                  </p:childTnLst>
+                                </p:cTn>
+                              </p:par>
+                            </p:childTnLst>
+                          </p:cTn>
+                        </p:par>
+                      </p:childTnLst>
+                    </p:cTn>
+                  </p:par>
+                </p:childTnLst>
+              </p:cTn>
+              <p:prevCondLst>
+                <p:cond evt="onPrev" delay="0">
+                  <p:tgtEl>
+                    <p:sldTgt/>
+                  </p:tgtEl>
+                </p:cond>
+              </p:prevCondLst>
+              <p:nextCondLst>
+                <p:cond evt="onNext" delay="0">
+                  <p:tgtEl>
+                    <p:sldTgt/>
+                  </p:tgtEl>
+                </p:cond>
+              </p:nextCondLst>
+            </p:seq>
+          </p:childTnLst>
+        </p:cTn>
+      </p:par>
+    </p:tnLst>
+    <p:bldLst>
+      <p:bldP spid="8" grpId="0" animBg="1"/>
+      <p:bldP spid="8" grpId="1" animBg="1"/>
+    </p:bldLst>
+  </p:timing>
+</p:sld>
+</file>
+
+<file path=ppt/slides/slide7.xml><?xml version="1.0" encoding="utf-8"?>
+<p:sld xmlns:a="http://schemas.openxmlformats.org/drawingml/2006/main" xmlns:r="http://schemas.openxmlformats.org/officeDocument/2006/relationships" xmlns:p="http://schemas.openxmlformats.org/presentationml/2006/main">
+  <p:cSld>
+    <p:spTree>
+      <p:nvGrpSpPr>
+        <p:cNvPr id="1" name=""/>
+        <p:cNvGrpSpPr/>
+        <p:nvPr/>
+      </p:nvGrpSpPr>
+      <p:grpSpPr>
+        <a:xfrm>
+          <a:off x="0" y="0"/>
+          <a:ext cx="0" cy="0"/>
+          <a:chOff x="0" y="0"/>
+          <a:chExt cx="0" cy="0"/>
+        </a:xfrm>
+      </p:grpSpPr>
+      <p:sp>
+        <p:nvSpPr>
+          <p:cNvPr id="2" name="Title 1"/>
+          <p:cNvSpPr>
+            <a:spLocks noGrp="1"/>
+          </p:cNvSpPr>
+          <p:nvPr>
+            <p:ph type="title"/>
+          </p:nvPr>
+        </p:nvSpPr>
+        <p:spPr/>
+        <p:txBody>
+          <a:bodyPr/>
+          <a:lstStyle/>
+          <a:p>
+            <a:r>
+              <a:rPr lang="en-US" dirty="0" smtClean="0"/>
+              <a:t>Storage Types</a:t>
+            </a:r>
+            <a:endParaRPr lang="en-US" dirty="0"/>
+          </a:p>
+        </p:txBody>
+      </p:sp>
+      <p:sp>
+        <p:nvSpPr>
+          <p:cNvPr id="3" name="Content Placeholder 2"/>
+          <p:cNvSpPr>
+            <a:spLocks noGrp="1"/>
+          </p:cNvSpPr>
+          <p:nvPr>
+            <p:ph sz="quarter" idx="10"/>
+          </p:nvPr>
+        </p:nvSpPr>
+        <p:spPr>
+          <a:xfrm>
+            <a:off x="379414" y="1388226"/>
+            <a:ext cx="4179140" cy="5290388"/>
+          </a:xfrm>
+        </p:spPr>
+        <p:txBody>
+          <a:bodyPr/>
+          <a:lstStyle/>
+          <a:p>
+            <a:r>
+              <a:rPr lang="en-US" dirty="0" smtClean="0"/>
+              <a:t>Security</a:t>
+            </a:r>
+          </a:p>
+          <a:p>
+            <a:r>
+              <a:rPr lang="en-US" dirty="0" smtClean="0"/>
+              <a:t>Integration</a:t>
+            </a:r>
+          </a:p>
+          <a:p>
+            <a:r>
+              <a:rPr lang="en-US" dirty="0" smtClean="0"/>
+              <a:t>Analytics</a:t>
+            </a:r>
+          </a:p>
+          <a:p>
+            <a:r>
+              <a:rPr lang="en-US" dirty="0" smtClean="0"/>
+              <a:t>Data</a:t>
+            </a:r>
+          </a:p>
+          <a:p>
+            <a:r>
+              <a:rPr lang="en-US" b="1" dirty="0" smtClean="0"/>
+              <a:t>Plain Old Storage</a:t>
+            </a:r>
+          </a:p>
+          <a:p>
+            <a:r>
+              <a:rPr lang="en-US" dirty="0" smtClean="0"/>
+              <a:t>Peripheral Concerns</a:t>
+            </a:r>
+            <a:endParaRPr lang="en-US" dirty="0"/>
+          </a:p>
+        </p:txBody>
+      </p:sp>
+      <p:sp>
+        <p:nvSpPr>
+          <p:cNvPr id="4" name="TextBox 3"/>
+          <p:cNvSpPr txBox="1"/>
+          <p:nvPr/>
+        </p:nvSpPr>
+        <p:spPr>
+          <a:xfrm>
+            <a:off x="9906000" y="-1"/>
+            <a:ext cx="2286000" cy="2031325"/>
+          </a:xfrm>
+          <a:prstGeom prst="rect">
+            <a:avLst/>
+          </a:prstGeom>
+          <a:solidFill>
+            <a:srgbClr val="FFFF00"/>
+          </a:solidFill>
+          <a:ln>
+            <a:noFill/>
+          </a:ln>
+        </p:spPr>
+        <p:txBody>
+          <a:bodyPr wrap="square" rtlCol="0">
+            <a:spAutoFit/>
+          </a:bodyPr>
+          <a:lstStyle/>
+          <a:p>
+            <a:pPr algn="ctr"/>
+            <a:endParaRPr lang="en-US" dirty="0" smtClean="0"/>
+          </a:p>
+          <a:p>
+            <a:pPr algn="ctr"/>
+            <a:endParaRPr lang="en-US" dirty="0"/>
+          </a:p>
+          <a:p>
+            <a:pPr algn="ctr"/>
+            <a:r>
+              <a:rPr lang="en-US" dirty="0" smtClean="0"/>
+              <a:t>Please leave this area blank to allow for picture in picture recording</a:t>
+            </a:r>
+          </a:p>
+          <a:p>
+            <a:pPr algn="ctr"/>
+            <a:endParaRPr lang="en-US" dirty="0"/>
+          </a:p>
+        </p:txBody>
+      </p:sp>
+      <p:sp>
+        <p:nvSpPr>
+          <p:cNvPr id="9" name="Content Placeholder 2"/>
+          <p:cNvSpPr txBox="1">
+            <a:spLocks/>
+          </p:cNvSpPr>
+          <p:nvPr/>
+        </p:nvSpPr>
+        <p:spPr>
+          <a:xfrm>
+            <a:off x="5486400" y="4056564"/>
+            <a:ext cx="3862604" cy="1368674"/>
+          </a:xfrm>
+          <a:prstGeom prst="rect">
+            <a:avLst/>
+          </a:prstGeom>
+          <a:solidFill>
+            <a:schemeClr val="accent3">
+              <a:lumMod val="20000"/>
+              <a:lumOff val="80000"/>
+            </a:schemeClr>
+          </a:solidFill>
+        </p:spPr>
+        <p:txBody>
+          <a:bodyPr/>
+          <a:lstStyle>
+            <a:lvl1pPr marL="342783" indent="-342783" algn="l" defTabSz="914088" rtl="0" eaLnBrk="1" latinLnBrk="0" hangingPunct="1">
+              <a:spcBef>
+                <a:spcPts val="1400"/>
+              </a:spcBef>
+              <a:buFont typeface="Arial" pitchFamily="34" charset="0"/>
+              <a:buChar char="•"/>
+              <a:defRPr sz="3200" b="0" kern="0" baseline="0">
+                <a:solidFill>
+                  <a:schemeClr val="tx1"/>
+                </a:solidFill>
+                <a:latin typeface="Segoe UI Light" panose="020B0502040204020203" pitchFamily="34" charset="0"/>
+                <a:ea typeface="Segoe UI Light" panose="020B0502040204020203" pitchFamily="34" charset="0"/>
+                <a:cs typeface="Segoe UI Light" panose="020B0502040204020203" pitchFamily="34" charset="0"/>
+              </a:defRPr>
+            </a:lvl1pPr>
+            <a:lvl2pPr marL="742698" indent="-285652" algn="l" defTabSz="914088" rtl="0" eaLnBrk="1" latinLnBrk="0" hangingPunct="1">
+              <a:spcBef>
+                <a:spcPts val="300"/>
+              </a:spcBef>
+              <a:spcAft>
+                <a:spcPts val="300"/>
+              </a:spcAft>
+              <a:buFont typeface="Arial" pitchFamily="34" charset="0"/>
+              <a:buChar char="–"/>
+              <a:defRPr sz="2800" kern="0" baseline="0">
+                <a:solidFill>
+                  <a:schemeClr val="tx1"/>
+                </a:solidFill>
+                <a:latin typeface="Segoe UI Light" panose="020B0502040204020203" pitchFamily="34" charset="0"/>
+                <a:ea typeface="Segoe UI Light" panose="020B0502040204020203" pitchFamily="34" charset="0"/>
+                <a:cs typeface="Segoe UI Light" panose="020B0502040204020203" pitchFamily="34" charset="0"/>
+              </a:defRPr>
+            </a:lvl2pPr>
+            <a:lvl3pPr marL="1142612" indent="-228522" algn="l" defTabSz="914088" rtl="0" eaLnBrk="1" latinLnBrk="0" hangingPunct="1">
+              <a:spcBef>
+                <a:spcPts val="200"/>
+              </a:spcBef>
+              <a:spcAft>
+                <a:spcPts val="200"/>
+              </a:spcAft>
+              <a:buFont typeface="Arial" pitchFamily="34" charset="0"/>
+              <a:buChar char="•"/>
+              <a:defRPr sz="2400" kern="0" baseline="0">
+                <a:solidFill>
+                  <a:schemeClr val="tx1"/>
+                </a:solidFill>
+                <a:latin typeface="Segoe UI Light" panose="020B0502040204020203" pitchFamily="34" charset="0"/>
+                <a:ea typeface="Segoe UI Light" panose="020B0502040204020203" pitchFamily="34" charset="0"/>
+                <a:cs typeface="Segoe UI Light" panose="020B0502040204020203" pitchFamily="34" charset="0"/>
+              </a:defRPr>
+            </a:lvl3pPr>
+            <a:lvl4pPr marL="1599657" indent="-228522" algn="l" defTabSz="914088" rtl="0" eaLnBrk="1" latinLnBrk="0" hangingPunct="1">
+              <a:spcBef>
+                <a:spcPct val="20000"/>
+              </a:spcBef>
+              <a:buFont typeface="Arial" pitchFamily="34" charset="0"/>
+              <a:buChar char="–"/>
+              <a:defRPr sz="2000" kern="0" baseline="0">
+                <a:solidFill>
+                  <a:schemeClr val="tx1"/>
+                </a:solidFill>
+                <a:latin typeface="Segoe UI Light" panose="020B0502040204020203" pitchFamily="34" charset="0"/>
+                <a:ea typeface="Segoe UI Light" panose="020B0502040204020203" pitchFamily="34" charset="0"/>
+                <a:cs typeface="Segoe UI Light" panose="020B0502040204020203" pitchFamily="34" charset="0"/>
+              </a:defRPr>
+            </a:lvl4pPr>
+            <a:lvl5pPr marL="2056700" indent="-228522" algn="l" defTabSz="914088" rtl="0" eaLnBrk="1" latinLnBrk="0" hangingPunct="1">
+              <a:spcBef>
+                <a:spcPct val="20000"/>
+              </a:spcBef>
+              <a:buFont typeface="Arial" pitchFamily="34" charset="0"/>
+              <a:buChar char="»"/>
+              <a:defRPr sz="2000" kern="0" baseline="0">
+                <a:solidFill>
+                  <a:schemeClr val="tx1"/>
+                </a:solidFill>
+                <a:latin typeface="Segoe UI Light" panose="020B0502040204020203" pitchFamily="34" charset="0"/>
+                <a:ea typeface="Segoe UI Light" panose="020B0502040204020203" pitchFamily="34" charset="0"/>
+                <a:cs typeface="Segoe UI Light" panose="020B0502040204020203" pitchFamily="34" charset="0"/>
+              </a:defRPr>
+            </a:lvl5pPr>
+            <a:lvl6pPr marL="2513745" indent="-228522" algn="l" defTabSz="914088" rtl="0" eaLnBrk="1" latinLnBrk="0" hangingPunct="1">
+              <a:spcBef>
+                <a:spcPct val="20000"/>
+              </a:spcBef>
+              <a:buFont typeface="Arial" pitchFamily="34" charset="0"/>
+              <a:buChar char="•"/>
+              <a:defRPr sz="2000" kern="1200">
+                <a:solidFill>
+                  <a:schemeClr val="tx1"/>
+                </a:solidFill>
+                <a:latin typeface="+mn-lt"/>
+                <a:ea typeface="+mn-ea"/>
+                <a:cs typeface="+mn-cs"/>
+              </a:defRPr>
+            </a:lvl6pPr>
+            <a:lvl7pPr marL="2970789" indent="-228522" algn="l" defTabSz="914088" rtl="0" eaLnBrk="1" latinLnBrk="0" hangingPunct="1">
+              <a:spcBef>
+                <a:spcPct val="20000"/>
+              </a:spcBef>
+              <a:buFont typeface="Arial" pitchFamily="34" charset="0"/>
+              <a:buChar char="•"/>
+              <a:defRPr sz="2000" kern="1200">
+                <a:solidFill>
+                  <a:schemeClr val="tx1"/>
+                </a:solidFill>
+                <a:latin typeface="+mn-lt"/>
+                <a:ea typeface="+mn-ea"/>
+                <a:cs typeface="+mn-cs"/>
+              </a:defRPr>
+            </a:lvl7pPr>
+            <a:lvl8pPr marL="3427833" indent="-228522" algn="l" defTabSz="914088" rtl="0" eaLnBrk="1" latinLnBrk="0" hangingPunct="1">
+              <a:spcBef>
+                <a:spcPct val="20000"/>
+              </a:spcBef>
+              <a:buFont typeface="Arial" pitchFamily="34" charset="0"/>
+              <a:buChar char="•"/>
+              <a:defRPr sz="2000" kern="1200">
+                <a:solidFill>
+                  <a:schemeClr val="tx1"/>
+                </a:solidFill>
+                <a:latin typeface="+mn-lt"/>
+                <a:ea typeface="+mn-ea"/>
+                <a:cs typeface="+mn-cs"/>
+              </a:defRPr>
+            </a:lvl8pPr>
+            <a:lvl9pPr marL="3884878" indent="-228522" algn="l" defTabSz="914088" rtl="0" eaLnBrk="1" latinLnBrk="0" hangingPunct="1">
+              <a:spcBef>
+                <a:spcPct val="20000"/>
+              </a:spcBef>
+              <a:buFont typeface="Arial" pitchFamily="34" charset="0"/>
+              <a:buChar char="•"/>
+              <a:defRPr sz="2000" kern="1200">
+                <a:solidFill>
+                  <a:schemeClr val="tx1"/>
+                </a:solidFill>
+                <a:latin typeface="+mn-lt"/>
+                <a:ea typeface="+mn-ea"/>
+                <a:cs typeface="+mn-cs"/>
+              </a:defRPr>
+            </a:lvl9pPr>
+          </a:lstStyle>
+          <a:p>
+            <a:pPr marL="0" indent="0" algn="r">
+              <a:buNone/>
+            </a:pPr>
+            <a:r>
+              <a:rPr lang="en-US" sz="2800" dirty="0" smtClean="0"/>
+              <a:t>Blobs</a:t>
+            </a:r>
+          </a:p>
+          <a:p>
+            <a:pPr marL="0" indent="0" algn="r">
+              <a:buNone/>
+            </a:pPr>
+            <a:r>
+              <a:rPr lang="en-US" sz="2800" dirty="0" smtClean="0"/>
+              <a:t>Files</a:t>
+            </a:r>
+          </a:p>
+          <a:p>
+            <a:pPr marL="0" indent="0" algn="r">
+              <a:buNone/>
+            </a:pPr>
+            <a:endParaRPr lang="en-US" sz="2800" dirty="0"/>
+          </a:p>
+        </p:txBody>
+      </p:sp>
+    </p:spTree>
+    <p:extLst>
+      <p:ext uri="{BB962C8B-B14F-4D97-AF65-F5344CB8AC3E}">
+        <p14:creationId xmlns:p14="http://schemas.microsoft.com/office/powerpoint/2010/main" val="3680661139"/>
+      </p:ext>
+    </p:extLst>
+  </p:cSld>
+  <p:clrMapOvr>
+    <a:masterClrMapping/>
+  </p:clrMapOvr>
+  <p:timing>
+    <p:tnLst>
+      <p:par>
+        <p:cTn id="1" dur="indefinite" restart="never" nodeType="tmRoot">
+          <p:childTnLst>
+            <p:seq concurrent="1" nextAc="seek">
+              <p:cTn id="2" dur="indefinite" nodeType="mainSeq">
+                <p:childTnLst>
+                  <p:par>
+                    <p:cTn id="3" fill="hold">
+                      <p:stCondLst>
+                        <p:cond delay="indefinite"/>
+                      </p:stCondLst>
+                      <p:childTnLst>
+                        <p:par>
+                          <p:cTn id="4" fill="hold">
+                            <p:stCondLst>
+                              <p:cond delay="0"/>
+                            </p:stCondLst>
+                            <p:childTnLst>
+                              <p:par>
+                                <p:cTn id="5" presetID="1" presetClass="entr" presetSubtype="0" fill="hold" grpId="0" nodeType="clickEffect">
+                                  <p:stCondLst>
+                                    <p:cond delay="0"/>
+                                  </p:stCondLst>
+                                  <p:childTnLst>
+                                    <p:set>
+                                      <p:cBhvr>
+                                        <p:cTn id="6" dur="1" fill="hold">
+                                          <p:stCondLst>
+                                            <p:cond delay="0"/>
+                                          </p:stCondLst>
+                                        </p:cTn>
+                                        <p:tgtEl>
+                                          <p:spTgt spid="9"/>
+                                        </p:tgtEl>
+                                        <p:attrNameLst>
+                                          <p:attrName>style.visibility</p:attrName>
+                                        </p:attrNameLst>
+                                      </p:cBhvr>
+                                      <p:to>
+                                        <p:strVal val="visible"/>
+                                      </p:to>
+                                    </p:set>
+                                  </p:childTnLst>
+                                </p:cTn>
+                              </p:par>
+                            </p:childTnLst>
+                          </p:cTn>
+                        </p:par>
+                      </p:childTnLst>
+                    </p:cTn>
+                  </p:par>
+                  <p:par>
+                    <p:cTn id="7" fill="hold">
+                      <p:stCondLst>
+                        <p:cond delay="indefinite"/>
+                      </p:stCondLst>
+                      <p:childTnLst>
+                        <p:par>
+                          <p:cTn id="8" fill="hold">
+                            <p:stCondLst>
+                              <p:cond delay="0"/>
+                            </p:stCondLst>
+                            <p:childTnLst>
+                              <p:par>
+                                <p:cTn id="9" presetID="1" presetClass="exit" presetSubtype="0" fill="hold" grpId="1" nodeType="clickEffect">
+                                  <p:stCondLst>
+                                    <p:cond delay="0"/>
+                                  </p:stCondLst>
+                                  <p:childTnLst>
+                                    <p:set>
+                                      <p:cBhvr>
+                                        <p:cTn id="10" dur="1" fill="hold">
+                                          <p:stCondLst>
+                                            <p:cond delay="0"/>
+                                          </p:stCondLst>
+                                        </p:cTn>
+                                        <p:tgtEl>
+                                          <p:spTgt spid="9"/>
+                                        </p:tgtEl>
+                                        <p:attrNameLst>
+                                          <p:attrName>style.visibility</p:attrName>
+                                        </p:attrNameLst>
+                                      </p:cBhvr>
+                                      <p:to>
+                                        <p:strVal val="hidden"/>
+                                      </p:to>
+                                    </p:set>
+                                  </p:childTnLst>
+                                </p:cTn>
+                              </p:par>
+                            </p:childTnLst>
+                          </p:cTn>
+                        </p:par>
+                      </p:childTnLst>
+                    </p:cTn>
+                  </p:par>
+                </p:childTnLst>
+              </p:cTn>
+              <p:prevCondLst>
+                <p:cond evt="onPrev" delay="0">
+                  <p:tgtEl>
+                    <p:sldTgt/>
+                  </p:tgtEl>
+                </p:cond>
+              </p:prevCondLst>
+              <p:nextCondLst>
+                <p:cond evt="onNext" delay="0">
+                  <p:tgtEl>
+                    <p:sldTgt/>
+                  </p:tgtEl>
+                </p:cond>
+              </p:nextCondLst>
+            </p:seq>
+          </p:childTnLst>
+        </p:cTn>
+      </p:par>
+    </p:tnLst>
+    <p:bldLst>
+      <p:bldP spid="9" grpId="0" animBg="1"/>
+      <p:bldP spid="9" grpId="1" animBg="1"/>
+    </p:bldLst>
+  </p:timing>
+</p:sld>
+</file>
+
+<file path=ppt/slides/slide8.xml><?xml version="1.0" encoding="utf-8"?>
+<p:sld xmlns:a="http://schemas.openxmlformats.org/drawingml/2006/main" xmlns:r="http://schemas.openxmlformats.org/officeDocument/2006/relationships" xmlns:p="http://schemas.openxmlformats.org/presentationml/2006/main">
+  <p:cSld>
+    <p:spTree>
+      <p:nvGrpSpPr>
+        <p:cNvPr id="1" name=""/>
+        <p:cNvGrpSpPr/>
+        <p:nvPr/>
+      </p:nvGrpSpPr>
+      <p:grpSpPr>
+        <a:xfrm>
+          <a:off x="0" y="0"/>
+          <a:ext cx="0" cy="0"/>
+          <a:chOff x="0" y="0"/>
+          <a:chExt cx="0" cy="0"/>
+        </a:xfrm>
+      </p:grpSpPr>
+      <p:sp>
+        <p:nvSpPr>
+          <p:cNvPr id="2" name="Title 1"/>
+          <p:cNvSpPr>
+            <a:spLocks noGrp="1"/>
+          </p:cNvSpPr>
+          <p:nvPr>
+            <p:ph type="title"/>
+          </p:nvPr>
+        </p:nvSpPr>
+        <p:spPr/>
+        <p:txBody>
+          <a:bodyPr/>
+          <a:lstStyle/>
+          <a:p>
+            <a:r>
+              <a:rPr lang="en-US" dirty="0" smtClean="0"/>
+              <a:t>Storage Types</a:t>
+            </a:r>
+            <a:endParaRPr lang="en-US" dirty="0"/>
+          </a:p>
+        </p:txBody>
+      </p:sp>
+      <p:sp>
+        <p:nvSpPr>
+          <p:cNvPr id="3" name="Content Placeholder 2"/>
+          <p:cNvSpPr>
+            <a:spLocks noGrp="1"/>
+          </p:cNvSpPr>
+          <p:nvPr>
+            <p:ph sz="quarter" idx="10"/>
+          </p:nvPr>
+        </p:nvSpPr>
+        <p:spPr>
+          <a:xfrm>
+            <a:off x="379414" y="1388226"/>
+            <a:ext cx="4179140" cy="5290388"/>
+          </a:xfrm>
+        </p:spPr>
+        <p:txBody>
+          <a:bodyPr/>
+          <a:lstStyle/>
+          <a:p>
+            <a:r>
+              <a:rPr lang="en-US" dirty="0" smtClean="0"/>
+              <a:t>Security</a:t>
+            </a:r>
+          </a:p>
+          <a:p>
+            <a:r>
+              <a:rPr lang="en-US" dirty="0" smtClean="0"/>
+              <a:t>Integration</a:t>
+            </a:r>
+          </a:p>
+          <a:p>
+            <a:r>
+              <a:rPr lang="en-US" dirty="0" smtClean="0"/>
+              <a:t>Analytics</a:t>
+            </a:r>
+          </a:p>
+          <a:p>
+            <a:r>
+              <a:rPr lang="en-US" dirty="0" smtClean="0"/>
+              <a:t>Data</a:t>
+            </a:r>
+          </a:p>
+          <a:p>
+            <a:r>
+              <a:rPr lang="en-US" dirty="0" smtClean="0"/>
+              <a:t>Plain Old Storage</a:t>
+            </a:r>
+          </a:p>
+          <a:p>
+            <a:r>
+              <a:rPr lang="en-US" b="1" dirty="0" smtClean="0"/>
+              <a:t>Peripheral Concerns</a:t>
+            </a:r>
+            <a:endParaRPr lang="en-US" b="1" dirty="0"/>
+          </a:p>
+        </p:txBody>
+      </p:sp>
+      <p:sp>
+        <p:nvSpPr>
+          <p:cNvPr id="4" name="TextBox 3"/>
+          <p:cNvSpPr txBox="1"/>
+          <p:nvPr/>
+        </p:nvSpPr>
+        <p:spPr>
+          <a:xfrm>
+            <a:off x="9906000" y="-1"/>
+            <a:ext cx="2286000" cy="2031325"/>
+          </a:xfrm>
+          <a:prstGeom prst="rect">
+            <a:avLst/>
+          </a:prstGeom>
+          <a:solidFill>
+            <a:srgbClr val="FFFF00"/>
+          </a:solidFill>
+          <a:ln>
+            <a:noFill/>
+          </a:ln>
+        </p:spPr>
+        <p:txBody>
+          <a:bodyPr wrap="square" rtlCol="0">
+            <a:spAutoFit/>
+          </a:bodyPr>
+          <a:lstStyle/>
+          <a:p>
+            <a:pPr algn="ctr"/>
+            <a:endParaRPr lang="en-US" dirty="0" smtClean="0"/>
+          </a:p>
+          <a:p>
+            <a:pPr algn="ctr"/>
+            <a:endParaRPr lang="en-US" dirty="0"/>
+          </a:p>
+          <a:p>
+            <a:pPr algn="ctr"/>
+            <a:r>
+              <a:rPr lang="en-US" dirty="0" smtClean="0"/>
+              <a:t>Please leave this area blank to allow for picture in picture recording</a:t>
+            </a:r>
+          </a:p>
+          <a:p>
+            <a:pPr algn="ctr"/>
+            <a:endParaRPr lang="en-US" dirty="0"/>
+          </a:p>
+        </p:txBody>
+      </p:sp>
+    </p:spTree>
+    <p:extLst>
+      <p:ext uri="{BB962C8B-B14F-4D97-AF65-F5344CB8AC3E}">
+        <p14:creationId xmlns:p14="http://schemas.microsoft.com/office/powerpoint/2010/main" val="818671344"/>
+      </p:ext>
+    </p:extLst>
+  </p:cSld>
+  <p:clrMapOvr>
+    <a:masterClrMapping/>
+  </p:clrMapOvr>
+  <p:timing>
+    <p:tnLst>
+      <p:par>
         <p:cTn id="1" dur="indefinite" restart="never" nodeType="tmRoot"/>
+      </p:par>
+    </p:tnLst>
+  </p:timing>
+</p:sld>
+</file>
+
+<file path=ppt/slides/slide9.xml><?xml version="1.0" encoding="utf-8"?>
+<p:sld xmlns:a="http://schemas.openxmlformats.org/drawingml/2006/main" xmlns:r="http://schemas.openxmlformats.org/officeDocument/2006/relationships" xmlns:p="http://schemas.openxmlformats.org/presentationml/2006/main">
+  <p:cSld>
+    <p:spTree>
+      <p:nvGrpSpPr>
+        <p:cNvPr id="1" name=""/>
+        <p:cNvGrpSpPr/>
+        <p:nvPr/>
+      </p:nvGrpSpPr>
+      <p:grpSpPr>
+        <a:xfrm>
+          <a:off x="0" y="0"/>
+          <a:ext cx="0" cy="0"/>
+          <a:chOff x="0" y="0"/>
+          <a:chExt cx="0" cy="0"/>
+        </a:xfrm>
+      </p:grpSpPr>
+      <p:sp>
+        <p:nvSpPr>
+          <p:cNvPr id="2" name="Title 1"/>
+          <p:cNvSpPr>
+            <a:spLocks noGrp="1"/>
+          </p:cNvSpPr>
+          <p:nvPr>
+            <p:ph type="title"/>
+          </p:nvPr>
+        </p:nvSpPr>
+        <p:spPr/>
+        <p:txBody>
+          <a:bodyPr/>
+          <a:lstStyle/>
+          <a:p>
+            <a:r>
+              <a:rPr lang="en-US" dirty="0" smtClean="0"/>
+              <a:t>It Comes Down To…</a:t>
+            </a:r>
+            <a:endParaRPr lang="en-US" dirty="0"/>
+          </a:p>
+        </p:txBody>
+      </p:sp>
+      <p:sp>
+        <p:nvSpPr>
+          <p:cNvPr id="3" name="Content Placeholder 2"/>
+          <p:cNvSpPr>
+            <a:spLocks noGrp="1"/>
+          </p:cNvSpPr>
+          <p:nvPr>
+            <p:ph sz="quarter" idx="10"/>
+          </p:nvPr>
+        </p:nvSpPr>
+        <p:spPr>
+          <a:xfrm>
+            <a:off x="379413" y="1388226"/>
+            <a:ext cx="11525250" cy="3109129"/>
+          </a:xfrm>
+        </p:spPr>
+        <p:txBody>
+          <a:bodyPr/>
+          <a:lstStyle/>
+          <a:p>
+            <a:r>
+              <a:rPr lang="en-US" dirty="0"/>
+              <a:t>Type of data</a:t>
+            </a:r>
+          </a:p>
+          <a:p>
+            <a:r>
+              <a:rPr lang="en-US" dirty="0" smtClean="0"/>
+              <a:t>Concerns of scalability</a:t>
+            </a:r>
+          </a:p>
+          <a:p>
+            <a:r>
+              <a:rPr lang="en-US" dirty="0" smtClean="0"/>
+              <a:t>Nature of your project</a:t>
+            </a:r>
+          </a:p>
+          <a:p>
+            <a:r>
+              <a:rPr lang="en-US" dirty="0" smtClean="0"/>
+              <a:t>Budget</a:t>
+            </a:r>
+          </a:p>
+          <a:p>
+            <a:endParaRPr lang="en-US" dirty="0"/>
+          </a:p>
+        </p:txBody>
+      </p:sp>
+      <p:sp>
+        <p:nvSpPr>
+          <p:cNvPr id="4" name="TextBox 3"/>
+          <p:cNvSpPr txBox="1"/>
+          <p:nvPr/>
+        </p:nvSpPr>
+        <p:spPr>
+          <a:xfrm>
+            <a:off x="9906000" y="-1"/>
+            <a:ext cx="2286000" cy="2031325"/>
+          </a:xfrm>
+          <a:prstGeom prst="rect">
+            <a:avLst/>
+          </a:prstGeom>
+          <a:solidFill>
+            <a:srgbClr val="FFFF00"/>
+          </a:solidFill>
+          <a:ln>
+            <a:noFill/>
+          </a:ln>
+        </p:spPr>
+        <p:txBody>
+          <a:bodyPr wrap="square" rtlCol="0">
+            <a:spAutoFit/>
+          </a:bodyPr>
+          <a:lstStyle/>
+          <a:p>
+            <a:pPr algn="ctr"/>
+            <a:endParaRPr lang="en-US" dirty="0" smtClean="0"/>
+          </a:p>
+          <a:p>
+            <a:pPr algn="ctr"/>
+            <a:endParaRPr lang="en-US" dirty="0"/>
+          </a:p>
+          <a:p>
+            <a:pPr algn="ctr"/>
+            <a:r>
+              <a:rPr lang="en-US" dirty="0" smtClean="0"/>
+              <a:t>Please leave this area blank to allow for picture in picture recording</a:t>
+            </a:r>
+          </a:p>
+          <a:p>
+            <a:pPr algn="ctr"/>
+            <a:endParaRPr lang="en-US" dirty="0"/>
+          </a:p>
+        </p:txBody>
+      </p:sp>
+    </p:spTree>
+    <p:extLst>
+      <p:ext uri="{BB962C8B-B14F-4D97-AF65-F5344CB8AC3E}">
+        <p14:creationId xmlns:p14="http://schemas.microsoft.com/office/powerpoint/2010/main" val="2439866652"/>
+      </p:ext>
+    </p:extLst>
+  </p:cSld>
+  <p:clrMapOvr>
+    <a:masterClrMapping/>
+  </p:clrMapOvr>
+  <p:timing>
+    <p:tnLst>
+      <p:par>
+        <p:cTn id="1" dur="indefinite" restart="never" nodeType="tmRoot">
+          <p:childTnLst>
+            <p:seq concurrent="1" nextAc="seek">
+              <p:cTn id="2" dur="indefinite" nodeType="mainSeq">
+                <p:childTnLst>
+                  <p:par>
+                    <p:cTn id="3" fill="hold">
+                      <p:stCondLst>
+                        <p:cond delay="indefinite"/>
+                      </p:stCondLst>
+                      <p:childTnLst>
+                        <p:par>
+                          <p:cTn id="4" fill="hold">
+                            <p:stCondLst>
+                              <p:cond delay="0"/>
+                            </p:stCondLst>
+                            <p:childTnLst>
+                              <p:par>
+                                <p:cTn id="5" presetID="1" presetClass="entr" presetSubtype="0" fill="hold" nodeType="clickEffect">
+                                  <p:stCondLst>
+                                    <p:cond delay="0"/>
+                                  </p:stCondLst>
+                                  <p:childTnLst>
+                                    <p:set>
+                                      <p:cBhvr>
+                                        <p:cTn id="6" dur="1" fill="hold">
+                                          <p:stCondLst>
+                                            <p:cond delay="0"/>
+                                          </p:stCondLst>
+                                        </p:cTn>
+                                        <p:tgtEl>
+                                          <p:spTgt spid="3">
+                                            <p:txEl>
+                                              <p:pRg st="0" end="0"/>
+                                            </p:txEl>
+                                          </p:spTgt>
+                                        </p:tgtEl>
+                                        <p:attrNameLst>
+                                          <p:attrName>style.visibility</p:attrName>
+                                        </p:attrNameLst>
+                                      </p:cBhvr>
+                                      <p:to>
+                                        <p:strVal val="visible"/>
+                                      </p:to>
+                                    </p:set>
+                                  </p:childTnLst>
+                                </p:cTn>
+                              </p:par>
+                            </p:childTnLst>
+                          </p:cTn>
+                        </p:par>
+                      </p:childTnLst>
+                    </p:cTn>
+                  </p:par>
+                  <p:par>
+                    <p:cTn id="7" fill="hold">
+                      <p:stCondLst>
+                        <p:cond delay="indefinite"/>
+                      </p:stCondLst>
+                      <p:childTnLst>
+                        <p:par>
+                          <p:cTn id="8" fill="hold">
+                            <p:stCondLst>
+                              <p:cond delay="0"/>
+                            </p:stCondLst>
+                            <p:childTnLst>
+                              <p:par>
+                                <p:cTn id="9" presetID="1" presetClass="entr" presetSubtype="0" fill="hold" nodeType="clickEffect">
+                                  <p:stCondLst>
+                                    <p:cond delay="0"/>
+                                  </p:stCondLst>
+                                  <p:childTnLst>
+                                    <p:set>
+                                      <p:cBhvr>
+                                        <p:cTn id="10" dur="1" fill="hold">
+                                          <p:stCondLst>
+                                            <p:cond delay="0"/>
+                                          </p:stCondLst>
+                                        </p:cTn>
+                                        <p:tgtEl>
+                                          <p:spTgt spid="3">
+                                            <p:txEl>
+                                              <p:pRg st="1" end="1"/>
+                                            </p:txEl>
+                                          </p:spTgt>
+                                        </p:tgtEl>
+                                        <p:attrNameLst>
+                                          <p:attrName>style.visibility</p:attrName>
+                                        </p:attrNameLst>
+                                      </p:cBhvr>
+                                      <p:to>
+                                        <p:strVal val="visible"/>
+                                      </p:to>
+                                    </p:set>
+                                  </p:childTnLst>
+                                </p:cTn>
+                              </p:par>
+                            </p:childTnLst>
+                          </p:cTn>
+                        </p:par>
+                      </p:childTnLst>
+                    </p:cTn>
+                  </p:par>
+                  <p:par>
+                    <p:cTn id="11" fill="hold">
+                      <p:stCondLst>
+                        <p:cond delay="indefinite"/>
+                      </p:stCondLst>
+                      <p:childTnLst>
+                        <p:par>
+                          <p:cTn id="12" fill="hold">
+                            <p:stCondLst>
+                              <p:cond delay="0"/>
+                            </p:stCondLst>
+                            <p:childTnLst>
+                              <p:par>
+                                <p:cTn id="13" presetID="1" presetClass="entr" presetSubtype="0" fill="hold" nodeType="clickEffect">
+                                  <p:stCondLst>
+                                    <p:cond delay="0"/>
+                                  </p:stCondLst>
+                                  <p:childTnLst>
+                                    <p:set>
+                                      <p:cBhvr>
+                                        <p:cTn id="14" dur="1" fill="hold">
+                                          <p:stCondLst>
+                                            <p:cond delay="0"/>
+                                          </p:stCondLst>
+                                        </p:cTn>
+                                        <p:tgtEl>
+                                          <p:spTgt spid="3">
+                                            <p:txEl>
+                                              <p:pRg st="2" end="2"/>
+                                            </p:txEl>
+                                          </p:spTgt>
+                                        </p:tgtEl>
+                                        <p:attrNameLst>
+                                          <p:attrName>style.visibility</p:attrName>
+                                        </p:attrNameLst>
+                                      </p:cBhvr>
+                                      <p:to>
+                                        <p:strVal val="visible"/>
+                                      </p:to>
+                                    </p:set>
+                                  </p:childTnLst>
+                                </p:cTn>
+                              </p:par>
+                            </p:childTnLst>
+                          </p:cTn>
+                        </p:par>
+                      </p:childTnLst>
+                    </p:cTn>
+                  </p:par>
+                  <p:par>
+                    <p:cTn id="15" fill="hold">
+                      <p:stCondLst>
+                        <p:cond delay="indefinite"/>
+                      </p:stCondLst>
+                      <p:childTnLst>
+                        <p:par>
+                          <p:cTn id="16" fill="hold">
+                            <p:stCondLst>
+                              <p:cond delay="0"/>
+                            </p:stCondLst>
+                            <p:childTnLst>
+                              <p:par>
+                                <p:cTn id="17" presetID="1" presetClass="entr" presetSubtype="0" fill="hold" nodeType="clickEffect">
+                                  <p:stCondLst>
+                                    <p:cond delay="0"/>
+                                  </p:stCondLst>
+                                  <p:childTnLst>
+                                    <p:set>
+                                      <p:cBhvr>
+                                        <p:cTn id="18" dur="1" fill="hold">
+                                          <p:stCondLst>
+                                            <p:cond delay="0"/>
+                                          </p:stCondLst>
+                                        </p:cTn>
+                                        <p:tgtEl>
+                                          <p:spTgt spid="3">
+                                            <p:txEl>
+                                              <p:pRg st="3" end="3"/>
+                                            </p:txEl>
+                                          </p:spTgt>
+                                        </p:tgtEl>
+                                        <p:attrNameLst>
+                                          <p:attrName>style.visibility</p:attrName>
+                                        </p:attrNameLst>
+                                      </p:cBhvr>
+                                      <p:to>
+                                        <p:strVal val="visible"/>
+                                      </p:to>
+                                    </p:set>
+                                  </p:childTnLst>
+                                </p:cTn>
+                              </p:par>
+                            </p:childTnLst>
+                          </p:cTn>
+                        </p:par>
+                      </p:childTnLst>
+                    </p:cTn>
+                  </p:par>
+                </p:childTnLst>
+              </p:cTn>
+              <p:prevCondLst>
+                <p:cond evt="onPrev" delay="0">
+                  <p:tgtEl>
+                    <p:sldTgt/>
+                  </p:tgtEl>
+                </p:cond>
+              </p:prevCondLst>
+              <p:nextCondLst>
+                <p:cond evt="onNext" delay="0">
+                  <p:tgtEl>
+                    <p:sldTgt/>
+                  </p:tgtEl>
+                </p:cond>
+              </p:nextCondLst>
+            </p:seq>
+          </p:childTnLst>
+        </p:cTn>
       </p:par>
     </p:tnLst>
   </p:timing>
@@ -4858,12 +9012,46 @@
 </file>
 
 <file path=customXml/item1.xml><?xml version="1.0" encoding="utf-8"?>
-<?mso-contentType ?>
-<FormTemplates xmlns="http://schemas.microsoft.com/sharepoint/v3/contenttype/forms">
-  <Display>DocumentLibraryForm</Display>
-  <Edit>DocumentLibraryForm</Edit>
-  <New>DocumentLibraryForm</New>
-</FormTemplates>
+<p:properties xmlns:p="http://schemas.microsoft.com/office/2006/metadata/properties" xmlns:xsi="http://www.w3.org/2001/XMLSchema-instance" xmlns:pc="http://schemas.microsoft.com/office/infopath/2007/PartnerControls">
+  <documentManagement>
+    <TaxCatchAll xmlns="230e9df3-be65-4c73-a93b-d1236ebd677e"/>
+    <PublishingExpirationDate xmlns="http://schemas.microsoft.com/sharepoint/v3" xsi:nil="true"/>
+    <PublishingStartDate xmlns="http://schemas.microsoft.com/sharepoint/v3" xsi:nil="true"/>
+    <TaxKeywordTaxHTField xmlns="230e9df3-be65-4c73-a93b-d1236ebd677e">
+      <Terms xmlns="http://schemas.microsoft.com/office/infopath/2007/PartnerControls"/>
+    </TaxKeywordTaxHTField>
+    <SharedWithUsers xmlns="27aa9422-7f1f-4c84-9cdf-302b1a67e513">
+      <UserInfo>
+        <DisplayName>Shriram Natarajan (SHRI)</DisplayName>
+        <AccountId>3899</AccountId>
+        <AccountType/>
+      </UserInfo>
+      <UserInfo>
+        <DisplayName>Andrew Nickels</DisplayName>
+        <AccountId>24014</AccountId>
+        <AccountType/>
+      </UserInfo>
+      <UserInfo>
+        <DisplayName>Steven Goddard (WSSC)</DisplayName>
+        <AccountId>29711</AccountId>
+        <AccountType/>
+      </UserInfo>
+      <UserInfo>
+        <DisplayName>Jim Clark (LEARNING)</DisplayName>
+        <AccountId>86</AccountId>
+        <AccountType/>
+      </UserInfo>
+      <UserInfo>
+        <DisplayName>Vijay Kumar</DisplayName>
+        <AccountId>53758</AccountId>
+        <AccountType/>
+      </UserInfo>
+    </SharedWithUsers>
+    <SharingHintHash xmlns="27aa9422-7f1f-4c84-9cdf-302b1a67e513">1366665793</SharingHintHash>
+    <_ip_UnifiedCompliancePolicyUIAction xmlns="http://schemas.microsoft.com/sharepoint/v3" xsi:nil="true"/>
+    <_ip_UnifiedCompliancePolicyProperties xmlns="http://schemas.microsoft.com/sharepoint/v3" xsi:nil="true"/>
+  </documentManagement>
+</p:properties>
 </file>
 
 <file path=customXml/item2.xml><?xml version="1.0" encoding="utf-8"?>
@@ -5075,52 +9263,28 @@
 </file>
 
 <file path=customXml/item3.xml><?xml version="1.0" encoding="utf-8"?>
-<p:properties xmlns:p="http://schemas.microsoft.com/office/2006/metadata/properties" xmlns:xsi="http://www.w3.org/2001/XMLSchema-instance" xmlns:pc="http://schemas.microsoft.com/office/infopath/2007/PartnerControls">
-  <documentManagement>
-    <TaxCatchAll xmlns="230e9df3-be65-4c73-a93b-d1236ebd677e"/>
-    <PublishingExpirationDate xmlns="http://schemas.microsoft.com/sharepoint/v3" xsi:nil="true"/>
-    <PublishingStartDate xmlns="http://schemas.microsoft.com/sharepoint/v3" xsi:nil="true"/>
-    <TaxKeywordTaxHTField xmlns="230e9df3-be65-4c73-a93b-d1236ebd677e">
-      <Terms xmlns="http://schemas.microsoft.com/office/infopath/2007/PartnerControls"/>
-    </TaxKeywordTaxHTField>
-    <SharedWithUsers xmlns="27aa9422-7f1f-4c84-9cdf-302b1a67e513">
-      <UserInfo>
-        <DisplayName>Shriram Natarajan (SHRI)</DisplayName>
-        <AccountId>3899</AccountId>
-        <AccountType/>
-      </UserInfo>
-      <UserInfo>
-        <DisplayName>Andrew Nickels</DisplayName>
-        <AccountId>24014</AccountId>
-        <AccountType/>
-      </UserInfo>
-      <UserInfo>
-        <DisplayName>Steven Goddard (WSSC)</DisplayName>
-        <AccountId>29711</AccountId>
-        <AccountType/>
-      </UserInfo>
-      <UserInfo>
-        <DisplayName>Jim Clark (LEARNING)</DisplayName>
-        <AccountId>86</AccountId>
-        <AccountType/>
-      </UserInfo>
-      <UserInfo>
-        <DisplayName>Vijay Kumar</DisplayName>
-        <AccountId>53758</AccountId>
-        <AccountType/>
-      </UserInfo>
-    </SharedWithUsers>
-    <SharingHintHash xmlns="27aa9422-7f1f-4c84-9cdf-302b1a67e513">1366665793</SharingHintHash>
-    <_ip_UnifiedCompliancePolicyUIAction xmlns="http://schemas.microsoft.com/sharepoint/v3" xsi:nil="true"/>
-    <_ip_UnifiedCompliancePolicyProperties xmlns="http://schemas.microsoft.com/sharepoint/v3" xsi:nil="true"/>
-  </documentManagement>
-</p:properties>
+<?mso-contentType ?>
+<FormTemplates xmlns="http://schemas.microsoft.com/sharepoint/v3/contenttype/forms">
+  <Display>DocumentLibraryForm</Display>
+  <Edit>DocumentLibraryForm</Edit>
+  <New>DocumentLibraryForm</New>
+</FormTemplates>
 </file>
 
 <file path=customXml/itemProps1.xml><?xml version="1.0" encoding="utf-8"?>
-<ds:datastoreItem xmlns:ds="http://schemas.openxmlformats.org/officeDocument/2006/customXml" ds:itemID="{B0CA13EC-1D3C-4D6F-8D1C-E8A452CFC79A}">
+<ds:datastoreItem xmlns:ds="http://schemas.openxmlformats.org/officeDocument/2006/customXml" ds:itemID="{7025FDD9-4C58-4084-9F89-0E6ADD6FFF55}">
   <ds:schemaRefs>
-    <ds:schemaRef ds:uri="http://schemas.microsoft.com/sharepoint/v3/contenttype/forms"/>
+    <ds:schemaRef ds:uri="http://purl.org/dc/dcmitype/"/>
+    <ds:schemaRef ds:uri="http://purl.org/dc/terms/"/>
+    <ds:schemaRef ds:uri="http://schemas.microsoft.com/office/2006/documentManagement/types"/>
+    <ds:schemaRef ds:uri="http://www.w3.org/XML/1998/namespace"/>
+    <ds:schemaRef ds:uri="http://purl.org/dc/elements/1.1/"/>
+    <ds:schemaRef ds:uri="http://schemas.microsoft.com/office/infopath/2007/PartnerControls"/>
+    <ds:schemaRef ds:uri="http://schemas.openxmlformats.org/package/2006/metadata/core-properties"/>
+    <ds:schemaRef ds:uri="http://schemas.microsoft.com/office/2006/metadata/properties"/>
+    <ds:schemaRef ds:uri="27aa9422-7f1f-4c84-9cdf-302b1a67e513"/>
+    <ds:schemaRef ds:uri="230e9df3-be65-4c73-a93b-d1236ebd677e"/>
+    <ds:schemaRef ds:uri="http://schemas.microsoft.com/sharepoint/v3"/>
   </ds:schemaRefs>
 </ds:datastoreItem>
 </file>
@@ -5146,19 +9310,9 @@
 </file>
 
 <file path=customXml/itemProps3.xml><?xml version="1.0" encoding="utf-8"?>
-<ds:datastoreItem xmlns:ds="http://schemas.openxmlformats.org/officeDocument/2006/customXml" ds:itemID="{7025FDD9-4C58-4084-9F89-0E6ADD6FFF55}">
+<ds:datastoreItem xmlns:ds="http://schemas.openxmlformats.org/officeDocument/2006/customXml" ds:itemID="{B0CA13EC-1D3C-4D6F-8D1C-E8A452CFC79A}">
   <ds:schemaRefs>
-    <ds:schemaRef ds:uri="http://purl.org/dc/terms/"/>
-    <ds:schemaRef ds:uri="http://purl.org/dc/dcmitype/"/>
-    <ds:schemaRef ds:uri="http://schemas.microsoft.com/office/2006/documentManagement/types"/>
-    <ds:schemaRef ds:uri="http://www.w3.org/XML/1998/namespace"/>
-    <ds:schemaRef ds:uri="http://schemas.microsoft.com/office/infopath/2007/PartnerControls"/>
-    <ds:schemaRef ds:uri="http://schemas.microsoft.com/office/2006/metadata/properties"/>
-    <ds:schemaRef ds:uri="27aa9422-7f1f-4c84-9cdf-302b1a67e513"/>
-    <ds:schemaRef ds:uri="http://purl.org/dc/elements/1.1/"/>
-    <ds:schemaRef ds:uri="http://schemas.openxmlformats.org/package/2006/metadata/core-properties"/>
-    <ds:schemaRef ds:uri="230e9df3-be65-4c73-a93b-d1236ebd677e"/>
-    <ds:schemaRef ds:uri="http://schemas.microsoft.com/sharepoint/v3"/>
+    <ds:schemaRef ds:uri="http://schemas.microsoft.com/sharepoint/v3/contenttype/forms"/>
   </ds:schemaRefs>
 </ds:datastoreItem>
 </file>
</xml_diff>